<commit_message>
Added Liskov/SignleResponsibility to PowerPoint
</commit_message>
<xml_diff>
--- a/PowerPoint/SOLID.pptx
+++ b/PowerPoint/SOLID.pptx
@@ -5,21 +5,28 @@
     <p:sldMasterId id="2147483779" r:id="rId4"/>
   </p:sldMasterIdLst>
   <p:notesMasterIdLst>
-    <p:notesMasterId r:id="rId14"/>
+    <p:notesMasterId r:id="rId21"/>
   </p:notesMasterIdLst>
   <p:handoutMasterIdLst>
-    <p:handoutMasterId r:id="rId15"/>
+    <p:handoutMasterId r:id="rId22"/>
   </p:handoutMasterIdLst>
   <p:sldIdLst>
     <p:sldId id="261" r:id="rId5"/>
-    <p:sldId id="263" r:id="rId6"/>
-    <p:sldId id="269" r:id="rId7"/>
-    <p:sldId id="270" r:id="rId8"/>
-    <p:sldId id="272" r:id="rId9"/>
-    <p:sldId id="271" r:id="rId10"/>
-    <p:sldId id="273" r:id="rId11"/>
-    <p:sldId id="274" r:id="rId12"/>
-    <p:sldId id="275" r:id="rId13"/>
+    <p:sldId id="276" r:id="rId6"/>
+    <p:sldId id="279" r:id="rId7"/>
+    <p:sldId id="280" r:id="rId8"/>
+    <p:sldId id="277" r:id="rId9"/>
+    <p:sldId id="269" r:id="rId10"/>
+    <p:sldId id="270" r:id="rId11"/>
+    <p:sldId id="263" r:id="rId12"/>
+    <p:sldId id="281" r:id="rId13"/>
+    <p:sldId id="282" r:id="rId14"/>
+    <p:sldId id="272" r:id="rId15"/>
+    <p:sldId id="271" r:id="rId16"/>
+    <p:sldId id="273" r:id="rId17"/>
+    <p:sldId id="274" r:id="rId18"/>
+    <p:sldId id="275" r:id="rId19"/>
+    <p:sldId id="278" r:id="rId20"/>
   </p:sldIdLst>
   <p:sldSz cx="9144000" cy="5143500" type="screen16x9"/>
   <p:notesSz cx="6858000" cy="9144000"/>
@@ -249,7 +256,7 @@
             <a:fld id="{9CA14C55-E12A-45E6-87F3-7EAADE4C1D12}" type="datetimeFigureOut">
               <a:rPr lang="en-US" smtClean="0"/>
               <a:pPr/>
-              <a:t>1/11/2019</a:t>
+              <a:t>1/16/2019</a:t>
             </a:fld>
             <a:endParaRPr lang="en-US"/>
           </a:p>
@@ -416,7 +423,7 @@
             <a:fld id="{959CAFB7-E13F-4384-95CE-291BAEA2830B}" type="datetimeFigureOut">
               <a:rPr lang="en-US" smtClean="0"/>
               <a:pPr/>
-              <a:t>1/11/2019</a:t>
+              <a:t>1/16/2019</a:t>
             </a:fld>
             <a:endParaRPr lang="en-US"/>
           </a:p>
@@ -737,10 +744,71 @@
           </a:bodyPr>
           <a:lstStyle/>
           <a:p>
-            <a:endParaRPr lang="en-US" dirty="0">
-              <a:latin typeface="Arial" pitchFamily="34" charset="0"/>
-              <a:cs typeface="Arial" pitchFamily="34" charset="0"/>
-            </a:endParaRPr>
+            <a:pPr marL="171450" indent="-171450">
+              <a:buFontTx/>
+              <a:buChar char="-"/>
+            </a:pPr>
+            <a:r>
+              <a:rPr lang="en-US" dirty="0">
+                <a:latin typeface="Arial" pitchFamily="34" charset="0"/>
+                <a:cs typeface="Arial" pitchFamily="34" charset="0"/>
+              </a:rPr>
+              <a:t>Building a </a:t>
+            </a:r>
+            <a:r>
+              <a:rPr lang="en-US" dirty="0" err="1">
+                <a:latin typeface="Arial" pitchFamily="34" charset="0"/>
+                <a:cs typeface="Arial" pitchFamily="34" charset="0"/>
+              </a:rPr>
+              <a:t>SoccerPlayer</a:t>
+            </a:r>
+            <a:r>
+              <a:rPr lang="en-US" dirty="0">
+                <a:latin typeface="Arial" pitchFamily="34" charset="0"/>
+                <a:cs typeface="Arial" pitchFamily="34" charset="0"/>
+              </a:rPr>
+              <a:t> class</a:t>
+            </a:r>
+          </a:p>
+          <a:p>
+            <a:pPr marL="171450" indent="-171450">
+              <a:buFontTx/>
+              <a:buChar char="-"/>
+            </a:pPr>
+            <a:r>
+              <a:rPr lang="en-US" dirty="0">
+                <a:latin typeface="Arial" pitchFamily="34" charset="0"/>
+                <a:cs typeface="Arial" pitchFamily="34" charset="0"/>
+              </a:rPr>
+              <a:t>You want to keep stats, but it’s clear that it probably wouldn’t work to keep the values on the soccer player. Some stats require comparing other players on the team/in the league. A single player’s data shouldn’t rely on others you feel.</a:t>
+            </a:r>
+          </a:p>
+          <a:p>
+            <a:pPr marL="171450" indent="-171450">
+              <a:buFontTx/>
+              <a:buChar char="-"/>
+            </a:pPr>
+            <a:r>
+              <a:rPr lang="en-US" dirty="0">
+                <a:latin typeface="Arial" pitchFamily="34" charset="0"/>
+                <a:cs typeface="Arial" pitchFamily="34" charset="0"/>
+              </a:rPr>
+              <a:t>So build a </a:t>
+            </a:r>
+            <a:r>
+              <a:rPr lang="en-US" dirty="0" err="1">
+                <a:latin typeface="Arial" pitchFamily="34" charset="0"/>
+                <a:cs typeface="Arial" pitchFamily="34" charset="0"/>
+              </a:rPr>
+              <a:t>PlayerReport</a:t>
+            </a:r>
+            <a:r>
+              <a:rPr lang="en-US" dirty="0">
+                <a:latin typeface="Arial" pitchFamily="34" charset="0"/>
+                <a:cs typeface="Arial" pitchFamily="34" charset="0"/>
+              </a:rPr>
+              <a:t> class to hold calculated stats. But leave the calculations in the player class.</a:t>
+            </a:r>
           </a:p>
         </p:txBody>
       </p:sp>
@@ -771,7 +839,102 @@
     </p:spTree>
     <p:extLst>
       <p:ext uri="{BB962C8B-B14F-4D97-AF65-F5344CB8AC3E}">
-        <p14:creationId xmlns:p14="http://schemas.microsoft.com/office/powerpoint/2010/main" val="817677590"/>
+        <p14:creationId xmlns:p14="http://schemas.microsoft.com/office/powerpoint/2010/main" val="944495322"/>
+      </p:ext>
+    </p:extLst>
+  </p:cSld>
+  <p:clrMapOvr>
+    <a:masterClrMapping/>
+  </p:clrMapOvr>
+</p:notes>
+</file>
+
+<file path=ppt/notesSlides/notesSlide10.xml><?xml version="1.0" encoding="utf-8"?>
+<p:notes xmlns:a="http://schemas.openxmlformats.org/drawingml/2006/main" xmlns:r="http://schemas.openxmlformats.org/officeDocument/2006/relationships" xmlns:p="http://schemas.openxmlformats.org/presentationml/2006/main">
+  <p:cSld>
+    <p:spTree>
+      <p:nvGrpSpPr>
+        <p:cNvPr id="1" name=""/>
+        <p:cNvGrpSpPr/>
+        <p:nvPr/>
+      </p:nvGrpSpPr>
+      <p:grpSpPr>
+        <a:xfrm>
+          <a:off x="0" y="0"/>
+          <a:ext cx="0" cy="0"/>
+          <a:chOff x="0" y="0"/>
+          <a:chExt cx="0" cy="0"/>
+        </a:xfrm>
+      </p:grpSpPr>
+      <p:sp>
+        <p:nvSpPr>
+          <p:cNvPr id="2" name="Slide Image Placeholder 1"/>
+          <p:cNvSpPr>
+            <a:spLocks noGrp="1" noRot="1" noChangeAspect="1"/>
+          </p:cNvSpPr>
+          <p:nvPr>
+            <p:ph type="sldImg"/>
+          </p:nvPr>
+        </p:nvSpPr>
+        <p:spPr>
+          <a:xfrm>
+            <a:off x="381000" y="685800"/>
+            <a:ext cx="6096000" cy="3429000"/>
+          </a:xfrm>
+        </p:spPr>
+      </p:sp>
+      <p:sp>
+        <p:nvSpPr>
+          <p:cNvPr id="3" name="Notes Placeholder 2"/>
+          <p:cNvSpPr>
+            <a:spLocks noGrp="1"/>
+          </p:cNvSpPr>
+          <p:nvPr>
+            <p:ph type="body" idx="1"/>
+          </p:nvPr>
+        </p:nvSpPr>
+        <p:spPr/>
+        <p:txBody>
+          <a:bodyPr>
+            <a:normAutofit/>
+          </a:bodyPr>
+          <a:lstStyle/>
+          <a:p>
+            <a:endParaRPr lang="en-US" dirty="0">
+              <a:latin typeface="Arial" pitchFamily="34" charset="0"/>
+              <a:cs typeface="Arial" pitchFamily="34" charset="0"/>
+            </a:endParaRPr>
+          </a:p>
+        </p:txBody>
+      </p:sp>
+      <p:sp>
+        <p:nvSpPr>
+          <p:cNvPr id="4" name="Slide Number Placeholder 3"/>
+          <p:cNvSpPr>
+            <a:spLocks noGrp="1"/>
+          </p:cNvSpPr>
+          <p:nvPr>
+            <p:ph type="sldNum" sz="quarter" idx="10"/>
+          </p:nvPr>
+        </p:nvSpPr>
+        <p:spPr/>
+        <p:txBody>
+          <a:bodyPr/>
+          <a:lstStyle/>
+          <a:p>
+            <a:fld id="{3DA09BFF-9304-4EE8-967B-56F816FBB8C1}" type="slidenum">
+              <a:rPr lang="en-US" smtClean="0"/>
+              <a:pPr/>
+              <a:t>15</a:t>
+            </a:fld>
+            <a:endParaRPr lang="en-US"/>
+          </a:p>
+        </p:txBody>
+      </p:sp>
+    </p:spTree>
+    <p:extLst>
+      <p:ext uri="{BB962C8B-B14F-4D97-AF65-F5344CB8AC3E}">
+        <p14:creationId xmlns:p14="http://schemas.microsoft.com/office/powerpoint/2010/main" val="341352484"/>
       </p:ext>
     </p:extLst>
   </p:cSld>
@@ -832,10 +995,71 @@
           </a:bodyPr>
           <a:lstStyle/>
           <a:p>
-            <a:endParaRPr lang="en-US" dirty="0">
-              <a:latin typeface="Arial" pitchFamily="34" charset="0"/>
-              <a:cs typeface="Arial" pitchFamily="34" charset="0"/>
-            </a:endParaRPr>
+            <a:pPr marL="171450" indent="-171450">
+              <a:buFontTx/>
+              <a:buChar char="-"/>
+            </a:pPr>
+            <a:r>
+              <a:rPr lang="en-US" dirty="0">
+                <a:latin typeface="Arial" pitchFamily="34" charset="0"/>
+                <a:cs typeface="Arial" pitchFamily="34" charset="0"/>
+              </a:rPr>
+              <a:t>Building a </a:t>
+            </a:r>
+            <a:r>
+              <a:rPr lang="en-US" dirty="0" err="1">
+                <a:latin typeface="Arial" pitchFamily="34" charset="0"/>
+                <a:cs typeface="Arial" pitchFamily="34" charset="0"/>
+              </a:rPr>
+              <a:t>SoccerPlayer</a:t>
+            </a:r>
+            <a:r>
+              <a:rPr lang="en-US" dirty="0">
+                <a:latin typeface="Arial" pitchFamily="34" charset="0"/>
+                <a:cs typeface="Arial" pitchFamily="34" charset="0"/>
+              </a:rPr>
+              <a:t> class</a:t>
+            </a:r>
+          </a:p>
+          <a:p>
+            <a:pPr marL="171450" indent="-171450">
+              <a:buFontTx/>
+              <a:buChar char="-"/>
+            </a:pPr>
+            <a:r>
+              <a:rPr lang="en-US" dirty="0">
+                <a:latin typeface="Arial" pitchFamily="34" charset="0"/>
+                <a:cs typeface="Arial" pitchFamily="34" charset="0"/>
+              </a:rPr>
+              <a:t>You want to keep stats, but it’s clear that it probably wouldn’t work to keep the values on the soccer player. Some stats require comparing other players on the team/in the league. A single player’s data shouldn’t rely on others you feel.</a:t>
+            </a:r>
+          </a:p>
+          <a:p>
+            <a:pPr marL="171450" indent="-171450">
+              <a:buFontTx/>
+              <a:buChar char="-"/>
+            </a:pPr>
+            <a:r>
+              <a:rPr lang="en-US" dirty="0">
+                <a:latin typeface="Arial" pitchFamily="34" charset="0"/>
+                <a:cs typeface="Arial" pitchFamily="34" charset="0"/>
+              </a:rPr>
+              <a:t>So build a </a:t>
+            </a:r>
+            <a:r>
+              <a:rPr lang="en-US" dirty="0" err="1">
+                <a:latin typeface="Arial" pitchFamily="34" charset="0"/>
+                <a:cs typeface="Arial" pitchFamily="34" charset="0"/>
+              </a:rPr>
+              <a:t>PlayerReport</a:t>
+            </a:r>
+            <a:r>
+              <a:rPr lang="en-US" dirty="0">
+                <a:latin typeface="Arial" pitchFamily="34" charset="0"/>
+                <a:cs typeface="Arial" pitchFamily="34" charset="0"/>
+              </a:rPr>
+              <a:t> class to hold calculated stats. But leave the calculations in the player class.</a:t>
+            </a:r>
           </a:p>
         </p:txBody>
       </p:sp>
@@ -866,7 +1090,7 @@
     </p:spTree>
     <p:extLst>
       <p:ext uri="{BB962C8B-B14F-4D97-AF65-F5344CB8AC3E}">
-        <p14:creationId xmlns:p14="http://schemas.microsoft.com/office/powerpoint/2010/main" val="3790524406"/>
+        <p14:creationId xmlns:p14="http://schemas.microsoft.com/office/powerpoint/2010/main" val="1043497630"/>
       </p:ext>
     </p:extLst>
   </p:cSld>
@@ -961,7 +1185,7 @@
     </p:spTree>
     <p:extLst>
       <p:ext uri="{BB962C8B-B14F-4D97-AF65-F5344CB8AC3E}">
-        <p14:creationId xmlns:p14="http://schemas.microsoft.com/office/powerpoint/2010/main" val="173063448"/>
+        <p14:creationId xmlns:p14="http://schemas.microsoft.com/office/powerpoint/2010/main" val="817677590"/>
       </p:ext>
     </p:extLst>
   </p:cSld>
@@ -1056,7 +1280,7 @@
     </p:spTree>
     <p:extLst>
       <p:ext uri="{BB962C8B-B14F-4D97-AF65-F5344CB8AC3E}">
-        <p14:creationId xmlns:p14="http://schemas.microsoft.com/office/powerpoint/2010/main" val="802530561"/>
+        <p14:creationId xmlns:p14="http://schemas.microsoft.com/office/powerpoint/2010/main" val="3790524406"/>
       </p:ext>
     </p:extLst>
   </p:cSld>
@@ -1117,6 +1341,10 @@
           </a:bodyPr>
           <a:lstStyle/>
           <a:p>
+            <a:pPr marL="0" indent="0">
+              <a:buFontTx/>
+              <a:buNone/>
+            </a:pPr>
             <a:endParaRPr lang="en-US" dirty="0">
               <a:latin typeface="Arial" pitchFamily="34" charset="0"/>
               <a:cs typeface="Arial" pitchFamily="34" charset="0"/>
@@ -1142,7 +1370,7 @@
             <a:fld id="{3DA09BFF-9304-4EE8-967B-56F816FBB8C1}" type="slidenum">
               <a:rPr lang="en-US" smtClean="0"/>
               <a:pPr/>
-              <a:t>8</a:t>
+              <a:t>9</a:t>
             </a:fld>
             <a:endParaRPr lang="en-US"/>
           </a:p>
@@ -1151,7 +1379,7 @@
     </p:spTree>
     <p:extLst>
       <p:ext uri="{BB962C8B-B14F-4D97-AF65-F5344CB8AC3E}">
-        <p14:creationId xmlns:p14="http://schemas.microsoft.com/office/powerpoint/2010/main" val="620100447"/>
+        <p14:creationId xmlns:p14="http://schemas.microsoft.com/office/powerpoint/2010/main" val="2953088215"/>
       </p:ext>
     </p:extLst>
   </p:cSld>
@@ -1212,6 +1440,10 @@
           </a:bodyPr>
           <a:lstStyle/>
           <a:p>
+            <a:pPr marL="0" indent="0">
+              <a:buFontTx/>
+              <a:buNone/>
+            </a:pPr>
             <a:endParaRPr lang="en-US" dirty="0">
               <a:latin typeface="Arial" pitchFamily="34" charset="0"/>
               <a:cs typeface="Arial" pitchFamily="34" charset="0"/>
@@ -1237,7 +1469,7 @@
             <a:fld id="{3DA09BFF-9304-4EE8-967B-56F816FBB8C1}" type="slidenum">
               <a:rPr lang="en-US" smtClean="0"/>
               <a:pPr/>
-              <a:t>9</a:t>
+              <a:t>10</a:t>
             </a:fld>
             <a:endParaRPr lang="en-US"/>
           </a:p>
@@ -1246,7 +1478,292 @@
     </p:spTree>
     <p:extLst>
       <p:ext uri="{BB962C8B-B14F-4D97-AF65-F5344CB8AC3E}">
-        <p14:creationId xmlns:p14="http://schemas.microsoft.com/office/powerpoint/2010/main" val="341352484"/>
+        <p14:creationId xmlns:p14="http://schemas.microsoft.com/office/powerpoint/2010/main" val="1949693232"/>
+      </p:ext>
+    </p:extLst>
+  </p:cSld>
+  <p:clrMapOvr>
+    <a:masterClrMapping/>
+  </p:clrMapOvr>
+</p:notes>
+</file>
+
+<file path=ppt/notesSlides/notesSlide7.xml><?xml version="1.0" encoding="utf-8"?>
+<p:notes xmlns:a="http://schemas.openxmlformats.org/drawingml/2006/main" xmlns:r="http://schemas.openxmlformats.org/officeDocument/2006/relationships" xmlns:p="http://schemas.openxmlformats.org/presentationml/2006/main">
+  <p:cSld>
+    <p:spTree>
+      <p:nvGrpSpPr>
+        <p:cNvPr id="1" name=""/>
+        <p:cNvGrpSpPr/>
+        <p:nvPr/>
+      </p:nvGrpSpPr>
+      <p:grpSpPr>
+        <a:xfrm>
+          <a:off x="0" y="0"/>
+          <a:ext cx="0" cy="0"/>
+          <a:chOff x="0" y="0"/>
+          <a:chExt cx="0" cy="0"/>
+        </a:xfrm>
+      </p:grpSpPr>
+      <p:sp>
+        <p:nvSpPr>
+          <p:cNvPr id="2" name="Slide Image Placeholder 1"/>
+          <p:cNvSpPr>
+            <a:spLocks noGrp="1" noRot="1" noChangeAspect="1"/>
+          </p:cNvSpPr>
+          <p:nvPr>
+            <p:ph type="sldImg"/>
+          </p:nvPr>
+        </p:nvSpPr>
+        <p:spPr>
+          <a:xfrm>
+            <a:off x="381000" y="685800"/>
+            <a:ext cx="6096000" cy="3429000"/>
+          </a:xfrm>
+        </p:spPr>
+      </p:sp>
+      <p:sp>
+        <p:nvSpPr>
+          <p:cNvPr id="3" name="Notes Placeholder 2"/>
+          <p:cNvSpPr>
+            <a:spLocks noGrp="1"/>
+          </p:cNvSpPr>
+          <p:nvPr>
+            <p:ph type="body" idx="1"/>
+          </p:nvPr>
+        </p:nvSpPr>
+        <p:spPr/>
+        <p:txBody>
+          <a:bodyPr>
+            <a:normAutofit/>
+          </a:bodyPr>
+          <a:lstStyle/>
+          <a:p>
+            <a:endParaRPr lang="en-US" dirty="0">
+              <a:latin typeface="Arial" pitchFamily="34" charset="0"/>
+              <a:cs typeface="Arial" pitchFamily="34" charset="0"/>
+            </a:endParaRPr>
+          </a:p>
+        </p:txBody>
+      </p:sp>
+      <p:sp>
+        <p:nvSpPr>
+          <p:cNvPr id="4" name="Slide Number Placeholder 3"/>
+          <p:cNvSpPr>
+            <a:spLocks noGrp="1"/>
+          </p:cNvSpPr>
+          <p:nvPr>
+            <p:ph type="sldNum" sz="quarter" idx="10"/>
+          </p:nvPr>
+        </p:nvSpPr>
+        <p:spPr/>
+        <p:txBody>
+          <a:bodyPr/>
+          <a:lstStyle/>
+          <a:p>
+            <a:fld id="{3DA09BFF-9304-4EE8-967B-56F816FBB8C1}" type="slidenum">
+              <a:rPr lang="en-US" smtClean="0"/>
+              <a:pPr/>
+              <a:t>12</a:t>
+            </a:fld>
+            <a:endParaRPr lang="en-US"/>
+          </a:p>
+        </p:txBody>
+      </p:sp>
+    </p:spTree>
+    <p:extLst>
+      <p:ext uri="{BB962C8B-B14F-4D97-AF65-F5344CB8AC3E}">
+        <p14:creationId xmlns:p14="http://schemas.microsoft.com/office/powerpoint/2010/main" val="173063448"/>
+      </p:ext>
+    </p:extLst>
+  </p:cSld>
+  <p:clrMapOvr>
+    <a:masterClrMapping/>
+  </p:clrMapOvr>
+</p:notes>
+</file>
+
+<file path=ppt/notesSlides/notesSlide8.xml><?xml version="1.0" encoding="utf-8"?>
+<p:notes xmlns:a="http://schemas.openxmlformats.org/drawingml/2006/main" xmlns:r="http://schemas.openxmlformats.org/officeDocument/2006/relationships" xmlns:p="http://schemas.openxmlformats.org/presentationml/2006/main">
+  <p:cSld>
+    <p:spTree>
+      <p:nvGrpSpPr>
+        <p:cNvPr id="1" name=""/>
+        <p:cNvGrpSpPr/>
+        <p:nvPr/>
+      </p:nvGrpSpPr>
+      <p:grpSpPr>
+        <a:xfrm>
+          <a:off x="0" y="0"/>
+          <a:ext cx="0" cy="0"/>
+          <a:chOff x="0" y="0"/>
+          <a:chExt cx="0" cy="0"/>
+        </a:xfrm>
+      </p:grpSpPr>
+      <p:sp>
+        <p:nvSpPr>
+          <p:cNvPr id="2" name="Slide Image Placeholder 1"/>
+          <p:cNvSpPr>
+            <a:spLocks noGrp="1" noRot="1" noChangeAspect="1"/>
+          </p:cNvSpPr>
+          <p:nvPr>
+            <p:ph type="sldImg"/>
+          </p:nvPr>
+        </p:nvSpPr>
+        <p:spPr>
+          <a:xfrm>
+            <a:off x="381000" y="685800"/>
+            <a:ext cx="6096000" cy="3429000"/>
+          </a:xfrm>
+        </p:spPr>
+      </p:sp>
+      <p:sp>
+        <p:nvSpPr>
+          <p:cNvPr id="3" name="Notes Placeholder 2"/>
+          <p:cNvSpPr>
+            <a:spLocks noGrp="1"/>
+          </p:cNvSpPr>
+          <p:nvPr>
+            <p:ph type="body" idx="1"/>
+          </p:nvPr>
+        </p:nvSpPr>
+        <p:spPr/>
+        <p:txBody>
+          <a:bodyPr>
+            <a:normAutofit/>
+          </a:bodyPr>
+          <a:lstStyle/>
+          <a:p>
+            <a:endParaRPr lang="en-US" dirty="0">
+              <a:latin typeface="Arial" pitchFamily="34" charset="0"/>
+              <a:cs typeface="Arial" pitchFamily="34" charset="0"/>
+            </a:endParaRPr>
+          </a:p>
+        </p:txBody>
+      </p:sp>
+      <p:sp>
+        <p:nvSpPr>
+          <p:cNvPr id="4" name="Slide Number Placeholder 3"/>
+          <p:cNvSpPr>
+            <a:spLocks noGrp="1"/>
+          </p:cNvSpPr>
+          <p:nvPr>
+            <p:ph type="sldNum" sz="quarter" idx="10"/>
+          </p:nvPr>
+        </p:nvSpPr>
+        <p:spPr/>
+        <p:txBody>
+          <a:bodyPr/>
+          <a:lstStyle/>
+          <a:p>
+            <a:fld id="{3DA09BFF-9304-4EE8-967B-56F816FBB8C1}" type="slidenum">
+              <a:rPr lang="en-US" smtClean="0"/>
+              <a:pPr/>
+              <a:t>13</a:t>
+            </a:fld>
+            <a:endParaRPr lang="en-US"/>
+          </a:p>
+        </p:txBody>
+      </p:sp>
+    </p:spTree>
+    <p:extLst>
+      <p:ext uri="{BB962C8B-B14F-4D97-AF65-F5344CB8AC3E}">
+        <p14:creationId xmlns:p14="http://schemas.microsoft.com/office/powerpoint/2010/main" val="802530561"/>
+      </p:ext>
+    </p:extLst>
+  </p:cSld>
+  <p:clrMapOvr>
+    <a:masterClrMapping/>
+  </p:clrMapOvr>
+</p:notes>
+</file>
+
+<file path=ppt/notesSlides/notesSlide9.xml><?xml version="1.0" encoding="utf-8"?>
+<p:notes xmlns:a="http://schemas.openxmlformats.org/drawingml/2006/main" xmlns:r="http://schemas.openxmlformats.org/officeDocument/2006/relationships" xmlns:p="http://schemas.openxmlformats.org/presentationml/2006/main">
+  <p:cSld>
+    <p:spTree>
+      <p:nvGrpSpPr>
+        <p:cNvPr id="1" name=""/>
+        <p:cNvGrpSpPr/>
+        <p:nvPr/>
+      </p:nvGrpSpPr>
+      <p:grpSpPr>
+        <a:xfrm>
+          <a:off x="0" y="0"/>
+          <a:ext cx="0" cy="0"/>
+          <a:chOff x="0" y="0"/>
+          <a:chExt cx="0" cy="0"/>
+        </a:xfrm>
+      </p:grpSpPr>
+      <p:sp>
+        <p:nvSpPr>
+          <p:cNvPr id="2" name="Slide Image Placeholder 1"/>
+          <p:cNvSpPr>
+            <a:spLocks noGrp="1" noRot="1" noChangeAspect="1"/>
+          </p:cNvSpPr>
+          <p:nvPr>
+            <p:ph type="sldImg"/>
+          </p:nvPr>
+        </p:nvSpPr>
+        <p:spPr>
+          <a:xfrm>
+            <a:off x="381000" y="685800"/>
+            <a:ext cx="6096000" cy="3429000"/>
+          </a:xfrm>
+        </p:spPr>
+      </p:sp>
+      <p:sp>
+        <p:nvSpPr>
+          <p:cNvPr id="3" name="Notes Placeholder 2"/>
+          <p:cNvSpPr>
+            <a:spLocks noGrp="1"/>
+          </p:cNvSpPr>
+          <p:nvPr>
+            <p:ph type="body" idx="1"/>
+          </p:nvPr>
+        </p:nvSpPr>
+        <p:spPr/>
+        <p:txBody>
+          <a:bodyPr>
+            <a:normAutofit/>
+          </a:bodyPr>
+          <a:lstStyle/>
+          <a:p>
+            <a:endParaRPr lang="en-US" dirty="0">
+              <a:latin typeface="Arial" pitchFamily="34" charset="0"/>
+              <a:cs typeface="Arial" pitchFamily="34" charset="0"/>
+            </a:endParaRPr>
+          </a:p>
+        </p:txBody>
+      </p:sp>
+      <p:sp>
+        <p:nvSpPr>
+          <p:cNvPr id="4" name="Slide Number Placeholder 3"/>
+          <p:cNvSpPr>
+            <a:spLocks noGrp="1"/>
+          </p:cNvSpPr>
+          <p:nvPr>
+            <p:ph type="sldNum" sz="quarter" idx="10"/>
+          </p:nvPr>
+        </p:nvSpPr>
+        <p:spPr/>
+        <p:txBody>
+          <a:bodyPr/>
+          <a:lstStyle/>
+          <a:p>
+            <a:fld id="{3DA09BFF-9304-4EE8-967B-56F816FBB8C1}" type="slidenum">
+              <a:rPr lang="en-US" smtClean="0"/>
+              <a:pPr/>
+              <a:t>14</a:t>
+            </a:fld>
+            <a:endParaRPr lang="en-US"/>
+          </a:p>
+        </p:txBody>
+      </p:sp>
+    </p:spTree>
+    <p:extLst>
+      <p:ext uri="{BB962C8B-B14F-4D97-AF65-F5344CB8AC3E}">
+        <p14:creationId xmlns:p14="http://schemas.microsoft.com/office/powerpoint/2010/main" val="620100447"/>
       </p:ext>
     </p:extLst>
   </p:cSld>
@@ -9150,6 +9667,624 @@
 </p:sld>
 </file>
 
+<file path=ppt/slides/slide10.xml><?xml version="1.0" encoding="utf-8"?>
+<p:sld xmlns:a="http://schemas.openxmlformats.org/drawingml/2006/main" xmlns:r="http://schemas.openxmlformats.org/officeDocument/2006/relationships" xmlns:p="http://schemas.openxmlformats.org/presentationml/2006/main">
+  <p:cSld>
+    <p:spTree>
+      <p:nvGrpSpPr>
+        <p:cNvPr id="1" name=""/>
+        <p:cNvGrpSpPr/>
+        <p:nvPr/>
+      </p:nvGrpSpPr>
+      <p:grpSpPr>
+        <a:xfrm>
+          <a:off x="0" y="0"/>
+          <a:ext cx="0" cy="0"/>
+          <a:chOff x="0" y="0"/>
+          <a:chExt cx="0" cy="0"/>
+        </a:xfrm>
+      </p:grpSpPr>
+      <p:sp>
+        <p:nvSpPr>
+          <p:cNvPr id="7" name="Title 6"/>
+          <p:cNvSpPr>
+            <a:spLocks noGrp="1"/>
+          </p:cNvSpPr>
+          <p:nvPr>
+            <p:ph type="title"/>
+          </p:nvPr>
+        </p:nvSpPr>
+        <p:spPr/>
+        <p:txBody>
+          <a:bodyPr>
+            <a:normAutofit/>
+          </a:bodyPr>
+          <a:lstStyle/>
+          <a:p>
+            <a:r>
+              <a:rPr lang="en-US" dirty="0"/>
+              <a:t>Good Notifications</a:t>
+            </a:r>
+          </a:p>
+        </p:txBody>
+      </p:sp>
+      <p:pic>
+        <p:nvPicPr>
+          <p:cNvPr id="4" name="Picture 3">
+            <a:extLst>
+              <a:ext uri="{FF2B5EF4-FFF2-40B4-BE49-F238E27FC236}">
+                <a16:creationId xmlns:a16="http://schemas.microsoft.com/office/drawing/2014/main" id="{D1E400DC-B03A-4D53-9B19-53CB31F40356}"/>
+              </a:ext>
+            </a:extLst>
+          </p:cNvPr>
+          <p:cNvPicPr>
+            <a:picLocks noChangeAspect="1"/>
+          </p:cNvPicPr>
+          <p:nvPr/>
+        </p:nvPicPr>
+        <p:blipFill rotWithShape="1">
+          <a:blip r:embed="rId3"/>
+          <a:srcRect l="3566" r="779" b="2145"/>
+          <a:stretch/>
+        </p:blipFill>
+        <p:spPr>
+          <a:xfrm>
+            <a:off x="213361" y="785542"/>
+            <a:ext cx="5572606" cy="3679778"/>
+          </a:xfrm>
+          <a:prstGeom prst="rect">
+            <a:avLst/>
+          </a:prstGeom>
+        </p:spPr>
+      </p:pic>
+      <p:pic>
+        <p:nvPicPr>
+          <p:cNvPr id="8" name="Picture 7">
+            <a:extLst>
+              <a:ext uri="{FF2B5EF4-FFF2-40B4-BE49-F238E27FC236}">
+                <a16:creationId xmlns:a16="http://schemas.microsoft.com/office/drawing/2014/main" id="{38DE2BC1-888B-4C1D-978C-F6BB9FC303AD}"/>
+              </a:ext>
+            </a:extLst>
+          </p:cNvPr>
+          <p:cNvPicPr>
+            <a:picLocks noChangeAspect="1"/>
+          </p:cNvPicPr>
+          <p:nvPr/>
+        </p:nvPicPr>
+        <p:blipFill rotWithShape="1">
+          <a:blip r:embed="rId4"/>
+          <a:srcRect l="3903" b="10497"/>
+          <a:stretch/>
+        </p:blipFill>
+        <p:spPr>
+          <a:xfrm>
+            <a:off x="3656829" y="930609"/>
+            <a:ext cx="5181605" cy="783891"/>
+          </a:xfrm>
+          <a:prstGeom prst="rect">
+            <a:avLst/>
+          </a:prstGeom>
+        </p:spPr>
+      </p:pic>
+    </p:spTree>
+    <p:extLst>
+      <p:ext uri="{BB962C8B-B14F-4D97-AF65-F5344CB8AC3E}">
+        <p14:creationId xmlns:p14="http://schemas.microsoft.com/office/powerpoint/2010/main" val="2554116379"/>
+      </p:ext>
+    </p:extLst>
+  </p:cSld>
+  <p:clrMapOvr>
+    <a:masterClrMapping/>
+  </p:clrMapOvr>
+  <p:transition/>
+</p:sld>
+</file>
+
+<file path=ppt/slides/slide11.xml><?xml version="1.0" encoding="utf-8"?>
+<p:sld xmlns:a="http://schemas.openxmlformats.org/drawingml/2006/main" xmlns:r="http://schemas.openxmlformats.org/officeDocument/2006/relationships" xmlns:p="http://schemas.openxmlformats.org/presentationml/2006/main">
+  <p:cSld>
+    <p:spTree>
+      <p:nvGrpSpPr>
+        <p:cNvPr id="1" name=""/>
+        <p:cNvGrpSpPr/>
+        <p:nvPr/>
+      </p:nvGrpSpPr>
+      <p:grpSpPr>
+        <a:xfrm>
+          <a:off x="0" y="0"/>
+          <a:ext cx="0" cy="0"/>
+          <a:chOff x="0" y="0"/>
+          <a:chExt cx="0" cy="0"/>
+        </a:xfrm>
+      </p:grpSpPr>
+      <p:sp>
+        <p:nvSpPr>
+          <p:cNvPr id="5" name="Title 4"/>
+          <p:cNvSpPr>
+            <a:spLocks noGrp="1"/>
+          </p:cNvSpPr>
+          <p:nvPr>
+            <p:ph type="ctrTitle"/>
+          </p:nvPr>
+        </p:nvSpPr>
+        <p:spPr/>
+        <p:txBody>
+          <a:bodyPr/>
+          <a:lstStyle/>
+          <a:p>
+            <a:r>
+              <a:rPr lang="en-US" dirty="0"/>
+              <a:t>Interface Segregation Principle</a:t>
+            </a:r>
+          </a:p>
+        </p:txBody>
+      </p:sp>
+      <p:sp>
+        <p:nvSpPr>
+          <p:cNvPr id="2" name="Subtitle 1"/>
+          <p:cNvSpPr>
+            <a:spLocks noGrp="1"/>
+          </p:cNvSpPr>
+          <p:nvPr>
+            <p:ph type="subTitle" idx="1"/>
+          </p:nvPr>
+        </p:nvSpPr>
+        <p:spPr/>
+        <p:txBody>
+          <a:bodyPr/>
+          <a:lstStyle/>
+          <a:p>
+            <a:endParaRPr lang="en-US"/>
+          </a:p>
+        </p:txBody>
+      </p:sp>
+    </p:spTree>
+    <p:extLst>
+      <p:ext uri="{BB962C8B-B14F-4D97-AF65-F5344CB8AC3E}">
+        <p14:creationId xmlns:p14="http://schemas.microsoft.com/office/powerpoint/2010/main" val="1208709999"/>
+      </p:ext>
+    </p:extLst>
+  </p:cSld>
+  <p:clrMapOvr>
+    <a:masterClrMapping/>
+  </p:clrMapOvr>
+</p:sld>
+</file>
+
+<file path=ppt/slides/slide12.xml><?xml version="1.0" encoding="utf-8"?>
+<p:sld xmlns:a="http://schemas.openxmlformats.org/drawingml/2006/main" xmlns:r="http://schemas.openxmlformats.org/officeDocument/2006/relationships" xmlns:p="http://schemas.openxmlformats.org/presentationml/2006/main">
+  <p:cSld>
+    <p:spTree>
+      <p:nvGrpSpPr>
+        <p:cNvPr id="1" name=""/>
+        <p:cNvGrpSpPr/>
+        <p:nvPr/>
+      </p:nvGrpSpPr>
+      <p:grpSpPr>
+        <a:xfrm>
+          <a:off x="0" y="0"/>
+          <a:ext cx="0" cy="0"/>
+          <a:chOff x="0" y="0"/>
+          <a:chExt cx="0" cy="0"/>
+        </a:xfrm>
+      </p:grpSpPr>
+      <p:sp>
+        <p:nvSpPr>
+          <p:cNvPr id="7" name="Title 6"/>
+          <p:cNvSpPr>
+            <a:spLocks noGrp="1"/>
+          </p:cNvSpPr>
+          <p:nvPr>
+            <p:ph type="title"/>
+          </p:nvPr>
+        </p:nvSpPr>
+        <p:spPr/>
+        <p:txBody>
+          <a:bodyPr>
+            <a:normAutofit/>
+          </a:bodyPr>
+          <a:lstStyle/>
+          <a:p>
+            <a:r>
+              <a:rPr lang="en-US" dirty="0"/>
+              <a:t>Table Template</a:t>
+            </a:r>
+          </a:p>
+        </p:txBody>
+      </p:sp>
+      <p:pic>
+        <p:nvPicPr>
+          <p:cNvPr id="4" name="Table Placeholder 3">
+            <a:extLst>
+              <a:ext uri="{FF2B5EF4-FFF2-40B4-BE49-F238E27FC236}">
+                <a16:creationId xmlns:a16="http://schemas.microsoft.com/office/drawing/2014/main" id="{7251BB10-3C27-4984-9FFF-8F1DF524CF83}"/>
+              </a:ext>
+            </a:extLst>
+          </p:cNvPr>
+          <p:cNvPicPr>
+            <a:picLocks noGrp="1" noChangeAspect="1"/>
+          </p:cNvPicPr>
+          <p:nvPr>
+            <p:ph type="tbl" sz="quarter" idx="10"/>
+          </p:nvPr>
+        </p:nvPicPr>
+        <p:blipFill>
+          <a:blip r:embed="rId3">
+            <a:extLst>
+              <a:ext uri="{28A0092B-C50C-407E-A947-70E740481C1C}">
+                <a14:useLocalDpi xmlns:a14="http://schemas.microsoft.com/office/drawing/2010/main" val="0"/>
+              </a:ext>
+            </a:extLst>
+          </a:blip>
+          <a:stretch>
+            <a:fillRect/>
+          </a:stretch>
+        </p:blipFill>
+        <p:spPr>
+          <a:xfrm>
+            <a:off x="1361258" y="769694"/>
+            <a:ext cx="6421483" cy="3604111"/>
+          </a:xfrm>
+          <a:prstGeom prst="rect">
+            <a:avLst/>
+          </a:prstGeom>
+        </p:spPr>
+      </p:pic>
+    </p:spTree>
+    <p:extLst>
+      <p:ext uri="{BB962C8B-B14F-4D97-AF65-F5344CB8AC3E}">
+        <p14:creationId xmlns:p14="http://schemas.microsoft.com/office/powerpoint/2010/main" val="1416018687"/>
+      </p:ext>
+    </p:extLst>
+  </p:cSld>
+  <p:clrMapOvr>
+    <a:masterClrMapping/>
+  </p:clrMapOvr>
+  <p:transition/>
+</p:sld>
+</file>
+
+<file path=ppt/slides/slide13.xml><?xml version="1.0" encoding="utf-8"?>
+<p:sld xmlns:a="http://schemas.openxmlformats.org/drawingml/2006/main" xmlns:r="http://schemas.openxmlformats.org/officeDocument/2006/relationships" xmlns:p="http://schemas.openxmlformats.org/presentationml/2006/main">
+  <p:cSld>
+    <p:spTree>
+      <p:nvGrpSpPr>
+        <p:cNvPr id="1" name=""/>
+        <p:cNvGrpSpPr/>
+        <p:nvPr/>
+      </p:nvGrpSpPr>
+      <p:grpSpPr>
+        <a:xfrm>
+          <a:off x="0" y="0"/>
+          <a:ext cx="0" cy="0"/>
+          <a:chOff x="0" y="0"/>
+          <a:chExt cx="0" cy="0"/>
+        </a:xfrm>
+      </p:grpSpPr>
+      <p:sp>
+        <p:nvSpPr>
+          <p:cNvPr id="7" name="Title 6"/>
+          <p:cNvSpPr>
+            <a:spLocks noGrp="1"/>
+          </p:cNvSpPr>
+          <p:nvPr>
+            <p:ph type="title"/>
+          </p:nvPr>
+        </p:nvSpPr>
+        <p:spPr/>
+        <p:txBody>
+          <a:bodyPr>
+            <a:normAutofit/>
+          </a:bodyPr>
+          <a:lstStyle/>
+          <a:p>
+            <a:r>
+              <a:rPr lang="en-US" dirty="0"/>
+              <a:t>Table Template</a:t>
+            </a:r>
+          </a:p>
+        </p:txBody>
+      </p:sp>
+      <p:pic>
+        <p:nvPicPr>
+          <p:cNvPr id="5" name="Content Placeholder 4">
+            <a:extLst>
+              <a:ext uri="{FF2B5EF4-FFF2-40B4-BE49-F238E27FC236}">
+                <a16:creationId xmlns:a16="http://schemas.microsoft.com/office/drawing/2014/main" id="{598E0D7C-7D8C-474A-8738-092DFDE2D4D3}"/>
+              </a:ext>
+            </a:extLst>
+          </p:cNvPr>
+          <p:cNvPicPr>
+            <a:picLocks noGrp="1" noChangeAspect="1"/>
+          </p:cNvPicPr>
+          <p:nvPr>
+            <p:ph type="tbl" sz="quarter" idx="10"/>
+          </p:nvPr>
+        </p:nvPicPr>
+        <p:blipFill>
+          <a:blip r:embed="rId3">
+            <a:extLst>
+              <a:ext uri="{28A0092B-C50C-407E-A947-70E740481C1C}">
+                <a14:useLocalDpi xmlns:a14="http://schemas.microsoft.com/office/drawing/2010/main" val="0"/>
+              </a:ext>
+            </a:extLst>
+          </a:blip>
+          <a:stretch>
+            <a:fillRect/>
+          </a:stretch>
+        </p:blipFill>
+        <p:spPr>
+          <a:xfrm>
+            <a:off x="1511558" y="769694"/>
+            <a:ext cx="6088995" cy="3604111"/>
+          </a:xfrm>
+        </p:spPr>
+      </p:pic>
+    </p:spTree>
+    <p:extLst>
+      <p:ext uri="{BB962C8B-B14F-4D97-AF65-F5344CB8AC3E}">
+        <p14:creationId xmlns:p14="http://schemas.microsoft.com/office/powerpoint/2010/main" val="2127335829"/>
+      </p:ext>
+    </p:extLst>
+  </p:cSld>
+  <p:clrMapOvr>
+    <a:masterClrMapping/>
+  </p:clrMapOvr>
+  <p:transition/>
+</p:sld>
+</file>
+
+<file path=ppt/slides/slide14.xml><?xml version="1.0" encoding="utf-8"?>
+<p:sld xmlns:a="http://schemas.openxmlformats.org/drawingml/2006/main" xmlns:r="http://schemas.openxmlformats.org/officeDocument/2006/relationships" xmlns:p="http://schemas.openxmlformats.org/presentationml/2006/main">
+  <p:cSld>
+    <p:spTree>
+      <p:nvGrpSpPr>
+        <p:cNvPr id="1" name=""/>
+        <p:cNvGrpSpPr/>
+        <p:nvPr/>
+      </p:nvGrpSpPr>
+      <p:grpSpPr>
+        <a:xfrm>
+          <a:off x="0" y="0"/>
+          <a:ext cx="0" cy="0"/>
+          <a:chOff x="0" y="0"/>
+          <a:chExt cx="0" cy="0"/>
+        </a:xfrm>
+      </p:grpSpPr>
+      <p:sp>
+        <p:nvSpPr>
+          <p:cNvPr id="7" name="Title 6"/>
+          <p:cNvSpPr>
+            <a:spLocks noGrp="1"/>
+          </p:cNvSpPr>
+          <p:nvPr>
+            <p:ph type="title"/>
+          </p:nvPr>
+        </p:nvSpPr>
+        <p:spPr/>
+        <p:txBody>
+          <a:bodyPr>
+            <a:normAutofit/>
+          </a:bodyPr>
+          <a:lstStyle/>
+          <a:p>
+            <a:r>
+              <a:rPr lang="en-US" dirty="0"/>
+              <a:t>Table Template</a:t>
+            </a:r>
+          </a:p>
+        </p:txBody>
+      </p:sp>
+      <p:pic>
+        <p:nvPicPr>
+          <p:cNvPr id="4" name="Content Placeholder 8">
+            <a:extLst>
+              <a:ext uri="{FF2B5EF4-FFF2-40B4-BE49-F238E27FC236}">
+                <a16:creationId xmlns:a16="http://schemas.microsoft.com/office/drawing/2014/main" id="{7115BBD6-C922-4C23-B0CD-4D0FBE13E47D}"/>
+              </a:ext>
+            </a:extLst>
+          </p:cNvPr>
+          <p:cNvPicPr>
+            <a:picLocks noGrp="1" noChangeAspect="1"/>
+          </p:cNvPicPr>
+          <p:nvPr>
+            <p:ph type="tbl" sz="quarter" idx="10"/>
+          </p:nvPr>
+        </p:nvPicPr>
+        <p:blipFill>
+          <a:blip r:embed="rId3">
+            <a:extLst>
+              <a:ext uri="{28A0092B-C50C-407E-A947-70E740481C1C}">
+                <a14:useLocalDpi xmlns:a14="http://schemas.microsoft.com/office/drawing/2010/main" val="0"/>
+              </a:ext>
+            </a:extLst>
+          </a:blip>
+          <a:stretch>
+            <a:fillRect/>
+          </a:stretch>
+        </p:blipFill>
+        <p:spPr>
+          <a:xfrm>
+            <a:off x="988805" y="1331652"/>
+            <a:ext cx="7166390" cy="2480195"/>
+          </a:xfrm>
+        </p:spPr>
+      </p:pic>
+    </p:spTree>
+    <p:extLst>
+      <p:ext uri="{BB962C8B-B14F-4D97-AF65-F5344CB8AC3E}">
+        <p14:creationId xmlns:p14="http://schemas.microsoft.com/office/powerpoint/2010/main" val="1238750147"/>
+      </p:ext>
+    </p:extLst>
+  </p:cSld>
+  <p:clrMapOvr>
+    <a:masterClrMapping/>
+  </p:clrMapOvr>
+  <p:transition/>
+</p:sld>
+</file>
+
+<file path=ppt/slides/slide15.xml><?xml version="1.0" encoding="utf-8"?>
+<p:sld xmlns:a="http://schemas.openxmlformats.org/drawingml/2006/main" xmlns:r="http://schemas.openxmlformats.org/officeDocument/2006/relationships" xmlns:p="http://schemas.openxmlformats.org/presentationml/2006/main">
+  <p:cSld>
+    <p:spTree>
+      <p:nvGrpSpPr>
+        <p:cNvPr id="1" name=""/>
+        <p:cNvGrpSpPr/>
+        <p:nvPr/>
+      </p:nvGrpSpPr>
+      <p:grpSpPr>
+        <a:xfrm>
+          <a:off x="0" y="0"/>
+          <a:ext cx="0" cy="0"/>
+          <a:chOff x="0" y="0"/>
+          <a:chExt cx="0" cy="0"/>
+        </a:xfrm>
+      </p:grpSpPr>
+      <p:sp>
+        <p:nvSpPr>
+          <p:cNvPr id="7" name="Title 6"/>
+          <p:cNvSpPr>
+            <a:spLocks noGrp="1"/>
+          </p:cNvSpPr>
+          <p:nvPr>
+            <p:ph type="title"/>
+          </p:nvPr>
+        </p:nvSpPr>
+        <p:spPr/>
+        <p:txBody>
+          <a:bodyPr>
+            <a:normAutofit/>
+          </a:bodyPr>
+          <a:lstStyle/>
+          <a:p>
+            <a:r>
+              <a:rPr lang="en-US" dirty="0"/>
+              <a:t>Table Template</a:t>
+            </a:r>
+          </a:p>
+        </p:txBody>
+      </p:sp>
+      <p:pic>
+        <p:nvPicPr>
+          <p:cNvPr id="4" name="Content Placeholder 4">
+            <a:extLst>
+              <a:ext uri="{FF2B5EF4-FFF2-40B4-BE49-F238E27FC236}">
+                <a16:creationId xmlns:a16="http://schemas.microsoft.com/office/drawing/2014/main" id="{1365DBC1-5C66-4244-9062-62C7641ED150}"/>
+              </a:ext>
+            </a:extLst>
+          </p:cNvPr>
+          <p:cNvPicPr>
+            <a:picLocks noGrp="1" noChangeAspect="1"/>
+          </p:cNvPicPr>
+          <p:nvPr>
+            <p:ph type="tbl" sz="quarter" idx="10"/>
+          </p:nvPr>
+        </p:nvPicPr>
+        <p:blipFill>
+          <a:blip r:embed="rId3">
+            <a:extLst>
+              <a:ext uri="{28A0092B-C50C-407E-A947-70E740481C1C}">
+                <a14:useLocalDpi xmlns:a14="http://schemas.microsoft.com/office/drawing/2010/main" val="0"/>
+              </a:ext>
+            </a:extLst>
+          </a:blip>
+          <a:stretch>
+            <a:fillRect/>
+          </a:stretch>
+        </p:blipFill>
+        <p:spPr>
+          <a:xfrm>
+            <a:off x="1142237" y="1208181"/>
+            <a:ext cx="6859525" cy="2727137"/>
+          </a:xfrm>
+        </p:spPr>
+      </p:pic>
+    </p:spTree>
+    <p:extLst>
+      <p:ext uri="{BB962C8B-B14F-4D97-AF65-F5344CB8AC3E}">
+        <p14:creationId xmlns:p14="http://schemas.microsoft.com/office/powerpoint/2010/main" val="2237112805"/>
+      </p:ext>
+    </p:extLst>
+  </p:cSld>
+  <p:clrMapOvr>
+    <a:masterClrMapping/>
+  </p:clrMapOvr>
+  <p:transition/>
+</p:sld>
+</file>
+
+<file path=ppt/slides/slide16.xml><?xml version="1.0" encoding="utf-8"?>
+<p:sld xmlns:a="http://schemas.openxmlformats.org/drawingml/2006/main" xmlns:r="http://schemas.openxmlformats.org/officeDocument/2006/relationships" xmlns:p="http://schemas.openxmlformats.org/presentationml/2006/main">
+  <p:cSld>
+    <p:spTree>
+      <p:nvGrpSpPr>
+        <p:cNvPr id="1" name=""/>
+        <p:cNvGrpSpPr/>
+        <p:nvPr/>
+      </p:nvGrpSpPr>
+      <p:grpSpPr>
+        <a:xfrm>
+          <a:off x="0" y="0"/>
+          <a:ext cx="0" cy="0"/>
+          <a:chOff x="0" y="0"/>
+          <a:chExt cx="0" cy="0"/>
+        </a:xfrm>
+      </p:grpSpPr>
+      <p:sp>
+        <p:nvSpPr>
+          <p:cNvPr id="5" name="Title 4"/>
+          <p:cNvSpPr>
+            <a:spLocks noGrp="1"/>
+          </p:cNvSpPr>
+          <p:nvPr>
+            <p:ph type="ctrTitle"/>
+          </p:nvPr>
+        </p:nvSpPr>
+        <p:spPr/>
+        <p:txBody>
+          <a:bodyPr/>
+          <a:lstStyle/>
+          <a:p>
+            <a:r>
+              <a:rPr lang="en-US" dirty="0"/>
+              <a:t>Dependency Inversion Principle</a:t>
+            </a:r>
+          </a:p>
+        </p:txBody>
+      </p:sp>
+      <p:sp>
+        <p:nvSpPr>
+          <p:cNvPr id="2" name="Subtitle 1"/>
+          <p:cNvSpPr>
+            <a:spLocks noGrp="1"/>
+          </p:cNvSpPr>
+          <p:nvPr>
+            <p:ph type="subTitle" idx="1"/>
+          </p:nvPr>
+        </p:nvSpPr>
+        <p:spPr/>
+        <p:txBody>
+          <a:bodyPr/>
+          <a:lstStyle/>
+          <a:p>
+            <a:endParaRPr lang="en-US" dirty="0"/>
+          </a:p>
+        </p:txBody>
+      </p:sp>
+    </p:spTree>
+    <p:extLst>
+      <p:ext uri="{BB962C8B-B14F-4D97-AF65-F5344CB8AC3E}">
+        <p14:creationId xmlns:p14="http://schemas.microsoft.com/office/powerpoint/2010/main" val="3927301540"/>
+      </p:ext>
+    </p:extLst>
+  </p:cSld>
+  <p:clrMapOvr>
+    <a:masterClrMapping/>
+  </p:clrMapOvr>
+</p:sld>
+</file>
+
 <file path=ppt/slides/slide2.xml><?xml version="1.0" encoding="utf-8"?>
 <p:sld xmlns:a="http://schemas.openxmlformats.org/drawingml/2006/main" xmlns:r="http://schemas.openxmlformats.org/officeDocument/2006/relationships" xmlns:p="http://schemas.openxmlformats.org/presentationml/2006/main">
   <p:cSld>
@@ -9184,7 +10319,7 @@
           <a:p>
             <a:r>
               <a:rPr lang="en-US" dirty="0"/>
-              <a:t>Open-Closed Principle</a:t>
+              <a:t>Single Responsibility Principle</a:t>
             </a:r>
           </a:p>
         </p:txBody>
@@ -9209,6 +10344,11 @@
         </p:txBody>
       </p:sp>
     </p:spTree>
+    <p:extLst>
+      <p:ext uri="{BB962C8B-B14F-4D97-AF65-F5344CB8AC3E}">
+        <p14:creationId xmlns:p14="http://schemas.microsoft.com/office/powerpoint/2010/main" val="2342469114"/>
+      </p:ext>
+    </p:extLst>
   </p:cSld>
   <p:clrMapOvr>
     <a:masterClrMapping/>
@@ -9217,6 +10357,247 @@
 </file>
 
 <file path=ppt/slides/slide3.xml><?xml version="1.0" encoding="utf-8"?>
+<p:sld xmlns:a="http://schemas.openxmlformats.org/drawingml/2006/main" xmlns:r="http://schemas.openxmlformats.org/officeDocument/2006/relationships" xmlns:p="http://schemas.openxmlformats.org/presentationml/2006/main">
+  <p:cSld>
+    <p:spTree>
+      <p:nvGrpSpPr>
+        <p:cNvPr id="1" name=""/>
+        <p:cNvGrpSpPr/>
+        <p:nvPr/>
+      </p:nvGrpSpPr>
+      <p:grpSpPr>
+        <a:xfrm>
+          <a:off x="0" y="0"/>
+          <a:ext cx="0" cy="0"/>
+          <a:chOff x="0" y="0"/>
+          <a:chExt cx="0" cy="0"/>
+        </a:xfrm>
+      </p:grpSpPr>
+      <p:sp>
+        <p:nvSpPr>
+          <p:cNvPr id="7" name="Title 6"/>
+          <p:cNvSpPr>
+            <a:spLocks noGrp="1"/>
+          </p:cNvSpPr>
+          <p:nvPr>
+            <p:ph type="title"/>
+          </p:nvPr>
+        </p:nvSpPr>
+        <p:spPr/>
+        <p:txBody>
+          <a:bodyPr>
+            <a:normAutofit/>
+          </a:bodyPr>
+          <a:lstStyle/>
+          <a:p>
+            <a:r>
+              <a:rPr lang="en-US" dirty="0"/>
+              <a:t>Bad Soccer Player</a:t>
+            </a:r>
+          </a:p>
+        </p:txBody>
+      </p:sp>
+      <p:pic>
+        <p:nvPicPr>
+          <p:cNvPr id="8" name="Picture 7">
+            <a:extLst>
+              <a:ext uri="{FF2B5EF4-FFF2-40B4-BE49-F238E27FC236}">
+                <a16:creationId xmlns:a16="http://schemas.microsoft.com/office/drawing/2014/main" id="{A04A4EC0-27E5-4951-B5A8-D0E001C8F38E}"/>
+              </a:ext>
+            </a:extLst>
+          </p:cNvPr>
+          <p:cNvPicPr>
+            <a:picLocks noChangeAspect="1"/>
+          </p:cNvPicPr>
+          <p:nvPr/>
+        </p:nvPicPr>
+        <p:blipFill>
+          <a:blip r:embed="rId3"/>
+          <a:stretch>
+            <a:fillRect/>
+          </a:stretch>
+        </p:blipFill>
+        <p:spPr>
+          <a:xfrm>
+            <a:off x="1050917" y="719045"/>
+            <a:ext cx="6546223" cy="3705409"/>
+          </a:xfrm>
+          <a:prstGeom prst="rect">
+            <a:avLst/>
+          </a:prstGeom>
+        </p:spPr>
+      </p:pic>
+    </p:spTree>
+    <p:extLst>
+      <p:ext uri="{BB962C8B-B14F-4D97-AF65-F5344CB8AC3E}">
+        <p14:creationId xmlns:p14="http://schemas.microsoft.com/office/powerpoint/2010/main" val="409676806"/>
+      </p:ext>
+    </p:extLst>
+  </p:cSld>
+  <p:clrMapOvr>
+    <a:masterClrMapping/>
+  </p:clrMapOvr>
+  <p:transition/>
+</p:sld>
+</file>
+
+<file path=ppt/slides/slide4.xml><?xml version="1.0" encoding="utf-8"?>
+<p:sld xmlns:a="http://schemas.openxmlformats.org/drawingml/2006/main" xmlns:r="http://schemas.openxmlformats.org/officeDocument/2006/relationships" xmlns:p="http://schemas.openxmlformats.org/presentationml/2006/main">
+  <p:cSld>
+    <p:spTree>
+      <p:nvGrpSpPr>
+        <p:cNvPr id="1" name=""/>
+        <p:cNvGrpSpPr/>
+        <p:nvPr/>
+      </p:nvGrpSpPr>
+      <p:grpSpPr>
+        <a:xfrm>
+          <a:off x="0" y="0"/>
+          <a:ext cx="0" cy="0"/>
+          <a:chOff x="0" y="0"/>
+          <a:chExt cx="0" cy="0"/>
+        </a:xfrm>
+      </p:grpSpPr>
+      <p:sp>
+        <p:nvSpPr>
+          <p:cNvPr id="7" name="Title 6"/>
+          <p:cNvSpPr>
+            <a:spLocks noGrp="1"/>
+          </p:cNvSpPr>
+          <p:nvPr>
+            <p:ph type="title"/>
+          </p:nvPr>
+        </p:nvSpPr>
+        <p:spPr/>
+        <p:txBody>
+          <a:bodyPr>
+            <a:normAutofit/>
+          </a:bodyPr>
+          <a:lstStyle/>
+          <a:p>
+            <a:r>
+              <a:rPr lang="en-US" dirty="0"/>
+              <a:t>Bad Soccer Player</a:t>
+            </a:r>
+          </a:p>
+        </p:txBody>
+      </p:sp>
+      <p:pic>
+        <p:nvPicPr>
+          <p:cNvPr id="3" name="Picture 2">
+            <a:extLst>
+              <a:ext uri="{FF2B5EF4-FFF2-40B4-BE49-F238E27FC236}">
+                <a16:creationId xmlns:a16="http://schemas.microsoft.com/office/drawing/2014/main" id="{25E8393C-792B-45B1-8C3F-0567367C43C6}"/>
+              </a:ext>
+            </a:extLst>
+          </p:cNvPr>
+          <p:cNvPicPr>
+            <a:picLocks noChangeAspect="1"/>
+          </p:cNvPicPr>
+          <p:nvPr/>
+        </p:nvPicPr>
+        <p:blipFill>
+          <a:blip r:embed="rId3"/>
+          <a:stretch>
+            <a:fillRect/>
+          </a:stretch>
+        </p:blipFill>
+        <p:spPr>
+          <a:xfrm>
+            <a:off x="428046" y="695063"/>
+            <a:ext cx="8287907" cy="3753374"/>
+          </a:xfrm>
+          <a:prstGeom prst="rect">
+            <a:avLst/>
+          </a:prstGeom>
+        </p:spPr>
+      </p:pic>
+    </p:spTree>
+    <p:extLst>
+      <p:ext uri="{BB962C8B-B14F-4D97-AF65-F5344CB8AC3E}">
+        <p14:creationId xmlns:p14="http://schemas.microsoft.com/office/powerpoint/2010/main" val="2912219046"/>
+      </p:ext>
+    </p:extLst>
+  </p:cSld>
+  <p:clrMapOvr>
+    <a:masterClrMapping/>
+  </p:clrMapOvr>
+  <p:transition/>
+</p:sld>
+</file>
+
+<file path=ppt/slides/slide5.xml><?xml version="1.0" encoding="utf-8"?>
+<p:sld xmlns:a="http://schemas.openxmlformats.org/drawingml/2006/main" xmlns:r="http://schemas.openxmlformats.org/officeDocument/2006/relationships" xmlns:p="http://schemas.openxmlformats.org/presentationml/2006/main">
+  <p:cSld>
+    <p:spTree>
+      <p:nvGrpSpPr>
+        <p:cNvPr id="1" name=""/>
+        <p:cNvGrpSpPr/>
+        <p:nvPr/>
+      </p:nvGrpSpPr>
+      <p:grpSpPr>
+        <a:xfrm>
+          <a:off x="0" y="0"/>
+          <a:ext cx="0" cy="0"/>
+          <a:chOff x="0" y="0"/>
+          <a:chExt cx="0" cy="0"/>
+        </a:xfrm>
+      </p:grpSpPr>
+      <p:sp>
+        <p:nvSpPr>
+          <p:cNvPr id="5" name="Title 4"/>
+          <p:cNvSpPr>
+            <a:spLocks noGrp="1"/>
+          </p:cNvSpPr>
+          <p:nvPr>
+            <p:ph type="ctrTitle"/>
+          </p:nvPr>
+        </p:nvSpPr>
+        <p:spPr/>
+        <p:txBody>
+          <a:bodyPr/>
+          <a:lstStyle/>
+          <a:p>
+            <a:r>
+              <a:rPr lang="en-US" dirty="0"/>
+              <a:t>Open-Closed Principle</a:t>
+            </a:r>
+          </a:p>
+        </p:txBody>
+      </p:sp>
+      <p:sp>
+        <p:nvSpPr>
+          <p:cNvPr id="2" name="Subtitle 1"/>
+          <p:cNvSpPr>
+            <a:spLocks noGrp="1"/>
+          </p:cNvSpPr>
+          <p:nvPr>
+            <p:ph type="subTitle" idx="1"/>
+          </p:nvPr>
+        </p:nvSpPr>
+        <p:spPr/>
+        <p:txBody>
+          <a:bodyPr/>
+          <a:lstStyle/>
+          <a:p>
+            <a:endParaRPr lang="en-US" dirty="0"/>
+          </a:p>
+        </p:txBody>
+      </p:sp>
+    </p:spTree>
+    <p:extLst>
+      <p:ext uri="{BB962C8B-B14F-4D97-AF65-F5344CB8AC3E}">
+        <p14:creationId xmlns:p14="http://schemas.microsoft.com/office/powerpoint/2010/main" val="2605682236"/>
+      </p:ext>
+    </p:extLst>
+  </p:cSld>
+  <p:clrMapOvr>
+    <a:masterClrMapping/>
+  </p:clrMapOvr>
+</p:sld>
+</file>
+
+<file path=ppt/slides/slide6.xml><?xml version="1.0" encoding="utf-8"?>
 <p:sld xmlns:a="http://schemas.openxmlformats.org/drawingml/2006/main" xmlns:r="http://schemas.openxmlformats.org/officeDocument/2006/relationships" xmlns:p="http://schemas.openxmlformats.org/presentationml/2006/main">
   <p:cSld>
     <p:spTree>
@@ -9309,7 +10690,7 @@
 </p:sld>
 </file>
 
-<file path=ppt/slides/slide4.xml><?xml version="1.0" encoding="utf-8"?>
+<file path=ppt/slides/slide7.xml><?xml version="1.0" encoding="utf-8"?>
 <p:sld xmlns:a="http://schemas.openxmlformats.org/drawingml/2006/main" xmlns:r="http://schemas.openxmlformats.org/officeDocument/2006/relationships" xmlns:p="http://schemas.openxmlformats.org/presentationml/2006/main">
   <p:cSld>
     <p:spTree>
@@ -9418,260 +10799,6 @@
 </p:sld>
 </file>
 
-<file path=ppt/slides/slide5.xml><?xml version="1.0" encoding="utf-8"?>
-<p:sld xmlns:a="http://schemas.openxmlformats.org/drawingml/2006/main" xmlns:r="http://schemas.openxmlformats.org/officeDocument/2006/relationships" xmlns:p="http://schemas.openxmlformats.org/presentationml/2006/main">
-  <p:cSld>
-    <p:spTree>
-      <p:nvGrpSpPr>
-        <p:cNvPr id="1" name=""/>
-        <p:cNvGrpSpPr/>
-        <p:nvPr/>
-      </p:nvGrpSpPr>
-      <p:grpSpPr>
-        <a:xfrm>
-          <a:off x="0" y="0"/>
-          <a:ext cx="0" cy="0"/>
-          <a:chOff x="0" y="0"/>
-          <a:chExt cx="0" cy="0"/>
-        </a:xfrm>
-      </p:grpSpPr>
-      <p:sp>
-        <p:nvSpPr>
-          <p:cNvPr id="5" name="Title 4"/>
-          <p:cNvSpPr>
-            <a:spLocks noGrp="1"/>
-          </p:cNvSpPr>
-          <p:nvPr>
-            <p:ph type="ctrTitle"/>
-          </p:nvPr>
-        </p:nvSpPr>
-        <p:spPr/>
-        <p:txBody>
-          <a:bodyPr/>
-          <a:lstStyle/>
-          <a:p>
-            <a:r>
-              <a:rPr lang="en-US" dirty="0"/>
-              <a:t>Interface Segregation Principle</a:t>
-            </a:r>
-          </a:p>
-        </p:txBody>
-      </p:sp>
-      <p:sp>
-        <p:nvSpPr>
-          <p:cNvPr id="2" name="Subtitle 1"/>
-          <p:cNvSpPr>
-            <a:spLocks noGrp="1"/>
-          </p:cNvSpPr>
-          <p:nvPr>
-            <p:ph type="subTitle" idx="1"/>
-          </p:nvPr>
-        </p:nvSpPr>
-        <p:spPr/>
-        <p:txBody>
-          <a:bodyPr/>
-          <a:lstStyle/>
-          <a:p>
-            <a:endParaRPr lang="en-US"/>
-          </a:p>
-        </p:txBody>
-      </p:sp>
-    </p:spTree>
-    <p:extLst>
-      <p:ext uri="{BB962C8B-B14F-4D97-AF65-F5344CB8AC3E}">
-        <p14:creationId xmlns:p14="http://schemas.microsoft.com/office/powerpoint/2010/main" val="1208709999"/>
-      </p:ext>
-    </p:extLst>
-  </p:cSld>
-  <p:clrMapOvr>
-    <a:masterClrMapping/>
-  </p:clrMapOvr>
-</p:sld>
-</file>
-
-<file path=ppt/slides/slide6.xml><?xml version="1.0" encoding="utf-8"?>
-<p:sld xmlns:a="http://schemas.openxmlformats.org/drawingml/2006/main" xmlns:r="http://schemas.openxmlformats.org/officeDocument/2006/relationships" xmlns:p="http://schemas.openxmlformats.org/presentationml/2006/main">
-  <p:cSld>
-    <p:spTree>
-      <p:nvGrpSpPr>
-        <p:cNvPr id="1" name=""/>
-        <p:cNvGrpSpPr/>
-        <p:nvPr/>
-      </p:nvGrpSpPr>
-      <p:grpSpPr>
-        <a:xfrm>
-          <a:off x="0" y="0"/>
-          <a:ext cx="0" cy="0"/>
-          <a:chOff x="0" y="0"/>
-          <a:chExt cx="0" cy="0"/>
-        </a:xfrm>
-      </p:grpSpPr>
-      <p:sp>
-        <p:nvSpPr>
-          <p:cNvPr id="7" name="Title 6"/>
-          <p:cNvSpPr>
-            <a:spLocks noGrp="1"/>
-          </p:cNvSpPr>
-          <p:nvPr>
-            <p:ph type="title"/>
-          </p:nvPr>
-        </p:nvSpPr>
-        <p:spPr/>
-        <p:txBody>
-          <a:bodyPr>
-            <a:normAutofit/>
-          </a:bodyPr>
-          <a:lstStyle/>
-          <a:p>
-            <a:r>
-              <a:rPr lang="en-US" dirty="0"/>
-              <a:t>Table Template</a:t>
-            </a:r>
-          </a:p>
-        </p:txBody>
-      </p:sp>
-      <p:pic>
-        <p:nvPicPr>
-          <p:cNvPr id="4" name="Table Placeholder 3">
-            <a:extLst>
-              <a:ext uri="{FF2B5EF4-FFF2-40B4-BE49-F238E27FC236}">
-                <a16:creationId xmlns:a16="http://schemas.microsoft.com/office/drawing/2014/main" id="{7251BB10-3C27-4984-9FFF-8F1DF524CF83}"/>
-              </a:ext>
-            </a:extLst>
-          </p:cNvPr>
-          <p:cNvPicPr>
-            <a:picLocks noGrp="1" noChangeAspect="1"/>
-          </p:cNvPicPr>
-          <p:nvPr>
-            <p:ph type="tbl" sz="quarter" idx="10"/>
-          </p:nvPr>
-        </p:nvPicPr>
-        <p:blipFill>
-          <a:blip r:embed="rId3">
-            <a:extLst>
-              <a:ext uri="{28A0092B-C50C-407E-A947-70E740481C1C}">
-                <a14:useLocalDpi xmlns:a14="http://schemas.microsoft.com/office/drawing/2010/main" val="0"/>
-              </a:ext>
-            </a:extLst>
-          </a:blip>
-          <a:stretch>
-            <a:fillRect/>
-          </a:stretch>
-        </p:blipFill>
-        <p:spPr>
-          <a:xfrm>
-            <a:off x="1361258" y="769694"/>
-            <a:ext cx="6421483" cy="3604111"/>
-          </a:xfrm>
-          <a:prstGeom prst="rect">
-            <a:avLst/>
-          </a:prstGeom>
-        </p:spPr>
-      </p:pic>
-    </p:spTree>
-    <p:extLst>
-      <p:ext uri="{BB962C8B-B14F-4D97-AF65-F5344CB8AC3E}">
-        <p14:creationId xmlns:p14="http://schemas.microsoft.com/office/powerpoint/2010/main" val="1416018687"/>
-      </p:ext>
-    </p:extLst>
-  </p:cSld>
-  <p:clrMapOvr>
-    <a:masterClrMapping/>
-  </p:clrMapOvr>
-  <p:transition/>
-</p:sld>
-</file>
-
-<file path=ppt/slides/slide7.xml><?xml version="1.0" encoding="utf-8"?>
-<p:sld xmlns:a="http://schemas.openxmlformats.org/drawingml/2006/main" xmlns:r="http://schemas.openxmlformats.org/officeDocument/2006/relationships" xmlns:p="http://schemas.openxmlformats.org/presentationml/2006/main">
-  <p:cSld>
-    <p:spTree>
-      <p:nvGrpSpPr>
-        <p:cNvPr id="1" name=""/>
-        <p:cNvGrpSpPr/>
-        <p:nvPr/>
-      </p:nvGrpSpPr>
-      <p:grpSpPr>
-        <a:xfrm>
-          <a:off x="0" y="0"/>
-          <a:ext cx="0" cy="0"/>
-          <a:chOff x="0" y="0"/>
-          <a:chExt cx="0" cy="0"/>
-        </a:xfrm>
-      </p:grpSpPr>
-      <p:sp>
-        <p:nvSpPr>
-          <p:cNvPr id="7" name="Title 6"/>
-          <p:cNvSpPr>
-            <a:spLocks noGrp="1"/>
-          </p:cNvSpPr>
-          <p:nvPr>
-            <p:ph type="title"/>
-          </p:nvPr>
-        </p:nvSpPr>
-        <p:spPr/>
-        <p:txBody>
-          <a:bodyPr>
-            <a:normAutofit/>
-          </a:bodyPr>
-          <a:lstStyle/>
-          <a:p>
-            <a:r>
-              <a:rPr lang="en-US" dirty="0"/>
-              <a:t>Table Template</a:t>
-            </a:r>
-          </a:p>
-        </p:txBody>
-      </p:sp>
-      <p:pic>
-        <p:nvPicPr>
-          <p:cNvPr id="5" name="Content Placeholder 4">
-            <a:extLst>
-              <a:ext uri="{FF2B5EF4-FFF2-40B4-BE49-F238E27FC236}">
-                <a16:creationId xmlns:a16="http://schemas.microsoft.com/office/drawing/2014/main" id="{598E0D7C-7D8C-474A-8738-092DFDE2D4D3}"/>
-              </a:ext>
-            </a:extLst>
-          </p:cNvPr>
-          <p:cNvPicPr>
-            <a:picLocks noGrp="1" noChangeAspect="1"/>
-          </p:cNvPicPr>
-          <p:nvPr>
-            <p:ph type="tbl" sz="quarter" idx="10"/>
-          </p:nvPr>
-        </p:nvPicPr>
-        <p:blipFill>
-          <a:blip r:embed="rId3">
-            <a:extLst>
-              <a:ext uri="{28A0092B-C50C-407E-A947-70E740481C1C}">
-                <a14:useLocalDpi xmlns:a14="http://schemas.microsoft.com/office/drawing/2010/main" val="0"/>
-              </a:ext>
-            </a:extLst>
-          </a:blip>
-          <a:stretch>
-            <a:fillRect/>
-          </a:stretch>
-        </p:blipFill>
-        <p:spPr>
-          <a:xfrm>
-            <a:off x="1511558" y="769694"/>
-            <a:ext cx="6088995" cy="3604111"/>
-          </a:xfrm>
-        </p:spPr>
-      </p:pic>
-    </p:spTree>
-    <p:extLst>
-      <p:ext uri="{BB962C8B-B14F-4D97-AF65-F5344CB8AC3E}">
-        <p14:creationId xmlns:p14="http://schemas.microsoft.com/office/powerpoint/2010/main" val="2127335829"/>
-      </p:ext>
-    </p:extLst>
-  </p:cSld>
-  <p:clrMapOvr>
-    <a:masterClrMapping/>
-  </p:clrMapOvr>
-  <p:transition/>
-</p:sld>
-</file>
-
 <file path=ppt/slides/slide8.xml><?xml version="1.0" encoding="utf-8"?>
 <p:sld xmlns:a="http://schemas.openxmlformats.org/drawingml/2006/main" xmlns:r="http://schemas.openxmlformats.org/officeDocument/2006/relationships" xmlns:p="http://schemas.openxmlformats.org/presentationml/2006/main">
   <p:cSld>
@@ -9691,74 +10818,54 @@
       </p:grpSpPr>
       <p:sp>
         <p:nvSpPr>
-          <p:cNvPr id="7" name="Title 6"/>
+          <p:cNvPr id="5" name="Title 4"/>
           <p:cNvSpPr>
             <a:spLocks noGrp="1"/>
           </p:cNvSpPr>
           <p:nvPr>
-            <p:ph type="title"/>
+            <p:ph type="ctrTitle"/>
           </p:nvPr>
         </p:nvSpPr>
         <p:spPr/>
         <p:txBody>
-          <a:bodyPr>
-            <a:normAutofit/>
-          </a:bodyPr>
+          <a:bodyPr/>
           <a:lstStyle/>
           <a:p>
             <a:r>
+              <a:rPr lang="en-US" dirty="0" err="1"/>
+              <a:t>Liskov</a:t>
+            </a:r>
+            <a:r>
               <a:rPr lang="en-US" dirty="0"/>
-              <a:t>Table Template</a:t>
+              <a:t> Substitution Principle</a:t>
             </a:r>
           </a:p>
         </p:txBody>
       </p:sp>
-      <p:pic>
-        <p:nvPicPr>
-          <p:cNvPr id="4" name="Content Placeholder 8">
-            <a:extLst>
-              <a:ext uri="{FF2B5EF4-FFF2-40B4-BE49-F238E27FC236}">
-                <a16:creationId xmlns:a16="http://schemas.microsoft.com/office/drawing/2014/main" id="{7115BBD6-C922-4C23-B0CD-4D0FBE13E47D}"/>
-              </a:ext>
-            </a:extLst>
-          </p:cNvPr>
-          <p:cNvPicPr>
-            <a:picLocks noGrp="1" noChangeAspect="1"/>
-          </p:cNvPicPr>
+      <p:sp>
+        <p:nvSpPr>
+          <p:cNvPr id="2" name="Subtitle 1"/>
+          <p:cNvSpPr>
+            <a:spLocks noGrp="1"/>
+          </p:cNvSpPr>
           <p:nvPr>
-            <p:ph type="tbl" sz="quarter" idx="10"/>
+            <p:ph type="subTitle" idx="1"/>
           </p:nvPr>
-        </p:nvPicPr>
-        <p:blipFill>
-          <a:blip r:embed="rId3">
-            <a:extLst>
-              <a:ext uri="{28A0092B-C50C-407E-A947-70E740481C1C}">
-                <a14:useLocalDpi xmlns:a14="http://schemas.microsoft.com/office/drawing/2010/main" val="0"/>
-              </a:ext>
-            </a:extLst>
-          </a:blip>
-          <a:stretch>
-            <a:fillRect/>
-          </a:stretch>
-        </p:blipFill>
-        <p:spPr>
-          <a:xfrm>
-            <a:off x="988805" y="1331652"/>
-            <a:ext cx="7166390" cy="2480195"/>
-          </a:xfrm>
-        </p:spPr>
-      </p:pic>
+        </p:nvSpPr>
+        <p:spPr/>
+        <p:txBody>
+          <a:bodyPr/>
+          <a:lstStyle/>
+          <a:p>
+            <a:endParaRPr lang="en-US" dirty="0"/>
+          </a:p>
+        </p:txBody>
+      </p:sp>
     </p:spTree>
-    <p:extLst>
-      <p:ext uri="{BB962C8B-B14F-4D97-AF65-F5344CB8AC3E}">
-        <p14:creationId xmlns:p14="http://schemas.microsoft.com/office/powerpoint/2010/main" val="1238750147"/>
-      </p:ext>
-    </p:extLst>
   </p:cSld>
   <p:clrMapOvr>
     <a:masterClrMapping/>
   </p:clrMapOvr>
-  <p:transition/>
 </p:sld>
 </file>
 
@@ -9798,50 +10905,73 @@
           <a:p>
             <a:r>
               <a:rPr lang="en-US" dirty="0"/>
-              <a:t>Table Template</a:t>
+              <a:t>Bad Notifications</a:t>
             </a:r>
           </a:p>
         </p:txBody>
       </p:sp>
       <p:pic>
         <p:nvPicPr>
-          <p:cNvPr id="4" name="Content Placeholder 4">
+          <p:cNvPr id="3" name="Picture 2">
             <a:extLst>
               <a:ext uri="{FF2B5EF4-FFF2-40B4-BE49-F238E27FC236}">
-                <a16:creationId xmlns:a16="http://schemas.microsoft.com/office/drawing/2014/main" id="{1365DBC1-5C66-4244-9062-62C7641ED150}"/>
+                <a16:creationId xmlns:a16="http://schemas.microsoft.com/office/drawing/2014/main" id="{D3C19AEF-CEE3-495F-9710-596ACDC2732D}"/>
               </a:ext>
             </a:extLst>
           </p:cNvPr>
           <p:cNvPicPr>
-            <a:picLocks noGrp="1" noChangeAspect="1"/>
+            <a:picLocks noChangeAspect="1"/>
           </p:cNvPicPr>
-          <p:nvPr>
-            <p:ph type="tbl" sz="quarter" idx="10"/>
-          </p:nvPr>
+          <p:nvPr/>
         </p:nvPicPr>
-        <p:blipFill>
-          <a:blip r:embed="rId3">
-            <a:extLst>
-              <a:ext uri="{28A0092B-C50C-407E-A947-70E740481C1C}">
-                <a14:useLocalDpi xmlns:a14="http://schemas.microsoft.com/office/drawing/2010/main" val="0"/>
-              </a:ext>
-            </a:extLst>
-          </a:blip>
-          <a:stretch>
-            <a:fillRect/>
-          </a:stretch>
+        <p:blipFill rotWithShape="1">
+          <a:blip r:embed="rId3"/>
+          <a:srcRect l="4633" t="2208" r="892" b="2829"/>
+          <a:stretch/>
         </p:blipFill>
         <p:spPr>
           <a:xfrm>
-            <a:off x="1142237" y="1208181"/>
-            <a:ext cx="6859525" cy="2727137"/>
-          </a:xfrm>
+            <a:off x="0" y="1040046"/>
+            <a:ext cx="4145280" cy="2301240"/>
+          </a:xfrm>
+          <a:prstGeom prst="rect">
+            <a:avLst/>
+          </a:prstGeom>
+        </p:spPr>
+      </p:pic>
+      <p:pic>
+        <p:nvPicPr>
+          <p:cNvPr id="5" name="Picture 4">
+            <a:extLst>
+              <a:ext uri="{FF2B5EF4-FFF2-40B4-BE49-F238E27FC236}">
+                <a16:creationId xmlns:a16="http://schemas.microsoft.com/office/drawing/2014/main" id="{28158E97-DAB2-4F88-968F-9F2B06601B53}"/>
+              </a:ext>
+            </a:extLst>
+          </p:cNvPr>
+          <p:cNvPicPr>
+            <a:picLocks noChangeAspect="1"/>
+          </p:cNvPicPr>
+          <p:nvPr/>
+        </p:nvPicPr>
+        <p:blipFill rotWithShape="1">
+          <a:blip r:embed="rId4"/>
+          <a:srcRect l="3266" b="2327"/>
+          <a:stretch/>
+        </p:blipFill>
+        <p:spPr>
+          <a:xfrm>
+            <a:off x="4145280" y="807552"/>
+            <a:ext cx="4992657" cy="3071028"/>
+          </a:xfrm>
+          <a:prstGeom prst="rect">
+            <a:avLst/>
+          </a:prstGeom>
         </p:spPr>
       </p:pic>
     </p:spTree>
     <p:extLst>
       <p:ext uri="{BB962C8B-B14F-4D97-AF65-F5344CB8AC3E}">
-        <p14:creationId xmlns:p14="http://schemas.microsoft.com/office/powerpoint/2010/main" val="2237112805"/>
+        <p14:creationId xmlns:p14="http://schemas.microsoft.com/office/powerpoint/2010/main" val="2453648968"/>
       </p:ext>
     </p:extLst>
   </p:cSld>
@@ -10800,6 +11930,15 @@
 </file>
 
 <file path=customXml/item2.xml><?xml version="1.0" encoding="utf-8"?>
+<?mso-contentType ?>
+<FormTemplates xmlns="http://schemas.microsoft.com/sharepoint/v3/contenttype/forms">
+  <Display>DocumentLibraryForm</Display>
+  <Edit>DocumentLibraryForm</Edit>
+  <New>DocumentLibraryForm</New>
+</FormTemplates>
+</file>
+
+<file path=customXml/item3.xml><?xml version="1.0" encoding="utf-8"?>
 <ct:contentTypeSchema xmlns:ct="http://schemas.microsoft.com/office/2006/metadata/contentType" xmlns:ma="http://schemas.microsoft.com/office/2006/metadata/properties/metaAttributes" ct:_="" ma:_="" ma:contentTypeName="Document" ma:contentTypeID="0x010100121DD2BCD07E1C4A804FEBFAD064D665" ma:contentTypeVersion="0" ma:contentTypeDescription="Create a new document." ma:contentTypeScope="" ma:versionID="a6a82881d3ce09f869cebe55ca00809b">
   <xsd:schema xmlns:xsd="http://www.w3.org/2001/XMLSchema" xmlns:p="http://schemas.microsoft.com/office/2006/metadata/properties" targetNamespace="http://schemas.microsoft.com/office/2006/metadata/properties" ma:root="true" ma:fieldsID="4aeb20c0e3442673af7ee10786458764">
     <xsd:element name="properties">
@@ -10848,15 +11987,6 @@
 </ct:contentTypeSchema>
 </file>
 
-<file path=customXml/item3.xml><?xml version="1.0" encoding="utf-8"?>
-<?mso-contentType ?>
-<FormTemplates xmlns="http://schemas.microsoft.com/sharepoint/v3/contenttype/forms">
-  <Display>DocumentLibraryForm</Display>
-  <Edit>DocumentLibraryForm</Edit>
-  <New>DocumentLibraryForm</New>
-</FormTemplates>
-</file>
-
 <file path=customXml/itemProps1.xml><?xml version="1.0" encoding="utf-8"?>
 <ds:datastoreItem xmlns:ds="http://schemas.openxmlformats.org/officeDocument/2006/customXml" ds:itemID="{F3735A1A-98F5-44B9-9A7F-D3A37BCA6C65}">
   <ds:schemaRefs>
@@ -10872,6 +12002,14 @@
 </file>
 
 <file path=customXml/itemProps2.xml><?xml version="1.0" encoding="utf-8"?>
+<ds:datastoreItem xmlns:ds="http://schemas.openxmlformats.org/officeDocument/2006/customXml" ds:itemID="{F135BDD1-A6DD-463F-96E1-1D64E8A54422}">
+  <ds:schemaRefs>
+    <ds:schemaRef ds:uri="http://schemas.microsoft.com/sharepoint/v3/contenttype/forms"/>
+  </ds:schemaRefs>
+</ds:datastoreItem>
+</file>
+
+<file path=customXml/itemProps3.xml><?xml version="1.0" encoding="utf-8"?>
 <ds:datastoreItem xmlns:ds="http://schemas.openxmlformats.org/officeDocument/2006/customXml" ds:itemID="{EED550EF-E6EA-4BC2-B3E7-4456B0EA4E08}">
   <ds:schemaRefs>
     <ds:schemaRef ds:uri="http://schemas.microsoft.com/office/2006/metadata/contentType"/>
@@ -10884,12 +12022,4 @@
     <ds:schemaRef ds:uri="http://schemas.microsoft.com/office/internal/2005/internalDocumentation"/>
   </ds:schemaRefs>
 </ds:datastoreItem>
-</file>
-
-<file path=customXml/itemProps3.xml><?xml version="1.0" encoding="utf-8"?>
-<ds:datastoreItem xmlns:ds="http://schemas.openxmlformats.org/officeDocument/2006/customXml" ds:itemID="{F135BDD1-A6DD-463F-96E1-1D64E8A54422}">
-  <ds:schemaRefs>
-    <ds:schemaRef ds:uri="http://schemas.microsoft.com/sharepoint/v3/contenttype/forms"/>
-  </ds:schemaRefs>
-</ds:datastoreItem>
 </file>
</xml_diff>

<commit_message>
Updated PowerPoint with overview slides and fun motivational posters
</commit_message>
<xml_diff>
--- a/PowerPoint/SOLID.pptx
+++ b/PowerPoint/SOLID.pptx
@@ -5,28 +5,33 @@
     <p:sldMasterId id="2147483779" r:id="rId4"/>
   </p:sldMasterIdLst>
   <p:notesMasterIdLst>
-    <p:notesMasterId r:id="rId21"/>
+    <p:notesMasterId r:id="rId26"/>
   </p:notesMasterIdLst>
   <p:handoutMasterIdLst>
-    <p:handoutMasterId r:id="rId22"/>
+    <p:handoutMasterId r:id="rId27"/>
   </p:handoutMasterIdLst>
   <p:sldIdLst>
     <p:sldId id="261" r:id="rId5"/>
     <p:sldId id="276" r:id="rId6"/>
-    <p:sldId id="279" r:id="rId7"/>
-    <p:sldId id="280" r:id="rId8"/>
-    <p:sldId id="277" r:id="rId9"/>
-    <p:sldId id="269" r:id="rId10"/>
-    <p:sldId id="270" r:id="rId11"/>
-    <p:sldId id="263" r:id="rId12"/>
-    <p:sldId id="281" r:id="rId13"/>
-    <p:sldId id="282" r:id="rId14"/>
-    <p:sldId id="272" r:id="rId15"/>
-    <p:sldId id="271" r:id="rId16"/>
-    <p:sldId id="273" r:id="rId17"/>
-    <p:sldId id="274" r:id="rId18"/>
-    <p:sldId id="275" r:id="rId19"/>
-    <p:sldId id="278" r:id="rId20"/>
+    <p:sldId id="285" r:id="rId7"/>
+    <p:sldId id="279" r:id="rId8"/>
+    <p:sldId id="280" r:id="rId9"/>
+    <p:sldId id="277" r:id="rId10"/>
+    <p:sldId id="269" r:id="rId11"/>
+    <p:sldId id="270" r:id="rId12"/>
+    <p:sldId id="263" r:id="rId13"/>
+    <p:sldId id="286" r:id="rId14"/>
+    <p:sldId id="287" r:id="rId15"/>
+    <p:sldId id="272" r:id="rId16"/>
+    <p:sldId id="271" r:id="rId17"/>
+    <p:sldId id="273" r:id="rId18"/>
+    <p:sldId id="274" r:id="rId19"/>
+    <p:sldId id="275" r:id="rId20"/>
+    <p:sldId id="278" r:id="rId21"/>
+    <p:sldId id="291" r:id="rId22"/>
+    <p:sldId id="290" r:id="rId23"/>
+    <p:sldId id="283" r:id="rId24"/>
+    <p:sldId id="284" r:id="rId25"/>
   </p:sldIdLst>
   <p:sldSz cx="9144000" cy="5143500" type="screen16x9"/>
   <p:notesSz cx="6858000" cy="9144000"/>
@@ -256,7 +261,7 @@
             <a:fld id="{9CA14C55-E12A-45E6-87F3-7EAADE4C1D12}" type="datetimeFigureOut">
               <a:rPr lang="en-US" smtClean="0"/>
               <a:pPr/>
-              <a:t>1/16/2019</a:t>
+              <a:t>1/17/2019</a:t>
             </a:fld>
             <a:endParaRPr lang="en-US"/>
           </a:p>
@@ -423,7 +428,7 @@
             <a:fld id="{959CAFB7-E13F-4384-95CE-291BAEA2830B}" type="datetimeFigureOut">
               <a:rPr lang="en-US" smtClean="0"/>
               <a:pPr/>
-              <a:t>1/16/2019</a:t>
+              <a:t>1/17/2019</a:t>
             </a:fld>
             <a:endParaRPr lang="en-US"/>
           </a:p>
@@ -839,7 +844,7 @@
     </p:spTree>
     <p:extLst>
       <p:ext uri="{BB962C8B-B14F-4D97-AF65-F5344CB8AC3E}">
-        <p14:creationId xmlns:p14="http://schemas.microsoft.com/office/powerpoint/2010/main" val="944495322"/>
+        <p14:creationId xmlns:p14="http://schemas.microsoft.com/office/powerpoint/2010/main" val="3641381574"/>
       </p:ext>
     </p:extLst>
   </p:cSld>
@@ -934,7 +939,300 @@
     </p:spTree>
     <p:extLst>
       <p:ext uri="{BB962C8B-B14F-4D97-AF65-F5344CB8AC3E}">
+        <p14:creationId xmlns:p14="http://schemas.microsoft.com/office/powerpoint/2010/main" val="620100447"/>
+      </p:ext>
+    </p:extLst>
+  </p:cSld>
+  <p:clrMapOvr>
+    <a:masterClrMapping/>
+  </p:clrMapOvr>
+</p:notes>
+</file>
+
+<file path=ppt/notesSlides/notesSlide11.xml><?xml version="1.0" encoding="utf-8"?>
+<p:notes xmlns:a="http://schemas.openxmlformats.org/drawingml/2006/main" xmlns:r="http://schemas.openxmlformats.org/officeDocument/2006/relationships" xmlns:p="http://schemas.openxmlformats.org/presentationml/2006/main">
+  <p:cSld>
+    <p:spTree>
+      <p:nvGrpSpPr>
+        <p:cNvPr id="1" name=""/>
+        <p:cNvGrpSpPr/>
+        <p:nvPr/>
+      </p:nvGrpSpPr>
+      <p:grpSpPr>
+        <a:xfrm>
+          <a:off x="0" y="0"/>
+          <a:ext cx="0" cy="0"/>
+          <a:chOff x="0" y="0"/>
+          <a:chExt cx="0" cy="0"/>
+        </a:xfrm>
+      </p:grpSpPr>
+      <p:sp>
+        <p:nvSpPr>
+          <p:cNvPr id="2" name="Slide Image Placeholder 1"/>
+          <p:cNvSpPr>
+            <a:spLocks noGrp="1" noRot="1" noChangeAspect="1"/>
+          </p:cNvSpPr>
+          <p:nvPr>
+            <p:ph type="sldImg"/>
+          </p:nvPr>
+        </p:nvSpPr>
+        <p:spPr>
+          <a:xfrm>
+            <a:off x="381000" y="685800"/>
+            <a:ext cx="6096000" cy="3429000"/>
+          </a:xfrm>
+        </p:spPr>
+      </p:sp>
+      <p:sp>
+        <p:nvSpPr>
+          <p:cNvPr id="3" name="Notes Placeholder 2"/>
+          <p:cNvSpPr>
+            <a:spLocks noGrp="1"/>
+          </p:cNvSpPr>
+          <p:nvPr>
+            <p:ph type="body" idx="1"/>
+          </p:nvPr>
+        </p:nvSpPr>
+        <p:spPr/>
+        <p:txBody>
+          <a:bodyPr>
+            <a:normAutofit/>
+          </a:bodyPr>
+          <a:lstStyle/>
+          <a:p>
+            <a:endParaRPr lang="en-US" dirty="0">
+              <a:latin typeface="Arial" pitchFamily="34" charset="0"/>
+              <a:cs typeface="Arial" pitchFamily="34" charset="0"/>
+            </a:endParaRPr>
+          </a:p>
+        </p:txBody>
+      </p:sp>
+      <p:sp>
+        <p:nvSpPr>
+          <p:cNvPr id="4" name="Slide Number Placeholder 3"/>
+          <p:cNvSpPr>
+            <a:spLocks noGrp="1"/>
+          </p:cNvSpPr>
+          <p:nvPr>
+            <p:ph type="sldNum" sz="quarter" idx="10"/>
+          </p:nvPr>
+        </p:nvSpPr>
+        <p:spPr/>
+        <p:txBody>
+          <a:bodyPr/>
+          <a:lstStyle/>
+          <a:p>
+            <a:fld id="{3DA09BFF-9304-4EE8-967B-56F816FBB8C1}" type="slidenum">
+              <a:rPr lang="en-US" smtClean="0"/>
+              <a:pPr/>
+              <a:t>16</a:t>
+            </a:fld>
+            <a:endParaRPr lang="en-US"/>
+          </a:p>
+        </p:txBody>
+      </p:sp>
+    </p:spTree>
+    <p:extLst>
+      <p:ext uri="{BB962C8B-B14F-4D97-AF65-F5344CB8AC3E}">
         <p14:creationId xmlns:p14="http://schemas.microsoft.com/office/powerpoint/2010/main" val="341352484"/>
+      </p:ext>
+    </p:extLst>
+  </p:cSld>
+  <p:clrMapOvr>
+    <a:masterClrMapping/>
+  </p:clrMapOvr>
+</p:notes>
+</file>
+
+<file path=ppt/notesSlides/notesSlide12.xml><?xml version="1.0" encoding="utf-8"?>
+<p:notes xmlns:a="http://schemas.openxmlformats.org/drawingml/2006/main" xmlns:r="http://schemas.openxmlformats.org/officeDocument/2006/relationships" xmlns:p="http://schemas.openxmlformats.org/presentationml/2006/main">
+  <p:cSld>
+    <p:spTree>
+      <p:nvGrpSpPr>
+        <p:cNvPr id="1" name=""/>
+        <p:cNvGrpSpPr/>
+        <p:nvPr/>
+      </p:nvGrpSpPr>
+      <p:grpSpPr>
+        <a:xfrm>
+          <a:off x="0" y="0"/>
+          <a:ext cx="0" cy="0"/>
+          <a:chOff x="0" y="0"/>
+          <a:chExt cx="0" cy="0"/>
+        </a:xfrm>
+      </p:grpSpPr>
+      <p:sp>
+        <p:nvSpPr>
+          <p:cNvPr id="2" name="Slide Image Placeholder 1"/>
+          <p:cNvSpPr>
+            <a:spLocks noGrp="1" noRot="1" noChangeAspect="1"/>
+          </p:cNvSpPr>
+          <p:nvPr>
+            <p:ph type="sldImg"/>
+          </p:nvPr>
+        </p:nvSpPr>
+        <p:spPr>
+          <a:xfrm>
+            <a:off x="381000" y="685800"/>
+            <a:ext cx="6096000" cy="3429000"/>
+          </a:xfrm>
+        </p:spPr>
+      </p:sp>
+      <p:sp>
+        <p:nvSpPr>
+          <p:cNvPr id="3" name="Notes Placeholder 2"/>
+          <p:cNvSpPr>
+            <a:spLocks noGrp="1"/>
+          </p:cNvSpPr>
+          <p:nvPr>
+            <p:ph type="body" idx="1"/>
+          </p:nvPr>
+        </p:nvSpPr>
+        <p:spPr/>
+        <p:txBody>
+          <a:bodyPr>
+            <a:normAutofit/>
+          </a:bodyPr>
+          <a:lstStyle/>
+          <a:p>
+            <a:pPr marL="0" indent="0">
+              <a:buFontTx/>
+              <a:buNone/>
+            </a:pPr>
+            <a:endParaRPr lang="en-US" dirty="0">
+              <a:latin typeface="Arial" pitchFamily="34" charset="0"/>
+              <a:cs typeface="Arial" pitchFamily="34" charset="0"/>
+            </a:endParaRPr>
+          </a:p>
+        </p:txBody>
+      </p:sp>
+      <p:sp>
+        <p:nvSpPr>
+          <p:cNvPr id="4" name="Slide Number Placeholder 3"/>
+          <p:cNvSpPr>
+            <a:spLocks noGrp="1"/>
+          </p:cNvSpPr>
+          <p:nvPr>
+            <p:ph type="sldNum" sz="quarter" idx="10"/>
+          </p:nvPr>
+        </p:nvSpPr>
+        <p:spPr/>
+        <p:txBody>
+          <a:bodyPr/>
+          <a:lstStyle/>
+          <a:p>
+            <a:fld id="{3DA09BFF-9304-4EE8-967B-56F816FBB8C1}" type="slidenum">
+              <a:rPr lang="en-US" smtClean="0"/>
+              <a:pPr/>
+              <a:t>20</a:t>
+            </a:fld>
+            <a:endParaRPr lang="en-US"/>
+          </a:p>
+        </p:txBody>
+      </p:sp>
+    </p:spTree>
+    <p:extLst>
+      <p:ext uri="{BB962C8B-B14F-4D97-AF65-F5344CB8AC3E}">
+        <p14:creationId xmlns:p14="http://schemas.microsoft.com/office/powerpoint/2010/main" val="1106178259"/>
+      </p:ext>
+    </p:extLst>
+  </p:cSld>
+  <p:clrMapOvr>
+    <a:masterClrMapping/>
+  </p:clrMapOvr>
+</p:notes>
+</file>
+
+<file path=ppt/notesSlides/notesSlide13.xml><?xml version="1.0" encoding="utf-8"?>
+<p:notes xmlns:a="http://schemas.openxmlformats.org/drawingml/2006/main" xmlns:r="http://schemas.openxmlformats.org/officeDocument/2006/relationships" xmlns:p="http://schemas.openxmlformats.org/presentationml/2006/main">
+  <p:cSld>
+    <p:spTree>
+      <p:nvGrpSpPr>
+        <p:cNvPr id="1" name=""/>
+        <p:cNvGrpSpPr/>
+        <p:nvPr/>
+      </p:nvGrpSpPr>
+      <p:grpSpPr>
+        <a:xfrm>
+          <a:off x="0" y="0"/>
+          <a:ext cx="0" cy="0"/>
+          <a:chOff x="0" y="0"/>
+          <a:chExt cx="0" cy="0"/>
+        </a:xfrm>
+      </p:grpSpPr>
+      <p:sp>
+        <p:nvSpPr>
+          <p:cNvPr id="2" name="Slide Image Placeholder 1"/>
+          <p:cNvSpPr>
+            <a:spLocks noGrp="1" noRot="1" noChangeAspect="1"/>
+          </p:cNvSpPr>
+          <p:nvPr>
+            <p:ph type="sldImg"/>
+          </p:nvPr>
+        </p:nvSpPr>
+        <p:spPr>
+          <a:xfrm>
+            <a:off x="381000" y="685800"/>
+            <a:ext cx="6096000" cy="3429000"/>
+          </a:xfrm>
+        </p:spPr>
+      </p:sp>
+      <p:sp>
+        <p:nvSpPr>
+          <p:cNvPr id="3" name="Notes Placeholder 2"/>
+          <p:cNvSpPr>
+            <a:spLocks noGrp="1"/>
+          </p:cNvSpPr>
+          <p:nvPr>
+            <p:ph type="body" idx="1"/>
+          </p:nvPr>
+        </p:nvSpPr>
+        <p:spPr/>
+        <p:txBody>
+          <a:bodyPr>
+            <a:normAutofit/>
+          </a:bodyPr>
+          <a:lstStyle/>
+          <a:p>
+            <a:pPr marL="0" indent="0">
+              <a:buFontTx/>
+              <a:buNone/>
+            </a:pPr>
+            <a:endParaRPr lang="en-US" dirty="0">
+              <a:latin typeface="Arial" pitchFamily="34" charset="0"/>
+              <a:cs typeface="Arial" pitchFamily="34" charset="0"/>
+            </a:endParaRPr>
+          </a:p>
+        </p:txBody>
+      </p:sp>
+      <p:sp>
+        <p:nvSpPr>
+          <p:cNvPr id="4" name="Slide Number Placeholder 3"/>
+          <p:cNvSpPr>
+            <a:spLocks noGrp="1"/>
+          </p:cNvSpPr>
+          <p:nvPr>
+            <p:ph type="sldNum" sz="quarter" idx="10"/>
+          </p:nvPr>
+        </p:nvSpPr>
+        <p:spPr/>
+        <p:txBody>
+          <a:bodyPr/>
+          <a:lstStyle/>
+          <a:p>
+            <a:fld id="{3DA09BFF-9304-4EE8-967B-56F816FBB8C1}" type="slidenum">
+              <a:rPr lang="en-US" smtClean="0"/>
+              <a:pPr/>
+              <a:t>21</a:t>
+            </a:fld>
+            <a:endParaRPr lang="en-US"/>
+          </a:p>
+        </p:txBody>
+      </p:sp>
+    </p:spTree>
+    <p:extLst>
+      <p:ext uri="{BB962C8B-B14F-4D97-AF65-F5344CB8AC3E}">
+        <p14:creationId xmlns:p14="http://schemas.microsoft.com/office/powerpoint/2010/main" val="721842403"/>
       </p:ext>
     </p:extLst>
   </p:cSld>
@@ -1090,7 +1388,7 @@
     </p:spTree>
     <p:extLst>
       <p:ext uri="{BB962C8B-B14F-4D97-AF65-F5344CB8AC3E}">
-        <p14:creationId xmlns:p14="http://schemas.microsoft.com/office/powerpoint/2010/main" val="1043497630"/>
+        <p14:creationId xmlns:p14="http://schemas.microsoft.com/office/powerpoint/2010/main" val="944495322"/>
       </p:ext>
     </p:extLst>
   </p:cSld>
@@ -1151,10 +1449,71 @@
           </a:bodyPr>
           <a:lstStyle/>
           <a:p>
-            <a:endParaRPr lang="en-US" dirty="0">
-              <a:latin typeface="Arial" pitchFamily="34" charset="0"/>
-              <a:cs typeface="Arial" pitchFamily="34" charset="0"/>
-            </a:endParaRPr>
+            <a:pPr marL="171450" indent="-171450">
+              <a:buFontTx/>
+              <a:buChar char="-"/>
+            </a:pPr>
+            <a:r>
+              <a:rPr lang="en-US" dirty="0">
+                <a:latin typeface="Arial" pitchFamily="34" charset="0"/>
+                <a:cs typeface="Arial" pitchFamily="34" charset="0"/>
+              </a:rPr>
+              <a:t>Building a </a:t>
+            </a:r>
+            <a:r>
+              <a:rPr lang="en-US" dirty="0" err="1">
+                <a:latin typeface="Arial" pitchFamily="34" charset="0"/>
+                <a:cs typeface="Arial" pitchFamily="34" charset="0"/>
+              </a:rPr>
+              <a:t>SoccerPlayer</a:t>
+            </a:r>
+            <a:r>
+              <a:rPr lang="en-US" dirty="0">
+                <a:latin typeface="Arial" pitchFamily="34" charset="0"/>
+                <a:cs typeface="Arial" pitchFamily="34" charset="0"/>
+              </a:rPr>
+              <a:t> class</a:t>
+            </a:r>
+          </a:p>
+          <a:p>
+            <a:pPr marL="171450" indent="-171450">
+              <a:buFontTx/>
+              <a:buChar char="-"/>
+            </a:pPr>
+            <a:r>
+              <a:rPr lang="en-US" dirty="0">
+                <a:latin typeface="Arial" pitchFamily="34" charset="0"/>
+                <a:cs typeface="Arial" pitchFamily="34" charset="0"/>
+              </a:rPr>
+              <a:t>You want to keep stats, but it’s clear that it probably wouldn’t work to keep the values on the soccer player. Some stats require comparing other players on the team/in the league. A single player’s data shouldn’t rely on others you feel.</a:t>
+            </a:r>
+          </a:p>
+          <a:p>
+            <a:pPr marL="171450" indent="-171450">
+              <a:buFontTx/>
+              <a:buChar char="-"/>
+            </a:pPr>
+            <a:r>
+              <a:rPr lang="en-US" dirty="0">
+                <a:latin typeface="Arial" pitchFamily="34" charset="0"/>
+                <a:cs typeface="Arial" pitchFamily="34" charset="0"/>
+              </a:rPr>
+              <a:t>So build a </a:t>
+            </a:r>
+            <a:r>
+              <a:rPr lang="en-US" dirty="0" err="1">
+                <a:latin typeface="Arial" pitchFamily="34" charset="0"/>
+                <a:cs typeface="Arial" pitchFamily="34" charset="0"/>
+              </a:rPr>
+              <a:t>PlayerReport</a:t>
+            </a:r>
+            <a:r>
+              <a:rPr lang="en-US" dirty="0">
+                <a:latin typeface="Arial" pitchFamily="34" charset="0"/>
+                <a:cs typeface="Arial" pitchFamily="34" charset="0"/>
+              </a:rPr>
+              <a:t> class to hold calculated stats. But leave the calculations in the player class.</a:t>
+            </a:r>
           </a:p>
         </p:txBody>
       </p:sp>
@@ -1176,7 +1535,7 @@
             <a:fld id="{3DA09BFF-9304-4EE8-967B-56F816FBB8C1}" type="slidenum">
               <a:rPr lang="en-US" smtClean="0"/>
               <a:pPr/>
-              <a:t>6</a:t>
+              <a:t>5</a:t>
             </a:fld>
             <a:endParaRPr lang="en-US"/>
           </a:p>
@@ -1185,7 +1544,7 @@
     </p:spTree>
     <p:extLst>
       <p:ext uri="{BB962C8B-B14F-4D97-AF65-F5344CB8AC3E}">
-        <p14:creationId xmlns:p14="http://schemas.microsoft.com/office/powerpoint/2010/main" val="817677590"/>
+        <p14:creationId xmlns:p14="http://schemas.microsoft.com/office/powerpoint/2010/main" val="1043497630"/>
       </p:ext>
     </p:extLst>
   </p:cSld>
@@ -1280,7 +1639,7 @@
     </p:spTree>
     <p:extLst>
       <p:ext uri="{BB962C8B-B14F-4D97-AF65-F5344CB8AC3E}">
-        <p14:creationId xmlns:p14="http://schemas.microsoft.com/office/powerpoint/2010/main" val="3790524406"/>
+        <p14:creationId xmlns:p14="http://schemas.microsoft.com/office/powerpoint/2010/main" val="817677590"/>
       </p:ext>
     </p:extLst>
   </p:cSld>
@@ -1341,10 +1700,6 @@
           </a:bodyPr>
           <a:lstStyle/>
           <a:p>
-            <a:pPr marL="0" indent="0">
-              <a:buFontTx/>
-              <a:buNone/>
-            </a:pPr>
             <a:endParaRPr lang="en-US" dirty="0">
               <a:latin typeface="Arial" pitchFamily="34" charset="0"/>
               <a:cs typeface="Arial" pitchFamily="34" charset="0"/>
@@ -1370,7 +1725,7 @@
             <a:fld id="{3DA09BFF-9304-4EE8-967B-56F816FBB8C1}" type="slidenum">
               <a:rPr lang="en-US" smtClean="0"/>
               <a:pPr/>
-              <a:t>9</a:t>
+              <a:t>8</a:t>
             </a:fld>
             <a:endParaRPr lang="en-US"/>
           </a:p>
@@ -1379,7 +1734,7 @@
     </p:spTree>
     <p:extLst>
       <p:ext uri="{BB962C8B-B14F-4D97-AF65-F5344CB8AC3E}">
-        <p14:creationId xmlns:p14="http://schemas.microsoft.com/office/powerpoint/2010/main" val="2953088215"/>
+        <p14:creationId xmlns:p14="http://schemas.microsoft.com/office/powerpoint/2010/main" val="3790524406"/>
       </p:ext>
     </p:extLst>
   </p:cSld>
@@ -1440,14 +1795,71 @@
           </a:bodyPr>
           <a:lstStyle/>
           <a:p>
-            <a:pPr marL="0" indent="0">
+            <a:pPr marL="171450" indent="-171450">
               <a:buFontTx/>
-              <a:buNone/>
+              <a:buChar char="-"/>
             </a:pPr>
-            <a:endParaRPr lang="en-US" dirty="0">
-              <a:latin typeface="Arial" pitchFamily="34" charset="0"/>
-              <a:cs typeface="Arial" pitchFamily="34" charset="0"/>
-            </a:endParaRPr>
+            <a:r>
+              <a:rPr lang="en-US" dirty="0">
+                <a:latin typeface="Arial" pitchFamily="34" charset="0"/>
+                <a:cs typeface="Arial" pitchFamily="34" charset="0"/>
+              </a:rPr>
+              <a:t>Building a </a:t>
+            </a:r>
+            <a:r>
+              <a:rPr lang="en-US" dirty="0" err="1">
+                <a:latin typeface="Arial" pitchFamily="34" charset="0"/>
+                <a:cs typeface="Arial" pitchFamily="34" charset="0"/>
+              </a:rPr>
+              <a:t>SoccerPlayer</a:t>
+            </a:r>
+            <a:r>
+              <a:rPr lang="en-US" dirty="0">
+                <a:latin typeface="Arial" pitchFamily="34" charset="0"/>
+                <a:cs typeface="Arial" pitchFamily="34" charset="0"/>
+              </a:rPr>
+              <a:t> class</a:t>
+            </a:r>
+          </a:p>
+          <a:p>
+            <a:pPr marL="171450" indent="-171450">
+              <a:buFontTx/>
+              <a:buChar char="-"/>
+            </a:pPr>
+            <a:r>
+              <a:rPr lang="en-US" dirty="0">
+                <a:latin typeface="Arial" pitchFamily="34" charset="0"/>
+                <a:cs typeface="Arial" pitchFamily="34" charset="0"/>
+              </a:rPr>
+              <a:t>You want to keep stats, but it’s clear that it probably wouldn’t work to keep the values on the soccer player. Some stats require comparing other players on the team/in the league. A single player’s data shouldn’t rely on others you feel.</a:t>
+            </a:r>
+          </a:p>
+          <a:p>
+            <a:pPr marL="171450" indent="-171450">
+              <a:buFontTx/>
+              <a:buChar char="-"/>
+            </a:pPr>
+            <a:r>
+              <a:rPr lang="en-US" dirty="0">
+                <a:latin typeface="Arial" pitchFamily="34" charset="0"/>
+                <a:cs typeface="Arial" pitchFamily="34" charset="0"/>
+              </a:rPr>
+              <a:t>So build a </a:t>
+            </a:r>
+            <a:r>
+              <a:rPr lang="en-US" dirty="0" err="1">
+                <a:latin typeface="Arial" pitchFamily="34" charset="0"/>
+                <a:cs typeface="Arial" pitchFamily="34" charset="0"/>
+              </a:rPr>
+              <a:t>PlayerReport</a:t>
+            </a:r>
+            <a:r>
+              <a:rPr lang="en-US" dirty="0">
+                <a:latin typeface="Arial" pitchFamily="34" charset="0"/>
+                <a:cs typeface="Arial" pitchFamily="34" charset="0"/>
+              </a:rPr>
+              <a:t> class to hold calculated stats. But leave the calculations in the player class.</a:t>
+            </a:r>
           </a:p>
         </p:txBody>
       </p:sp>
@@ -1478,7 +1890,7 @@
     </p:spTree>
     <p:extLst>
       <p:ext uri="{BB962C8B-B14F-4D97-AF65-F5344CB8AC3E}">
-        <p14:creationId xmlns:p14="http://schemas.microsoft.com/office/powerpoint/2010/main" val="1949693232"/>
+        <p14:creationId xmlns:p14="http://schemas.microsoft.com/office/powerpoint/2010/main" val="2616241707"/>
       </p:ext>
     </p:extLst>
   </p:cSld>
@@ -1539,9 +1951,342 @@
           </a:bodyPr>
           <a:lstStyle/>
           <a:p>
-            <a:endParaRPr lang="en-US" dirty="0">
-              <a:latin typeface="Arial" pitchFamily="34" charset="0"/>
-              <a:cs typeface="Arial" pitchFamily="34" charset="0"/>
+            <a:pPr fontAlgn="base"/>
+            <a:r>
+              <a:rPr lang="en-US" sz="1200" b="0" i="0" kern="1200" dirty="0">
+                <a:solidFill>
+                  <a:schemeClr val="tx1"/>
+                </a:solidFill>
+                <a:effectLst/>
+                <a:latin typeface="+mn-lt"/>
+                <a:ea typeface="+mn-ea"/>
+                <a:cs typeface="+mn-cs"/>
+              </a:rPr>
+              <a:t>Square/Rectangle Example:</a:t>
+            </a:r>
+          </a:p>
+          <a:p>
+            <a:pPr fontAlgn="base"/>
+            <a:endParaRPr lang="en-US" sz="1200" b="0" i="0" kern="1200" dirty="0">
+              <a:solidFill>
+                <a:schemeClr val="tx1"/>
+              </a:solidFill>
+              <a:effectLst/>
+              <a:latin typeface="+mn-lt"/>
+              <a:ea typeface="+mn-ea"/>
+              <a:cs typeface="+mn-cs"/>
+            </a:endParaRPr>
+          </a:p>
+          <a:p>
+            <a:pPr fontAlgn="base"/>
+            <a:r>
+              <a:rPr lang="en-US" sz="1200" b="0" i="0" kern="1200" dirty="0">
+                <a:solidFill>
+                  <a:schemeClr val="tx1"/>
+                </a:solidFill>
+                <a:effectLst/>
+                <a:latin typeface="+mn-lt"/>
+                <a:ea typeface="+mn-ea"/>
+                <a:cs typeface="+mn-cs"/>
+              </a:rPr>
+              <a:t>- ”Is A” relationships</a:t>
+            </a:r>
+          </a:p>
+          <a:p>
+            <a:pPr fontAlgn="base"/>
+            <a:r>
+              <a:rPr lang="en-US" sz="1200" b="0" i="0" kern="1200" dirty="0">
+                <a:solidFill>
+                  <a:schemeClr val="tx1"/>
+                </a:solidFill>
+                <a:effectLst/>
+                <a:latin typeface="+mn-lt"/>
+                <a:ea typeface="+mn-ea"/>
+                <a:cs typeface="+mn-cs"/>
+              </a:rPr>
+              <a:t>- Square “is a” Rectangle, so inherit!</a:t>
+            </a:r>
+          </a:p>
+          <a:p>
+            <a:pPr marL="171450" indent="-171450" fontAlgn="base">
+              <a:buFontTx/>
+              <a:buChar char="-"/>
+            </a:pPr>
+            <a:r>
+              <a:rPr lang="en-US" sz="1200" b="0" i="0" kern="1200" dirty="0">
+                <a:solidFill>
+                  <a:schemeClr val="tx1"/>
+                </a:solidFill>
+                <a:effectLst/>
+                <a:latin typeface="+mn-lt"/>
+                <a:ea typeface="+mn-ea"/>
+                <a:cs typeface="+mn-cs"/>
+              </a:rPr>
+              <a:t>What do get/</a:t>
+            </a:r>
+            <a:r>
+              <a:rPr lang="en-US" sz="1200" b="0" i="0" kern="1200" dirty="0" err="1">
+                <a:solidFill>
+                  <a:schemeClr val="tx1"/>
+                </a:solidFill>
+                <a:effectLst/>
+                <a:latin typeface="+mn-lt"/>
+                <a:ea typeface="+mn-ea"/>
+                <a:cs typeface="+mn-cs"/>
+              </a:rPr>
+              <a:t>setWidth</a:t>
+            </a:r>
+            <a:r>
+              <a:rPr lang="en-US" sz="1200" b="0" i="0" kern="1200" dirty="0">
+                <a:solidFill>
+                  <a:schemeClr val="tx1"/>
+                </a:solidFill>
+                <a:effectLst/>
+                <a:latin typeface="+mn-lt"/>
+                <a:ea typeface="+mn-ea"/>
+                <a:cs typeface="+mn-cs"/>
+              </a:rPr>
+              <a:t>/Height mean if the Rectangle reference points to a Square?</a:t>
+            </a:r>
+          </a:p>
+          <a:p>
+            <a:pPr marL="171450" indent="-171450" fontAlgn="base">
+              <a:buFontTx/>
+              <a:buChar char="-"/>
+            </a:pPr>
+            <a:r>
+              <a:rPr lang="en-US" sz="1200" b="0" i="0" kern="1200" dirty="0">
+                <a:solidFill>
+                  <a:schemeClr val="tx1"/>
+                </a:solidFill>
+                <a:effectLst/>
+                <a:latin typeface="+mn-lt"/>
+                <a:ea typeface="+mn-ea"/>
+                <a:cs typeface="+mn-cs"/>
+              </a:rPr>
+              <a:t>Square as an abstraction of Rectangle is BAD</a:t>
+            </a:r>
+          </a:p>
+          <a:p>
+            <a:pPr marL="171450" indent="-171450" fontAlgn="base">
+              <a:buFontTx/>
+              <a:buChar char="-"/>
+            </a:pPr>
+            <a:endParaRPr lang="en-US" sz="1200" b="0" i="0" kern="1200" dirty="0">
+              <a:solidFill>
+                <a:schemeClr val="tx1"/>
+              </a:solidFill>
+              <a:effectLst/>
+              <a:latin typeface="+mn-lt"/>
+              <a:ea typeface="+mn-ea"/>
+              <a:cs typeface="+mn-cs"/>
+            </a:endParaRPr>
+          </a:p>
+          <a:p>
+            <a:pPr marL="0" indent="0" fontAlgn="base">
+              <a:buFontTx/>
+              <a:buNone/>
+            </a:pPr>
+            <a:r>
+              <a:rPr lang="en-US" sz="1200" b="0" i="0" kern="1200" dirty="0">
+                <a:solidFill>
+                  <a:schemeClr val="tx1"/>
+                </a:solidFill>
+                <a:effectLst/>
+                <a:latin typeface="+mn-lt"/>
+                <a:ea typeface="+mn-ea"/>
+                <a:cs typeface="+mn-cs"/>
+              </a:rPr>
+              <a:t>Could also do a Board/3DBoard Example:</a:t>
+            </a:r>
+          </a:p>
+          <a:p>
+            <a:pPr marL="171450" indent="-171450" fontAlgn="base">
+              <a:buFontTx/>
+              <a:buChar char="-"/>
+            </a:pPr>
+            <a:r>
+              <a:rPr lang="en-US" sz="1200" b="0" i="0" kern="1200" dirty="0">
+                <a:solidFill>
+                  <a:schemeClr val="tx1"/>
+                </a:solidFill>
+                <a:effectLst/>
+                <a:latin typeface="+mn-lt"/>
+                <a:ea typeface="+mn-ea"/>
+                <a:cs typeface="+mn-cs"/>
+              </a:rPr>
+              <a:t>Board has some width/height</a:t>
+            </a:r>
+          </a:p>
+          <a:p>
+            <a:pPr marL="171450" indent="-171450" fontAlgn="base">
+              <a:buFontTx/>
+              <a:buChar char="-"/>
+            </a:pPr>
+            <a:r>
+              <a:rPr lang="en-US" sz="1200" b="0" i="0" kern="1200" dirty="0">
+                <a:solidFill>
+                  <a:schemeClr val="tx1"/>
+                </a:solidFill>
+                <a:effectLst/>
+                <a:latin typeface="+mn-lt"/>
+                <a:ea typeface="+mn-ea"/>
+                <a:cs typeface="+mn-cs"/>
+              </a:rPr>
+              <a:t>3DBoard extends this and has a depth</a:t>
+            </a:r>
+          </a:p>
+          <a:p>
+            <a:pPr marL="171450" indent="-171450" fontAlgn="base">
+              <a:buFontTx/>
+              <a:buChar char="-"/>
+            </a:pPr>
+            <a:r>
+              <a:rPr lang="en-US" sz="1200" b="0" i="0" kern="1200" dirty="0">
+                <a:solidFill>
+                  <a:schemeClr val="tx1"/>
+                </a:solidFill>
+                <a:effectLst/>
+                <a:latin typeface="+mn-lt"/>
+                <a:ea typeface="+mn-ea"/>
+                <a:cs typeface="+mn-cs"/>
+              </a:rPr>
+              <a:t>All of Board’s functions (</a:t>
+            </a:r>
+            <a:r>
+              <a:rPr lang="en-US" sz="1200" b="0" i="0" kern="1200" dirty="0" err="1">
+                <a:solidFill>
+                  <a:schemeClr val="tx1"/>
+                </a:solidFill>
+                <a:effectLst/>
+                <a:latin typeface="+mn-lt"/>
+                <a:ea typeface="+mn-ea"/>
+                <a:cs typeface="+mn-cs"/>
+              </a:rPr>
+              <a:t>AddUnit</a:t>
+            </a:r>
+            <a:r>
+              <a:rPr lang="en-US" sz="1200" b="0" i="0" kern="1200" dirty="0">
+                <a:solidFill>
+                  <a:schemeClr val="tx1"/>
+                </a:solidFill>
+                <a:effectLst/>
+                <a:latin typeface="+mn-lt"/>
+                <a:ea typeface="+mn-ea"/>
+                <a:cs typeface="+mn-cs"/>
+              </a:rPr>
+              <a:t>, </a:t>
+            </a:r>
+            <a:r>
+              <a:rPr lang="en-US" sz="1200" b="0" i="0" kern="1200" dirty="0" err="1">
+                <a:solidFill>
+                  <a:schemeClr val="tx1"/>
+                </a:solidFill>
+                <a:effectLst/>
+                <a:latin typeface="+mn-lt"/>
+                <a:ea typeface="+mn-ea"/>
+                <a:cs typeface="+mn-cs"/>
+              </a:rPr>
+              <a:t>GetTile</a:t>
+            </a:r>
+            <a:r>
+              <a:rPr lang="en-US" sz="1200" b="0" i="0" kern="1200" dirty="0">
+                <a:solidFill>
+                  <a:schemeClr val="tx1"/>
+                </a:solidFill>
+                <a:effectLst/>
+                <a:latin typeface="+mn-lt"/>
+                <a:ea typeface="+mn-ea"/>
+                <a:cs typeface="+mn-cs"/>
+              </a:rPr>
+              <a:t>, </a:t>
+            </a:r>
+            <a:r>
+              <a:rPr lang="en-US" sz="1200" b="0" i="0" kern="1200" dirty="0" err="1">
+                <a:solidFill>
+                  <a:schemeClr val="tx1"/>
+                </a:solidFill>
+                <a:effectLst/>
+                <a:latin typeface="+mn-lt"/>
+                <a:ea typeface="+mn-ea"/>
+                <a:cs typeface="+mn-cs"/>
+              </a:rPr>
+              <a:t>RemoveUnit</a:t>
+            </a:r>
+            <a:r>
+              <a:rPr lang="en-US" sz="1200" b="0" i="0" kern="1200" dirty="0">
+                <a:solidFill>
+                  <a:schemeClr val="tx1"/>
+                </a:solidFill>
+                <a:effectLst/>
+                <a:latin typeface="+mn-lt"/>
+                <a:ea typeface="+mn-ea"/>
+                <a:cs typeface="+mn-cs"/>
+              </a:rPr>
+              <a:t>, </a:t>
+            </a:r>
+            <a:r>
+              <a:rPr lang="en-US" sz="1200" b="0" i="0" kern="1200" dirty="0" err="1">
+                <a:solidFill>
+                  <a:schemeClr val="tx1"/>
+                </a:solidFill>
+                <a:effectLst/>
+                <a:latin typeface="+mn-lt"/>
+                <a:ea typeface="+mn-ea"/>
+                <a:cs typeface="+mn-cs"/>
+              </a:rPr>
+              <a:t>etc</a:t>
+            </a:r>
+            <a:r>
+              <a:rPr lang="en-US" sz="1200" b="0" i="0" kern="1200" dirty="0">
+                <a:solidFill>
+                  <a:schemeClr val="tx1"/>
+                </a:solidFill>
+                <a:effectLst/>
+                <a:latin typeface="+mn-lt"/>
+                <a:ea typeface="+mn-ea"/>
+                <a:cs typeface="+mn-cs"/>
+              </a:rPr>
+              <a:t>…) take an x and y but no z</a:t>
+            </a:r>
+          </a:p>
+          <a:p>
+            <a:pPr marL="171450" indent="-171450" fontAlgn="base">
+              <a:buFontTx/>
+              <a:buChar char="-"/>
+            </a:pPr>
+            <a:r>
+              <a:rPr lang="en-US" sz="1200" b="0" i="0" kern="1200" dirty="0">
+                <a:solidFill>
+                  <a:schemeClr val="tx1"/>
+                </a:solidFill>
+                <a:effectLst/>
+                <a:latin typeface="+mn-lt"/>
+                <a:ea typeface="+mn-ea"/>
+                <a:cs typeface="+mn-cs"/>
+              </a:rPr>
+              <a:t>3DBoard will have to shadow all of these with new functions that take </a:t>
+            </a:r>
+            <a:r>
+              <a:rPr lang="en-US" sz="1200" b="0" i="0" kern="1200" dirty="0" err="1">
+                <a:solidFill>
+                  <a:schemeClr val="tx1"/>
+                </a:solidFill>
+                <a:effectLst/>
+                <a:latin typeface="+mn-lt"/>
+                <a:ea typeface="+mn-ea"/>
+                <a:cs typeface="+mn-cs"/>
+              </a:rPr>
+              <a:t>x,y,z</a:t>
+            </a:r>
+            <a:endParaRPr lang="en-US" sz="1200" b="0" i="0" kern="1200" dirty="0">
+              <a:solidFill>
+                <a:schemeClr val="tx1"/>
+              </a:solidFill>
+              <a:effectLst/>
+              <a:latin typeface="+mn-lt"/>
+              <a:ea typeface="+mn-ea"/>
+              <a:cs typeface="+mn-cs"/>
             </a:endParaRPr>
           </a:p>
         </p:txBody>
@@ -1564,7 +2309,7 @@
             <a:fld id="{3DA09BFF-9304-4EE8-967B-56F816FBB8C1}" type="slidenum">
               <a:rPr lang="en-US" smtClean="0"/>
               <a:pPr/>
-              <a:t>12</a:t>
+              <a:t>11</a:t>
             </a:fld>
             <a:endParaRPr lang="en-US"/>
           </a:p>
@@ -1573,7 +2318,7 @@
     </p:spTree>
     <p:extLst>
       <p:ext uri="{BB962C8B-B14F-4D97-AF65-F5344CB8AC3E}">
-        <p14:creationId xmlns:p14="http://schemas.microsoft.com/office/powerpoint/2010/main" val="173063448"/>
+        <p14:creationId xmlns:p14="http://schemas.microsoft.com/office/powerpoint/2010/main" val="2077901333"/>
       </p:ext>
     </p:extLst>
   </p:cSld>
@@ -1668,7 +2413,7 @@
     </p:spTree>
     <p:extLst>
       <p:ext uri="{BB962C8B-B14F-4D97-AF65-F5344CB8AC3E}">
-        <p14:creationId xmlns:p14="http://schemas.microsoft.com/office/powerpoint/2010/main" val="802530561"/>
+        <p14:creationId xmlns:p14="http://schemas.microsoft.com/office/powerpoint/2010/main" val="173063448"/>
       </p:ext>
     </p:extLst>
   </p:cSld>
@@ -1763,7 +2508,7 @@
     </p:spTree>
     <p:extLst>
       <p:ext uri="{BB962C8B-B14F-4D97-AF65-F5344CB8AC3E}">
-        <p14:creationId xmlns:p14="http://schemas.microsoft.com/office/powerpoint/2010/main" val="620100447"/>
+        <p14:creationId xmlns:p14="http://schemas.microsoft.com/office/powerpoint/2010/main" val="802530561"/>
       </p:ext>
     </p:extLst>
   </p:cSld>
@@ -9635,7 +10380,7 @@
           <a:p>
             <a:r>
               <a:rPr lang="en-US" dirty="0"/>
-              <a:t>Presentation Title</a:t>
+              <a:t>S.O.L.I.D.</a:t>
             </a:r>
           </a:p>
         </p:txBody>
@@ -9655,7 +10400,10 @@
           <a:bodyPr/>
           <a:lstStyle/>
           <a:p>
-            <a:endParaRPr lang="en-US"/>
+            <a:r>
+              <a:rPr lang="en-US" dirty="0"/>
+              <a:t>Ari Cohen &amp; Colton Heinrich</a:t>
+            </a:r>
           </a:p>
         </p:txBody>
       </p:sp>
@@ -9702,74 +10450,145 @@
           <a:lstStyle/>
           <a:p>
             <a:r>
+              <a:rPr lang="en-US" dirty="0" err="1"/>
+              <a:t>Liskov</a:t>
+            </a:r>
+            <a:r>
               <a:rPr lang="en-US" dirty="0"/>
-              <a:t>Good Notifications</a:t>
+              <a:t> Substitution Overview</a:t>
             </a:r>
           </a:p>
         </p:txBody>
       </p:sp>
-      <p:pic>
-        <p:nvPicPr>
-          <p:cNvPr id="4" name="Picture 3">
+      <p:sp>
+        <p:nvSpPr>
+          <p:cNvPr id="2" name="TextBox 1">
             <a:extLst>
               <a:ext uri="{FF2B5EF4-FFF2-40B4-BE49-F238E27FC236}">
-                <a16:creationId xmlns:a16="http://schemas.microsoft.com/office/drawing/2014/main" id="{D1E400DC-B03A-4D53-9B19-53CB31F40356}"/>
+                <a16:creationId xmlns:a16="http://schemas.microsoft.com/office/drawing/2014/main" id="{B35B1041-8099-49DD-AFA9-BDB74A2128E1}"/>
               </a:ext>
             </a:extLst>
           </p:cNvPr>
-          <p:cNvPicPr>
-            <a:picLocks noChangeAspect="1"/>
-          </p:cNvPicPr>
+          <p:cNvSpPr txBox="1"/>
           <p:nvPr/>
-        </p:nvPicPr>
-        <p:blipFill rotWithShape="1">
-          <a:blip r:embed="rId3"/>
-          <a:srcRect l="3566" r="779" b="2145"/>
-          <a:stretch/>
-        </p:blipFill>
-        <p:spPr>
+        </p:nvSpPr>
+        <p:spPr bwMode="auto">
           <a:xfrm>
-            <a:off x="213361" y="785542"/>
-            <a:ext cx="5572606" cy="3679778"/>
+            <a:off x="273677" y="755868"/>
+            <a:ext cx="8161663" cy="1323439"/>
           </a:xfrm>
           <a:prstGeom prst="rect">
             <a:avLst/>
           </a:prstGeom>
-        </p:spPr>
-      </p:pic>
-      <p:pic>
-        <p:nvPicPr>
-          <p:cNvPr id="8" name="Picture 7">
-            <a:extLst>
-              <a:ext uri="{FF2B5EF4-FFF2-40B4-BE49-F238E27FC236}">
-                <a16:creationId xmlns:a16="http://schemas.microsoft.com/office/drawing/2014/main" id="{38DE2BC1-888B-4C1D-978C-F6BB9FC303AD}"/>
-              </a:ext>
-            </a:extLst>
-          </p:cNvPr>
-          <p:cNvPicPr>
-            <a:picLocks noChangeAspect="1"/>
-          </p:cNvPicPr>
-          <p:nvPr/>
-        </p:nvPicPr>
-        <p:blipFill rotWithShape="1">
-          <a:blip r:embed="rId4"/>
-          <a:srcRect l="3903" b="10497"/>
-          <a:stretch/>
-        </p:blipFill>
-        <p:spPr>
-          <a:xfrm>
-            <a:off x="3656829" y="930609"/>
-            <a:ext cx="5181605" cy="783891"/>
-          </a:xfrm>
-          <a:prstGeom prst="rect">
-            <a:avLst/>
-          </a:prstGeom>
-        </p:spPr>
-      </p:pic>
+          <a:noFill/>
+          <a:ln w="12700" cap="sq" algn="ctr">
+            <a:noFill/>
+            <a:miter lim="800000"/>
+            <a:headEnd/>
+            <a:tailEnd/>
+          </a:ln>
+          <a:effectLst/>
+        </p:spPr>
+        <p:txBody>
+          <a:bodyPr wrap="square" rtlCol="0">
+            <a:spAutoFit/>
+          </a:bodyPr>
+          <a:lstStyle/>
+          <a:p>
+            <a:pPr marL="285750" indent="-285750">
+              <a:buFont typeface="Arial" panose="020B0604020202020204" pitchFamily="34" charset="0"/>
+              <a:buChar char="•"/>
+            </a:pPr>
+            <a:r>
+              <a:rPr lang="en-US" sz="1600" dirty="0">
+                <a:solidFill>
+                  <a:schemeClr val="tx1">
+                    <a:lumMod val="75000"/>
+                    <a:lumOff val="25000"/>
+                  </a:schemeClr>
+                </a:solidFill>
+                <a:latin typeface="Tahoma" pitchFamily="34" charset="0"/>
+                <a:cs typeface="Tahoma" pitchFamily="34" charset="0"/>
+              </a:rPr>
+              <a:t>If S is a subtype of T, then objects of type T may be replaced with objects of type S without breaking core functionality.</a:t>
+            </a:r>
+          </a:p>
+          <a:p>
+            <a:pPr marL="742950" lvl="1" indent="-285750">
+              <a:buFont typeface="Arial" panose="020B0604020202020204" pitchFamily="34" charset="0"/>
+              <a:buChar char="•"/>
+            </a:pPr>
+            <a:r>
+              <a:rPr lang="en-US" sz="1600" dirty="0">
+                <a:solidFill>
+                  <a:schemeClr val="tx1">
+                    <a:lumMod val="75000"/>
+                    <a:lumOff val="25000"/>
+                  </a:schemeClr>
+                </a:solidFill>
+                <a:latin typeface="Tahoma" pitchFamily="34" charset="0"/>
+                <a:cs typeface="Tahoma" pitchFamily="34" charset="0"/>
+              </a:rPr>
+              <a:t>(More formally called “Strong Behavioral Subtyping”)</a:t>
+            </a:r>
+          </a:p>
+          <a:p>
+            <a:pPr marL="742950" lvl="1" indent="-285750">
+              <a:buFont typeface="Arial" panose="020B0604020202020204" pitchFamily="34" charset="0"/>
+              <a:buChar char="•"/>
+            </a:pPr>
+            <a:r>
+              <a:rPr lang="en-US" sz="1600" dirty="0">
+                <a:solidFill>
+                  <a:schemeClr val="tx1">
+                    <a:lumMod val="75000"/>
+                    <a:lumOff val="25000"/>
+                  </a:schemeClr>
+                </a:solidFill>
+                <a:latin typeface="Tahoma" pitchFamily="34" charset="0"/>
+                <a:cs typeface="Tahoma" pitchFamily="34" charset="0"/>
+              </a:rPr>
+              <a:t>“A sub-class can assume the place of its super-class without errors”</a:t>
+            </a:r>
+          </a:p>
+          <a:p>
+            <a:pPr marL="285750" indent="-285750">
+              <a:buFont typeface="Arial" panose="020B0604020202020204" pitchFamily="34" charset="0"/>
+              <a:buChar char="•"/>
+            </a:pPr>
+            <a:r>
+              <a:rPr lang="en-US" sz="1600" dirty="0" err="1">
+                <a:solidFill>
+                  <a:schemeClr val="tx1">
+                    <a:lumMod val="75000"/>
+                    <a:lumOff val="25000"/>
+                  </a:schemeClr>
+                </a:solidFill>
+                <a:latin typeface="Tahoma" pitchFamily="34" charset="0"/>
+                <a:cs typeface="Tahoma" pitchFamily="34" charset="0"/>
+              </a:rPr>
+              <a:t>Liskov</a:t>
+            </a:r>
+            <a:r>
+              <a:rPr lang="en-US" sz="1600" dirty="0">
+                <a:solidFill>
+                  <a:schemeClr val="tx1">
+                    <a:lumMod val="75000"/>
+                    <a:lumOff val="25000"/>
+                  </a:schemeClr>
+                </a:solidFill>
+                <a:latin typeface="Tahoma" pitchFamily="34" charset="0"/>
+                <a:cs typeface="Tahoma" pitchFamily="34" charset="0"/>
+              </a:rPr>
+              <a:t> should be a test of whether or not your abstraction is correct</a:t>
+            </a:r>
+          </a:p>
+        </p:txBody>
+      </p:sp>
     </p:spTree>
     <p:extLst>
       <p:ext uri="{BB962C8B-B14F-4D97-AF65-F5344CB8AC3E}">
-        <p14:creationId xmlns:p14="http://schemas.microsoft.com/office/powerpoint/2010/main" val="2554116379"/>
+        <p14:creationId xmlns:p14="http://schemas.microsoft.com/office/powerpoint/2010/main" val="1707016187"/>
       </p:ext>
     </p:extLst>
   </p:cSld>
@@ -9799,6 +10618,112 @@
       </p:grpSpPr>
       <p:sp>
         <p:nvSpPr>
+          <p:cNvPr id="7" name="Title 6"/>
+          <p:cNvSpPr>
+            <a:spLocks noGrp="1"/>
+          </p:cNvSpPr>
+          <p:nvPr>
+            <p:ph type="title"/>
+          </p:nvPr>
+        </p:nvSpPr>
+        <p:spPr/>
+        <p:txBody>
+          <a:bodyPr>
+            <a:normAutofit/>
+          </a:bodyPr>
+          <a:lstStyle/>
+          <a:p>
+            <a:r>
+              <a:rPr lang="en-US" dirty="0" err="1"/>
+              <a:t>Liskov</a:t>
+            </a:r>
+            <a:r>
+              <a:rPr lang="en-US" dirty="0"/>
+              <a:t> Substitution Overview</a:t>
+            </a:r>
+          </a:p>
+        </p:txBody>
+      </p:sp>
+      <p:pic>
+        <p:nvPicPr>
+          <p:cNvPr id="2050" name="Picture 2" descr="https://image.ibb.co/cyshi7/lsp.jpg">
+            <a:extLst>
+              <a:ext uri="{FF2B5EF4-FFF2-40B4-BE49-F238E27FC236}">
+                <a16:creationId xmlns:a16="http://schemas.microsoft.com/office/drawing/2014/main" id="{5BD9D26E-A1FB-4D3D-A02F-6AB6F16FEA4E}"/>
+              </a:ext>
+            </a:extLst>
+          </p:cNvPr>
+          <p:cNvPicPr>
+            <a:picLocks noChangeAspect="1" noChangeArrowheads="1"/>
+          </p:cNvPicPr>
+          <p:nvPr/>
+        </p:nvPicPr>
+        <p:blipFill>
+          <a:blip r:embed="rId3">
+            <a:extLst>
+              <a:ext uri="{28A0092B-C50C-407E-A947-70E740481C1C}">
+                <a14:useLocalDpi xmlns:a14="http://schemas.microsoft.com/office/drawing/2010/main" val="0"/>
+              </a:ext>
+            </a:extLst>
+          </a:blip>
+          <a:srcRect/>
+          <a:stretch>
+            <a:fillRect/>
+          </a:stretch>
+        </p:blipFill>
+        <p:spPr bwMode="auto">
+          <a:xfrm>
+            <a:off x="1554480" y="735616"/>
+            <a:ext cx="4815840" cy="3860197"/>
+          </a:xfrm>
+          <a:prstGeom prst="rect">
+            <a:avLst/>
+          </a:prstGeom>
+          <a:noFill/>
+          <a:extLst>
+            <a:ext uri="{909E8E84-426E-40DD-AFC4-6F175D3DCCD1}">
+              <a14:hiddenFill xmlns:a14="http://schemas.microsoft.com/office/drawing/2010/main">
+                <a:solidFill>
+                  <a:srgbClr val="FFFFFF"/>
+                </a:solidFill>
+              </a14:hiddenFill>
+            </a:ext>
+          </a:extLst>
+        </p:spPr>
+      </p:pic>
+    </p:spTree>
+    <p:extLst>
+      <p:ext uri="{BB962C8B-B14F-4D97-AF65-F5344CB8AC3E}">
+        <p14:creationId xmlns:p14="http://schemas.microsoft.com/office/powerpoint/2010/main" val="62534435"/>
+      </p:ext>
+    </p:extLst>
+  </p:cSld>
+  <p:clrMapOvr>
+    <a:masterClrMapping/>
+  </p:clrMapOvr>
+  <p:transition/>
+</p:sld>
+</file>
+
+<file path=ppt/slides/slide12.xml><?xml version="1.0" encoding="utf-8"?>
+<p:sld xmlns:a="http://schemas.openxmlformats.org/drawingml/2006/main" xmlns:r="http://schemas.openxmlformats.org/officeDocument/2006/relationships" xmlns:p="http://schemas.openxmlformats.org/presentationml/2006/main">
+  <p:cSld>
+    <p:spTree>
+      <p:nvGrpSpPr>
+        <p:cNvPr id="1" name=""/>
+        <p:cNvGrpSpPr/>
+        <p:nvPr/>
+      </p:nvGrpSpPr>
+      <p:grpSpPr>
+        <a:xfrm>
+          <a:off x="0" y="0"/>
+          <a:ext cx="0" cy="0"/>
+          <a:chOff x="0" y="0"/>
+          <a:chExt cx="0" cy="0"/>
+        </a:xfrm>
+      </p:grpSpPr>
+      <p:sp>
+        <p:nvSpPr>
           <p:cNvPr id="5" name="Title 4"/>
           <p:cNvSpPr>
             <a:spLocks noGrp="1"/>
@@ -9851,7 +10776,7 @@
 </p:sld>
 </file>
 
-<file path=ppt/slides/slide12.xml><?xml version="1.0" encoding="utf-8"?>
+<file path=ppt/slides/slide13.xml><?xml version="1.0" encoding="utf-8"?>
 <p:sld xmlns:a="http://schemas.openxmlformats.org/drawingml/2006/main" xmlns:r="http://schemas.openxmlformats.org/officeDocument/2006/relationships" xmlns:p="http://schemas.openxmlformats.org/presentationml/2006/main">
   <p:cSld>
     <p:spTree>
@@ -9944,7 +10869,7 @@
 </p:sld>
 </file>
 
-<file path=ppt/slides/slide13.xml><?xml version="1.0" encoding="utf-8"?>
+<file path=ppt/slides/slide14.xml><?xml version="1.0" encoding="utf-8"?>
 <p:sld xmlns:a="http://schemas.openxmlformats.org/drawingml/2006/main" xmlns:r="http://schemas.openxmlformats.org/officeDocument/2006/relationships" xmlns:p="http://schemas.openxmlformats.org/presentationml/2006/main">
   <p:cSld>
     <p:spTree>
@@ -10034,7 +10959,7 @@
 </p:sld>
 </file>
 
-<file path=ppt/slides/slide14.xml><?xml version="1.0" encoding="utf-8"?>
+<file path=ppt/slides/slide15.xml><?xml version="1.0" encoding="utf-8"?>
 <p:sld xmlns:a="http://schemas.openxmlformats.org/drawingml/2006/main" xmlns:r="http://schemas.openxmlformats.org/officeDocument/2006/relationships" xmlns:p="http://schemas.openxmlformats.org/presentationml/2006/main">
   <p:cSld>
     <p:spTree>
@@ -10124,7 +11049,7 @@
 </p:sld>
 </file>
 
-<file path=ppt/slides/slide15.xml><?xml version="1.0" encoding="utf-8"?>
+<file path=ppt/slides/slide16.xml><?xml version="1.0" encoding="utf-8"?>
 <p:sld xmlns:a="http://schemas.openxmlformats.org/drawingml/2006/main" xmlns:r="http://schemas.openxmlformats.org/officeDocument/2006/relationships" xmlns:p="http://schemas.openxmlformats.org/presentationml/2006/main">
   <p:cSld>
     <p:spTree>
@@ -10214,7 +11139,7 @@
 </p:sld>
 </file>
 
-<file path=ppt/slides/slide16.xml><?xml version="1.0" encoding="utf-8"?>
+<file path=ppt/slides/slide17.xml><?xml version="1.0" encoding="utf-8"?>
 <p:sld xmlns:a="http://schemas.openxmlformats.org/drawingml/2006/main" xmlns:r="http://schemas.openxmlformats.org/officeDocument/2006/relationships" xmlns:p="http://schemas.openxmlformats.org/presentationml/2006/main">
   <p:cSld>
     <p:spTree>
@@ -10276,6 +11201,229 @@
     <p:extLst>
       <p:ext uri="{BB962C8B-B14F-4D97-AF65-F5344CB8AC3E}">
         <p14:creationId xmlns:p14="http://schemas.microsoft.com/office/powerpoint/2010/main" val="3927301540"/>
+      </p:ext>
+    </p:extLst>
+  </p:cSld>
+  <p:clrMapOvr>
+    <a:masterClrMapping/>
+  </p:clrMapOvr>
+</p:sld>
+</file>
+
+<file path=ppt/slides/slide18.xml><?xml version="1.0" encoding="utf-8"?>
+<p:sld xmlns:a="http://schemas.openxmlformats.org/drawingml/2006/main" xmlns:r="http://schemas.openxmlformats.org/officeDocument/2006/relationships" xmlns:p="http://schemas.openxmlformats.org/presentationml/2006/main">
+  <p:cSld>
+    <p:spTree>
+      <p:nvGrpSpPr>
+        <p:cNvPr id="1" name=""/>
+        <p:cNvGrpSpPr/>
+        <p:nvPr/>
+      </p:nvGrpSpPr>
+      <p:grpSpPr>
+        <a:xfrm>
+          <a:off x="0" y="0"/>
+          <a:ext cx="0" cy="0"/>
+          <a:chOff x="0" y="0"/>
+          <a:chExt cx="0" cy="0"/>
+        </a:xfrm>
+      </p:grpSpPr>
+      <p:sp>
+        <p:nvSpPr>
+          <p:cNvPr id="2" name="Text Placeholder 1">
+            <a:extLst>
+              <a:ext uri="{FF2B5EF4-FFF2-40B4-BE49-F238E27FC236}">
+                <a16:creationId xmlns:a16="http://schemas.microsoft.com/office/drawing/2014/main" id="{0F9C6D09-CE01-4F50-B3AD-27A535F38531}"/>
+              </a:ext>
+            </a:extLst>
+          </p:cNvPr>
+          <p:cNvSpPr>
+            <a:spLocks noGrp="1"/>
+          </p:cNvSpPr>
+          <p:nvPr>
+            <p:ph type="body" sz="quarter" idx="10"/>
+          </p:nvPr>
+        </p:nvSpPr>
+        <p:spPr/>
+        <p:txBody>
+          <a:bodyPr/>
+          <a:lstStyle/>
+          <a:p>
+            <a:r>
+              <a:rPr lang="en-US" dirty="0"/>
+              <a:t>Many people think of OOP as high-level objects </a:t>
+            </a:r>
+            <a:r>
+              <a:rPr lang="en-US" i="1" dirty="0"/>
+              <a:t>depending</a:t>
+            </a:r>
+            <a:r>
+              <a:rPr lang="en-US" dirty="0"/>
+              <a:t> on low-level objects</a:t>
+            </a:r>
+          </a:p>
+          <a:p>
+            <a:pPr lvl="1"/>
+            <a:r>
+              <a:rPr lang="en-US" dirty="0" err="1"/>
+              <a:t>ie</a:t>
+            </a:r>
+            <a:r>
+              <a:rPr lang="en-US" dirty="0"/>
+              <a:t>: A data processor should be dependent on the data output source</a:t>
+            </a:r>
+          </a:p>
+          <a:p>
+            <a:r>
+              <a:rPr lang="en-US" dirty="0"/>
+              <a:t>Dependency Inversion works to decouple modules by making both high and low-level objects be independent</a:t>
+            </a:r>
+          </a:p>
+          <a:p>
+            <a:pPr lvl="1"/>
+            <a:r>
+              <a:rPr lang="en-US" dirty="0"/>
+              <a:t>This is accomplished by having their requirements/behaviors generalized through interfaces</a:t>
+            </a:r>
+          </a:p>
+        </p:txBody>
+      </p:sp>
+      <p:sp>
+        <p:nvSpPr>
+          <p:cNvPr id="3" name="Title 2">
+            <a:extLst>
+              <a:ext uri="{FF2B5EF4-FFF2-40B4-BE49-F238E27FC236}">
+                <a16:creationId xmlns:a16="http://schemas.microsoft.com/office/drawing/2014/main" id="{94C53BB9-312F-45FF-9417-8D3D156A579F}"/>
+              </a:ext>
+            </a:extLst>
+          </p:cNvPr>
+          <p:cNvSpPr>
+            <a:spLocks noGrp="1"/>
+          </p:cNvSpPr>
+          <p:nvPr>
+            <p:ph type="title"/>
+          </p:nvPr>
+        </p:nvSpPr>
+        <p:spPr/>
+        <p:txBody>
+          <a:bodyPr/>
+          <a:lstStyle/>
+          <a:p>
+            <a:r>
+              <a:rPr lang="en-US" dirty="0"/>
+              <a:t>Dependency Inversion Overview</a:t>
+            </a:r>
+          </a:p>
+        </p:txBody>
+      </p:sp>
+    </p:spTree>
+    <p:extLst>
+      <p:ext uri="{BB962C8B-B14F-4D97-AF65-F5344CB8AC3E}">
+        <p14:creationId xmlns:p14="http://schemas.microsoft.com/office/powerpoint/2010/main" val="1607921448"/>
+      </p:ext>
+    </p:extLst>
+  </p:cSld>
+  <p:clrMapOvr>
+    <a:masterClrMapping/>
+  </p:clrMapOvr>
+</p:sld>
+</file>
+
+<file path=ppt/slides/slide19.xml><?xml version="1.0" encoding="utf-8"?>
+<p:sld xmlns:a="http://schemas.openxmlformats.org/drawingml/2006/main" xmlns:r="http://schemas.openxmlformats.org/officeDocument/2006/relationships" xmlns:p="http://schemas.openxmlformats.org/presentationml/2006/main">
+  <p:cSld>
+    <p:spTree>
+      <p:nvGrpSpPr>
+        <p:cNvPr id="1" name=""/>
+        <p:cNvGrpSpPr/>
+        <p:nvPr/>
+      </p:nvGrpSpPr>
+      <p:grpSpPr>
+        <a:xfrm>
+          <a:off x="0" y="0"/>
+          <a:ext cx="0" cy="0"/>
+          <a:chOff x="0" y="0"/>
+          <a:chExt cx="0" cy="0"/>
+        </a:xfrm>
+      </p:grpSpPr>
+      <p:sp>
+        <p:nvSpPr>
+          <p:cNvPr id="3" name="Title 2">
+            <a:extLst>
+              <a:ext uri="{FF2B5EF4-FFF2-40B4-BE49-F238E27FC236}">
+                <a16:creationId xmlns:a16="http://schemas.microsoft.com/office/drawing/2014/main" id="{64C05A22-A6B9-412F-8D26-8A4BAD23D3E3}"/>
+              </a:ext>
+            </a:extLst>
+          </p:cNvPr>
+          <p:cNvSpPr>
+            <a:spLocks noGrp="1"/>
+          </p:cNvSpPr>
+          <p:nvPr>
+            <p:ph type="title"/>
+          </p:nvPr>
+        </p:nvSpPr>
+        <p:spPr/>
+        <p:txBody>
+          <a:bodyPr/>
+          <a:lstStyle/>
+          <a:p>
+            <a:r>
+              <a:rPr lang="en-US" dirty="0"/>
+              <a:t>Dependency Inversion Overview</a:t>
+            </a:r>
+          </a:p>
+        </p:txBody>
+      </p:sp>
+      <p:pic>
+        <p:nvPicPr>
+          <p:cNvPr id="3074" name="Picture 2" descr="http://2.bp.blogspot.com/-55Kb5azAeVE/UG21vknR4iI/AAAAAAAAHdU/-FA_lJIe_tQ/s1600/Dependency+Inversion+Principle.jpeg">
+            <a:extLst>
+              <a:ext uri="{FF2B5EF4-FFF2-40B4-BE49-F238E27FC236}">
+                <a16:creationId xmlns:a16="http://schemas.microsoft.com/office/drawing/2014/main" id="{40765C1F-2DD5-4673-AD1E-1DE5CDA15673}"/>
+              </a:ext>
+            </a:extLst>
+          </p:cNvPr>
+          <p:cNvPicPr>
+            <a:picLocks noChangeAspect="1" noChangeArrowheads="1"/>
+          </p:cNvPicPr>
+          <p:nvPr/>
+        </p:nvPicPr>
+        <p:blipFill>
+          <a:blip r:embed="rId2">
+            <a:extLst>
+              <a:ext uri="{28A0092B-C50C-407E-A947-70E740481C1C}">
+                <a14:useLocalDpi xmlns:a14="http://schemas.microsoft.com/office/drawing/2010/main" val="0"/>
+              </a:ext>
+            </a:extLst>
+          </a:blip>
+          <a:srcRect/>
+          <a:stretch>
+            <a:fillRect/>
+          </a:stretch>
+        </p:blipFill>
+        <p:spPr bwMode="auto">
+          <a:xfrm>
+            <a:off x="1996440" y="852190"/>
+            <a:ext cx="4692968" cy="3754374"/>
+          </a:xfrm>
+          <a:prstGeom prst="rect">
+            <a:avLst/>
+          </a:prstGeom>
+          <a:noFill/>
+          <a:extLst>
+            <a:ext uri="{909E8E84-426E-40DD-AFC4-6F175D3DCCD1}">
+              <a14:hiddenFill xmlns:a14="http://schemas.microsoft.com/office/drawing/2010/main">
+                <a:solidFill>
+                  <a:srgbClr val="FFFFFF"/>
+                </a:solidFill>
+              </a14:hiddenFill>
+            </a:ext>
+          </a:extLst>
+        </p:spPr>
+      </p:pic>
+    </p:spTree>
+    <p:extLst>
+      <p:ext uri="{BB962C8B-B14F-4D97-AF65-F5344CB8AC3E}">
+        <p14:creationId xmlns:p14="http://schemas.microsoft.com/office/powerpoint/2010/main" val="1513214596"/>
       </p:ext>
     </p:extLst>
   </p:cSld>
@@ -10356,6 +11504,186 @@
 </p:sld>
 </file>
 
+<file path=ppt/slides/slide20.xml><?xml version="1.0" encoding="utf-8"?>
+<p:sld xmlns:a="http://schemas.openxmlformats.org/drawingml/2006/main" xmlns:r="http://schemas.openxmlformats.org/officeDocument/2006/relationships" xmlns:p="http://schemas.openxmlformats.org/presentationml/2006/main">
+  <p:cSld>
+    <p:spTree>
+      <p:nvGrpSpPr>
+        <p:cNvPr id="1" name=""/>
+        <p:cNvGrpSpPr/>
+        <p:nvPr/>
+      </p:nvGrpSpPr>
+      <p:grpSpPr>
+        <a:xfrm>
+          <a:off x="0" y="0"/>
+          <a:ext cx="0" cy="0"/>
+          <a:chOff x="0" y="0"/>
+          <a:chExt cx="0" cy="0"/>
+        </a:xfrm>
+      </p:grpSpPr>
+      <p:sp>
+        <p:nvSpPr>
+          <p:cNvPr id="7" name="Title 6"/>
+          <p:cNvSpPr>
+            <a:spLocks noGrp="1"/>
+          </p:cNvSpPr>
+          <p:nvPr>
+            <p:ph type="title"/>
+          </p:nvPr>
+        </p:nvSpPr>
+        <p:spPr/>
+        <p:txBody>
+          <a:bodyPr>
+            <a:normAutofit/>
+          </a:bodyPr>
+          <a:lstStyle/>
+          <a:p>
+            <a:r>
+              <a:rPr lang="en-US" dirty="0"/>
+              <a:t>Bad </a:t>
+            </a:r>
+            <a:r>
+              <a:rPr lang="en-US" dirty="0" err="1"/>
+              <a:t>LockScreen</a:t>
+            </a:r>
+            <a:endParaRPr lang="en-US" dirty="0"/>
+          </a:p>
+        </p:txBody>
+      </p:sp>
+      <p:pic>
+        <p:nvPicPr>
+          <p:cNvPr id="3" name="Picture 2">
+            <a:extLst>
+              <a:ext uri="{FF2B5EF4-FFF2-40B4-BE49-F238E27FC236}">
+                <a16:creationId xmlns:a16="http://schemas.microsoft.com/office/drawing/2014/main" id="{22DC0933-A6ED-45FA-8321-0406E455671F}"/>
+              </a:ext>
+            </a:extLst>
+          </p:cNvPr>
+          <p:cNvPicPr>
+            <a:picLocks noChangeAspect="1"/>
+          </p:cNvPicPr>
+          <p:nvPr/>
+        </p:nvPicPr>
+        <p:blipFill>
+          <a:blip r:embed="rId3"/>
+          <a:stretch>
+            <a:fillRect/>
+          </a:stretch>
+        </p:blipFill>
+        <p:spPr>
+          <a:xfrm>
+            <a:off x="607183" y="797930"/>
+            <a:ext cx="7335274" cy="3791479"/>
+          </a:xfrm>
+          <a:prstGeom prst="rect">
+            <a:avLst/>
+          </a:prstGeom>
+        </p:spPr>
+      </p:pic>
+    </p:spTree>
+    <p:extLst>
+      <p:ext uri="{BB962C8B-B14F-4D97-AF65-F5344CB8AC3E}">
+        <p14:creationId xmlns:p14="http://schemas.microsoft.com/office/powerpoint/2010/main" val="895497124"/>
+      </p:ext>
+    </p:extLst>
+  </p:cSld>
+  <p:clrMapOvr>
+    <a:masterClrMapping/>
+  </p:clrMapOvr>
+  <p:transition/>
+</p:sld>
+</file>
+
+<file path=ppt/slides/slide21.xml><?xml version="1.0" encoding="utf-8"?>
+<p:sld xmlns:a="http://schemas.openxmlformats.org/drawingml/2006/main" xmlns:r="http://schemas.openxmlformats.org/officeDocument/2006/relationships" xmlns:p="http://schemas.openxmlformats.org/presentationml/2006/main">
+  <p:cSld>
+    <p:spTree>
+      <p:nvGrpSpPr>
+        <p:cNvPr id="1" name=""/>
+        <p:cNvGrpSpPr/>
+        <p:nvPr/>
+      </p:nvGrpSpPr>
+      <p:grpSpPr>
+        <a:xfrm>
+          <a:off x="0" y="0"/>
+          <a:ext cx="0" cy="0"/>
+          <a:chOff x="0" y="0"/>
+          <a:chExt cx="0" cy="0"/>
+        </a:xfrm>
+      </p:grpSpPr>
+      <p:sp>
+        <p:nvSpPr>
+          <p:cNvPr id="7" name="Title 6"/>
+          <p:cNvSpPr>
+            <a:spLocks noGrp="1"/>
+          </p:cNvSpPr>
+          <p:nvPr>
+            <p:ph type="title"/>
+          </p:nvPr>
+        </p:nvSpPr>
+        <p:spPr/>
+        <p:txBody>
+          <a:bodyPr>
+            <a:normAutofit/>
+          </a:bodyPr>
+          <a:lstStyle/>
+          <a:p>
+            <a:r>
+              <a:rPr lang="en-US" dirty="0"/>
+              <a:t>Good </a:t>
+            </a:r>
+            <a:r>
+              <a:rPr lang="en-US" dirty="0" err="1"/>
+              <a:t>LockScreen</a:t>
+            </a:r>
+            <a:endParaRPr lang="en-US" dirty="0"/>
+          </a:p>
+        </p:txBody>
+      </p:sp>
+      <p:pic>
+        <p:nvPicPr>
+          <p:cNvPr id="4" name="Picture 3">
+            <a:extLst>
+              <a:ext uri="{FF2B5EF4-FFF2-40B4-BE49-F238E27FC236}">
+                <a16:creationId xmlns:a16="http://schemas.microsoft.com/office/drawing/2014/main" id="{6E33723B-8977-47A3-8F82-72D48C5BC2FE}"/>
+              </a:ext>
+            </a:extLst>
+          </p:cNvPr>
+          <p:cNvPicPr>
+            <a:picLocks noChangeAspect="1"/>
+          </p:cNvPicPr>
+          <p:nvPr/>
+        </p:nvPicPr>
+        <p:blipFill>
+          <a:blip r:embed="rId3"/>
+          <a:stretch>
+            <a:fillRect/>
+          </a:stretch>
+        </p:blipFill>
+        <p:spPr>
+          <a:xfrm>
+            <a:off x="705441" y="849374"/>
+            <a:ext cx="5172797" cy="3658111"/>
+          </a:xfrm>
+          <a:prstGeom prst="rect">
+            <a:avLst/>
+          </a:prstGeom>
+        </p:spPr>
+      </p:pic>
+    </p:spTree>
+    <p:extLst>
+      <p:ext uri="{BB962C8B-B14F-4D97-AF65-F5344CB8AC3E}">
+        <p14:creationId xmlns:p14="http://schemas.microsoft.com/office/powerpoint/2010/main" val="4243480717"/>
+      </p:ext>
+    </p:extLst>
+  </p:cSld>
+  <p:clrMapOvr>
+    <a:masterClrMapping/>
+  </p:clrMapOvr>
+  <p:transition/>
+</p:sld>
+</file>
+
 <file path=ppt/slides/slide3.xml><?xml version="1.0" encoding="utf-8"?>
 <p:sld xmlns:a="http://schemas.openxmlformats.org/drawingml/2006/main" xmlns:r="http://schemas.openxmlformats.org/officeDocument/2006/relationships" xmlns:p="http://schemas.openxmlformats.org/presentationml/2006/main">
   <p:cSld>
@@ -10392,45 +11720,146 @@
           <a:p>
             <a:r>
               <a:rPr lang="en-US" dirty="0"/>
-              <a:t>Bad Soccer Player</a:t>
+              <a:t>Single Responsibility Overview</a:t>
             </a:r>
           </a:p>
         </p:txBody>
       </p:sp>
-      <p:pic>
-        <p:nvPicPr>
-          <p:cNvPr id="8" name="Picture 7">
+      <p:sp>
+        <p:nvSpPr>
+          <p:cNvPr id="2" name="TextBox 1">
             <a:extLst>
               <a:ext uri="{FF2B5EF4-FFF2-40B4-BE49-F238E27FC236}">
-                <a16:creationId xmlns:a16="http://schemas.microsoft.com/office/drawing/2014/main" id="{A04A4EC0-27E5-4951-B5A8-D0E001C8F38E}"/>
+                <a16:creationId xmlns:a16="http://schemas.microsoft.com/office/drawing/2014/main" id="{B35B1041-8099-49DD-AFA9-BDB74A2128E1}"/>
               </a:ext>
             </a:extLst>
           </p:cNvPr>
-          <p:cNvPicPr>
-            <a:picLocks noChangeAspect="1"/>
-          </p:cNvPicPr>
+          <p:cNvSpPr txBox="1"/>
           <p:nvPr/>
-        </p:nvPicPr>
-        <p:blipFill>
-          <a:blip r:embed="rId3"/>
-          <a:stretch>
-            <a:fillRect/>
-          </a:stretch>
-        </p:blipFill>
-        <p:spPr>
+        </p:nvSpPr>
+        <p:spPr bwMode="auto">
           <a:xfrm>
-            <a:off x="1050917" y="719045"/>
-            <a:ext cx="6546223" cy="3705409"/>
+            <a:off x="273677" y="1554480"/>
+            <a:ext cx="8161663" cy="1569660"/>
           </a:xfrm>
           <a:prstGeom prst="rect">
             <a:avLst/>
           </a:prstGeom>
-        </p:spPr>
-      </p:pic>
+          <a:noFill/>
+          <a:ln w="12700" cap="sq" algn="ctr">
+            <a:noFill/>
+            <a:miter lim="800000"/>
+            <a:headEnd/>
+            <a:tailEnd/>
+          </a:ln>
+          <a:effectLst/>
+        </p:spPr>
+        <p:txBody>
+          <a:bodyPr wrap="square" rtlCol="0">
+            <a:spAutoFit/>
+          </a:bodyPr>
+          <a:lstStyle/>
+          <a:p>
+            <a:pPr marL="285750" indent="-285750">
+              <a:buFont typeface="Arial" panose="020B0604020202020204" pitchFamily="34" charset="0"/>
+              <a:buChar char="•"/>
+            </a:pPr>
+            <a:r>
+              <a:rPr lang="en-US" sz="1600" dirty="0">
+                <a:solidFill>
+                  <a:schemeClr val="tx1">
+                    <a:lumMod val="75000"/>
+                    <a:lumOff val="25000"/>
+                  </a:schemeClr>
+                </a:solidFill>
+                <a:latin typeface="Tahoma" pitchFamily="34" charset="0"/>
+                <a:cs typeface="Tahoma" pitchFamily="34" charset="0"/>
+              </a:rPr>
+              <a:t>A single module/class should have exactly one functional responsibility</a:t>
+            </a:r>
+          </a:p>
+          <a:p>
+            <a:pPr marL="285750" indent="-285750">
+              <a:buFont typeface="Arial" panose="020B0604020202020204" pitchFamily="34" charset="0"/>
+              <a:buChar char="•"/>
+            </a:pPr>
+            <a:r>
+              <a:rPr lang="en-US" sz="1600" dirty="0">
+                <a:solidFill>
+                  <a:schemeClr val="tx1">
+                    <a:lumMod val="75000"/>
+                    <a:lumOff val="25000"/>
+                  </a:schemeClr>
+                </a:solidFill>
+                <a:latin typeface="Tahoma" pitchFamily="34" charset="0"/>
+                <a:cs typeface="Tahoma" pitchFamily="34" charset="0"/>
+              </a:rPr>
+              <a:t>“Responsibility” can be thought of as a “reason to change”</a:t>
+            </a:r>
+          </a:p>
+          <a:p>
+            <a:pPr marL="742950" lvl="1" indent="-285750">
+              <a:buFont typeface="Arial" panose="020B0604020202020204" pitchFamily="34" charset="0"/>
+              <a:buChar char="•"/>
+            </a:pPr>
+            <a:r>
+              <a:rPr lang="en-US" sz="1600" dirty="0">
+                <a:solidFill>
+                  <a:schemeClr val="tx1">
+                    <a:lumMod val="75000"/>
+                    <a:lumOff val="25000"/>
+                  </a:schemeClr>
+                </a:solidFill>
+                <a:latin typeface="Tahoma" pitchFamily="34" charset="0"/>
+                <a:cs typeface="Tahoma" pitchFamily="34" charset="0"/>
+              </a:rPr>
+              <a:t>Each module/class should have one (and only one) reason to be rewritten/changed</a:t>
+            </a:r>
+          </a:p>
+          <a:p>
+            <a:pPr marL="285750" indent="-285750">
+              <a:buFont typeface="Arial" panose="020B0604020202020204" pitchFamily="34" charset="0"/>
+              <a:buChar char="•"/>
+            </a:pPr>
+            <a:r>
+              <a:rPr lang="en-US" sz="1600" dirty="0">
+                <a:solidFill>
+                  <a:schemeClr val="tx1">
+                    <a:lumMod val="75000"/>
+                    <a:lumOff val="25000"/>
+                  </a:schemeClr>
+                </a:solidFill>
+                <a:latin typeface="Tahoma" pitchFamily="34" charset="0"/>
+                <a:cs typeface="Tahoma" pitchFamily="34" charset="0"/>
+              </a:rPr>
+              <a:t>Forces code to be more modular/robust</a:t>
+            </a:r>
+          </a:p>
+          <a:p>
+            <a:pPr marL="742950" lvl="1" indent="-285750">
+              <a:buFont typeface="Arial" panose="020B0604020202020204" pitchFamily="34" charset="0"/>
+              <a:buChar char="•"/>
+            </a:pPr>
+            <a:r>
+              <a:rPr lang="en-US" sz="1600" dirty="0">
+                <a:solidFill>
+                  <a:schemeClr val="tx1">
+                    <a:lumMod val="75000"/>
+                    <a:lumOff val="25000"/>
+                  </a:schemeClr>
+                </a:solidFill>
+                <a:latin typeface="Tahoma" pitchFamily="34" charset="0"/>
+                <a:cs typeface="Tahoma" pitchFamily="34" charset="0"/>
+              </a:rPr>
+              <a:t>Easier to modify/test</a:t>
+            </a:r>
+          </a:p>
+        </p:txBody>
+      </p:sp>
     </p:spTree>
     <p:extLst>
       <p:ext uri="{BB962C8B-B14F-4D97-AF65-F5344CB8AC3E}">
-        <p14:creationId xmlns:p14="http://schemas.microsoft.com/office/powerpoint/2010/main" val="409676806"/>
+        <p14:creationId xmlns:p14="http://schemas.microsoft.com/office/powerpoint/2010/main" val="591778860"/>
       </p:ext>
     </p:extLst>
   </p:cSld>
@@ -10484,10 +11913,10 @@
       </p:sp>
       <p:pic>
         <p:nvPicPr>
-          <p:cNvPr id="3" name="Picture 2">
+          <p:cNvPr id="8" name="Picture 7">
             <a:extLst>
               <a:ext uri="{FF2B5EF4-FFF2-40B4-BE49-F238E27FC236}">
-                <a16:creationId xmlns:a16="http://schemas.microsoft.com/office/drawing/2014/main" id="{25E8393C-792B-45B1-8C3F-0567367C43C6}"/>
+                <a16:creationId xmlns:a16="http://schemas.microsoft.com/office/drawing/2014/main" id="{A04A4EC0-27E5-4951-B5A8-D0E001C8F38E}"/>
               </a:ext>
             </a:extLst>
           </p:cNvPr>
@@ -10504,8 +11933,8 @@
         </p:blipFill>
         <p:spPr>
           <a:xfrm>
-            <a:off x="428046" y="695063"/>
-            <a:ext cx="8287907" cy="3753374"/>
+            <a:off x="1050917" y="719045"/>
+            <a:ext cx="6546223" cy="3705409"/>
           </a:xfrm>
           <a:prstGeom prst="rect">
             <a:avLst/>
@@ -10515,7 +11944,7 @@
     </p:spTree>
     <p:extLst>
       <p:ext uri="{BB962C8B-B14F-4D97-AF65-F5344CB8AC3E}">
-        <p14:creationId xmlns:p14="http://schemas.microsoft.com/office/powerpoint/2010/main" val="2912219046"/>
+        <p14:creationId xmlns:p14="http://schemas.microsoft.com/office/powerpoint/2010/main" val="409676806"/>
       </p:ext>
     </p:extLst>
   </p:cSld>
@@ -10545,6 +11974,91 @@
       </p:grpSpPr>
       <p:sp>
         <p:nvSpPr>
+          <p:cNvPr id="7" name="Title 6"/>
+          <p:cNvSpPr>
+            <a:spLocks noGrp="1"/>
+          </p:cNvSpPr>
+          <p:nvPr>
+            <p:ph type="title"/>
+          </p:nvPr>
+        </p:nvSpPr>
+        <p:spPr/>
+        <p:txBody>
+          <a:bodyPr>
+            <a:normAutofit/>
+          </a:bodyPr>
+          <a:lstStyle/>
+          <a:p>
+            <a:r>
+              <a:rPr lang="en-US" dirty="0"/>
+              <a:t>Bad Soccer Player</a:t>
+            </a:r>
+          </a:p>
+        </p:txBody>
+      </p:sp>
+      <p:pic>
+        <p:nvPicPr>
+          <p:cNvPr id="3" name="Picture 2">
+            <a:extLst>
+              <a:ext uri="{FF2B5EF4-FFF2-40B4-BE49-F238E27FC236}">
+                <a16:creationId xmlns:a16="http://schemas.microsoft.com/office/drawing/2014/main" id="{25E8393C-792B-45B1-8C3F-0567367C43C6}"/>
+              </a:ext>
+            </a:extLst>
+          </p:cNvPr>
+          <p:cNvPicPr>
+            <a:picLocks noChangeAspect="1"/>
+          </p:cNvPicPr>
+          <p:nvPr/>
+        </p:nvPicPr>
+        <p:blipFill>
+          <a:blip r:embed="rId3"/>
+          <a:stretch>
+            <a:fillRect/>
+          </a:stretch>
+        </p:blipFill>
+        <p:spPr>
+          <a:xfrm>
+            <a:off x="428046" y="695063"/>
+            <a:ext cx="8287907" cy="3753374"/>
+          </a:xfrm>
+          <a:prstGeom prst="rect">
+            <a:avLst/>
+          </a:prstGeom>
+        </p:spPr>
+      </p:pic>
+    </p:spTree>
+    <p:extLst>
+      <p:ext uri="{BB962C8B-B14F-4D97-AF65-F5344CB8AC3E}">
+        <p14:creationId xmlns:p14="http://schemas.microsoft.com/office/powerpoint/2010/main" val="2912219046"/>
+      </p:ext>
+    </p:extLst>
+  </p:cSld>
+  <p:clrMapOvr>
+    <a:masterClrMapping/>
+  </p:clrMapOvr>
+  <p:transition/>
+</p:sld>
+</file>
+
+<file path=ppt/slides/slide6.xml><?xml version="1.0" encoding="utf-8"?>
+<p:sld xmlns:a="http://schemas.openxmlformats.org/drawingml/2006/main" xmlns:r="http://schemas.openxmlformats.org/officeDocument/2006/relationships" xmlns:p="http://schemas.openxmlformats.org/presentationml/2006/main">
+  <p:cSld>
+    <p:spTree>
+      <p:nvGrpSpPr>
+        <p:cNvPr id="1" name=""/>
+        <p:cNvGrpSpPr/>
+        <p:nvPr/>
+      </p:nvGrpSpPr>
+      <p:grpSpPr>
+        <a:xfrm>
+          <a:off x="0" y="0"/>
+          <a:ext cx="0" cy="0"/>
+          <a:chOff x="0" y="0"/>
+          <a:chExt cx="0" cy="0"/>
+        </a:xfrm>
+      </p:grpSpPr>
+      <p:sp>
+        <p:nvSpPr>
           <p:cNvPr id="5" name="Title 4"/>
           <p:cNvSpPr>
             <a:spLocks noGrp="1"/>
@@ -10597,7 +12111,7 @@
 </p:sld>
 </file>
 
-<file path=ppt/slides/slide6.xml><?xml version="1.0" encoding="utf-8"?>
+<file path=ppt/slides/slide7.xml><?xml version="1.0" encoding="utf-8"?>
 <p:sld xmlns:a="http://schemas.openxmlformats.org/drawingml/2006/main" xmlns:r="http://schemas.openxmlformats.org/officeDocument/2006/relationships" xmlns:p="http://schemas.openxmlformats.org/presentationml/2006/main">
   <p:cSld>
     <p:spTree>
@@ -10690,7 +12204,7 @@
 </p:sld>
 </file>
 
-<file path=ppt/slides/slide7.xml><?xml version="1.0" encoding="utf-8"?>
+<file path=ppt/slides/slide8.xml><?xml version="1.0" encoding="utf-8"?>
 <p:sld xmlns:a="http://schemas.openxmlformats.org/drawingml/2006/main" xmlns:r="http://schemas.openxmlformats.org/officeDocument/2006/relationships" xmlns:p="http://schemas.openxmlformats.org/presentationml/2006/main">
   <p:cSld>
     <p:spTree>
@@ -10799,76 +12313,6 @@
 </p:sld>
 </file>
 
-<file path=ppt/slides/slide8.xml><?xml version="1.0" encoding="utf-8"?>
-<p:sld xmlns:a="http://schemas.openxmlformats.org/drawingml/2006/main" xmlns:r="http://schemas.openxmlformats.org/officeDocument/2006/relationships" xmlns:p="http://schemas.openxmlformats.org/presentationml/2006/main">
-  <p:cSld>
-    <p:spTree>
-      <p:nvGrpSpPr>
-        <p:cNvPr id="1" name=""/>
-        <p:cNvGrpSpPr/>
-        <p:nvPr/>
-      </p:nvGrpSpPr>
-      <p:grpSpPr>
-        <a:xfrm>
-          <a:off x="0" y="0"/>
-          <a:ext cx="0" cy="0"/>
-          <a:chOff x="0" y="0"/>
-          <a:chExt cx="0" cy="0"/>
-        </a:xfrm>
-      </p:grpSpPr>
-      <p:sp>
-        <p:nvSpPr>
-          <p:cNvPr id="5" name="Title 4"/>
-          <p:cNvSpPr>
-            <a:spLocks noGrp="1"/>
-          </p:cNvSpPr>
-          <p:nvPr>
-            <p:ph type="ctrTitle"/>
-          </p:nvPr>
-        </p:nvSpPr>
-        <p:spPr/>
-        <p:txBody>
-          <a:bodyPr/>
-          <a:lstStyle/>
-          <a:p>
-            <a:r>
-              <a:rPr lang="en-US" dirty="0" err="1"/>
-              <a:t>Liskov</a:t>
-            </a:r>
-            <a:r>
-              <a:rPr lang="en-US" dirty="0"/>
-              <a:t> Substitution Principle</a:t>
-            </a:r>
-          </a:p>
-        </p:txBody>
-      </p:sp>
-      <p:sp>
-        <p:nvSpPr>
-          <p:cNvPr id="2" name="Subtitle 1"/>
-          <p:cNvSpPr>
-            <a:spLocks noGrp="1"/>
-          </p:cNvSpPr>
-          <p:nvPr>
-            <p:ph type="subTitle" idx="1"/>
-          </p:nvPr>
-        </p:nvSpPr>
-        <p:spPr/>
-        <p:txBody>
-          <a:bodyPr/>
-          <a:lstStyle/>
-          <a:p>
-            <a:endParaRPr lang="en-US" dirty="0"/>
-          </a:p>
-        </p:txBody>
-      </p:sp>
-    </p:spTree>
-  </p:cSld>
-  <p:clrMapOvr>
-    <a:masterClrMapping/>
-  </p:clrMapOvr>
-</p:sld>
-</file>
-
 <file path=ppt/slides/slide9.xml><?xml version="1.0" encoding="utf-8"?>
 <p:sld xmlns:a="http://schemas.openxmlformats.org/drawingml/2006/main" xmlns:r="http://schemas.openxmlformats.org/officeDocument/2006/relationships" xmlns:p="http://schemas.openxmlformats.org/presentationml/2006/main">
   <p:cSld>
@@ -10888,97 +12332,54 @@
       </p:grpSpPr>
       <p:sp>
         <p:nvSpPr>
-          <p:cNvPr id="7" name="Title 6"/>
+          <p:cNvPr id="5" name="Title 4"/>
           <p:cNvSpPr>
             <a:spLocks noGrp="1"/>
           </p:cNvSpPr>
           <p:nvPr>
-            <p:ph type="title"/>
+            <p:ph type="ctrTitle"/>
           </p:nvPr>
         </p:nvSpPr>
         <p:spPr/>
         <p:txBody>
-          <a:bodyPr>
-            <a:normAutofit/>
-          </a:bodyPr>
+          <a:bodyPr/>
           <a:lstStyle/>
           <a:p>
             <a:r>
+              <a:rPr lang="en-US" dirty="0" err="1"/>
+              <a:t>Liskov</a:t>
+            </a:r>
+            <a:r>
               <a:rPr lang="en-US" dirty="0"/>
-              <a:t>Bad Notifications</a:t>
+              <a:t> Substitution Principle</a:t>
             </a:r>
           </a:p>
         </p:txBody>
       </p:sp>
-      <p:pic>
-        <p:nvPicPr>
-          <p:cNvPr id="3" name="Picture 2">
-            <a:extLst>
-              <a:ext uri="{FF2B5EF4-FFF2-40B4-BE49-F238E27FC236}">
-                <a16:creationId xmlns:a16="http://schemas.microsoft.com/office/drawing/2014/main" id="{D3C19AEF-CEE3-495F-9710-596ACDC2732D}"/>
-              </a:ext>
-            </a:extLst>
-          </p:cNvPr>
-          <p:cNvPicPr>
-            <a:picLocks noChangeAspect="1"/>
-          </p:cNvPicPr>
-          <p:nvPr/>
-        </p:nvPicPr>
-        <p:blipFill rotWithShape="1">
-          <a:blip r:embed="rId3"/>
-          <a:srcRect l="4633" t="2208" r="892" b="2829"/>
-          <a:stretch/>
-        </p:blipFill>
-        <p:spPr>
-          <a:xfrm>
-            <a:off x="0" y="1040046"/>
-            <a:ext cx="4145280" cy="2301240"/>
-          </a:xfrm>
-          <a:prstGeom prst="rect">
-            <a:avLst/>
-          </a:prstGeom>
-        </p:spPr>
-      </p:pic>
-      <p:pic>
-        <p:nvPicPr>
-          <p:cNvPr id="5" name="Picture 4">
-            <a:extLst>
-              <a:ext uri="{FF2B5EF4-FFF2-40B4-BE49-F238E27FC236}">
-                <a16:creationId xmlns:a16="http://schemas.microsoft.com/office/drawing/2014/main" id="{28158E97-DAB2-4F88-968F-9F2B06601B53}"/>
-              </a:ext>
-            </a:extLst>
-          </p:cNvPr>
-          <p:cNvPicPr>
-            <a:picLocks noChangeAspect="1"/>
-          </p:cNvPicPr>
-          <p:nvPr/>
-        </p:nvPicPr>
-        <p:blipFill rotWithShape="1">
-          <a:blip r:embed="rId4"/>
-          <a:srcRect l="3266" b="2327"/>
-          <a:stretch/>
-        </p:blipFill>
-        <p:spPr>
-          <a:xfrm>
-            <a:off x="4145280" y="807552"/>
-            <a:ext cx="4992657" cy="3071028"/>
-          </a:xfrm>
-          <a:prstGeom prst="rect">
-            <a:avLst/>
-          </a:prstGeom>
-        </p:spPr>
-      </p:pic>
+      <p:sp>
+        <p:nvSpPr>
+          <p:cNvPr id="2" name="Subtitle 1"/>
+          <p:cNvSpPr>
+            <a:spLocks noGrp="1"/>
+          </p:cNvSpPr>
+          <p:nvPr>
+            <p:ph type="subTitle" idx="1"/>
+          </p:nvPr>
+        </p:nvSpPr>
+        <p:spPr/>
+        <p:txBody>
+          <a:bodyPr/>
+          <a:lstStyle/>
+          <a:p>
+            <a:endParaRPr lang="en-US" dirty="0"/>
+          </a:p>
+        </p:txBody>
+      </p:sp>
     </p:spTree>
-    <p:extLst>
-      <p:ext uri="{BB962C8B-B14F-4D97-AF65-F5344CB8AC3E}">
-        <p14:creationId xmlns:p14="http://schemas.microsoft.com/office/powerpoint/2010/main" val="2453648968"/>
-      </p:ext>
-    </p:extLst>
   </p:cSld>
   <p:clrMapOvr>
     <a:masterClrMapping/>
   </p:clrMapOvr>
-  <p:transition/>
 </p:sld>
 </file>
 
@@ -11924,18 +13325,18 @@
 </file>
 
 <file path=customXml/item1.xml><?xml version="1.0" encoding="utf-8"?>
-<p:properties xmlns:p="http://schemas.microsoft.com/office/2006/metadata/properties" xmlns:xsi="http://www.w3.org/2001/XMLSchema-instance">
-  <documentManagement/>
-</p:properties>
-</file>
-
-<file path=customXml/item2.xml><?xml version="1.0" encoding="utf-8"?>
 <?mso-contentType ?>
 <FormTemplates xmlns="http://schemas.microsoft.com/sharepoint/v3/contenttype/forms">
   <Display>DocumentLibraryForm</Display>
   <Edit>DocumentLibraryForm</Edit>
   <New>DocumentLibraryForm</New>
 </FormTemplates>
+</file>
+
+<file path=customXml/item2.xml><?xml version="1.0" encoding="utf-8"?>
+<p:properties xmlns:p="http://schemas.microsoft.com/office/2006/metadata/properties" xmlns:xsi="http://www.w3.org/2001/XMLSchema-instance">
+  <documentManagement/>
+</p:properties>
 </file>
 
 <file path=customXml/item3.xml><?xml version="1.0" encoding="utf-8"?>
@@ -11988,6 +13389,14 @@
 </file>
 
 <file path=customXml/itemProps1.xml><?xml version="1.0" encoding="utf-8"?>
+<ds:datastoreItem xmlns:ds="http://schemas.openxmlformats.org/officeDocument/2006/customXml" ds:itemID="{F135BDD1-A6DD-463F-96E1-1D64E8A54422}">
+  <ds:schemaRefs>
+    <ds:schemaRef ds:uri="http://schemas.microsoft.com/sharepoint/v3/contenttype/forms"/>
+  </ds:schemaRefs>
+</ds:datastoreItem>
+</file>
+
+<file path=customXml/itemProps2.xml><?xml version="1.0" encoding="utf-8"?>
 <ds:datastoreItem xmlns:ds="http://schemas.openxmlformats.org/officeDocument/2006/customXml" ds:itemID="{F3735A1A-98F5-44B9-9A7F-D3A37BCA6C65}">
   <ds:schemaRefs>
     <ds:schemaRef ds:uri="http://purl.org/dc/terms/"/>
@@ -11997,14 +13406,6 @@
     <ds:schemaRef ds:uri="http://schemas.microsoft.com/office/2006/metadata/properties"/>
     <ds:schemaRef ds:uri="http://schemas.microsoft.com/office/2006/documentManagement/types"/>
     <ds:schemaRef ds:uri="http://www.w3.org/XML/1998/namespace"/>
-  </ds:schemaRefs>
-</ds:datastoreItem>
-</file>
-
-<file path=customXml/itemProps2.xml><?xml version="1.0" encoding="utf-8"?>
-<ds:datastoreItem xmlns:ds="http://schemas.openxmlformats.org/officeDocument/2006/customXml" ds:itemID="{F135BDD1-A6DD-463F-96E1-1D64E8A54422}">
-  <ds:schemaRefs>
-    <ds:schemaRef ds:uri="http://schemas.microsoft.com/sharepoint/v3/contenttype/forms"/>
   </ds:schemaRefs>
 </ds:datastoreItem>
 </file>

</xml_diff>

<commit_message>
Added intro slides to the powerpoint
</commit_message>
<xml_diff>
--- a/PowerPoint/SOLID.pptx
+++ b/PowerPoint/SOLID.pptx
@@ -5,38 +5,42 @@
     <p:sldMasterId id="2147483779" r:id="rId4"/>
   </p:sldMasterIdLst>
   <p:notesMasterIdLst>
-    <p:notesMasterId r:id="rId31"/>
+    <p:notesMasterId r:id="rId35"/>
   </p:notesMasterIdLst>
   <p:handoutMasterIdLst>
-    <p:handoutMasterId r:id="rId32"/>
+    <p:handoutMasterId r:id="rId36"/>
   </p:handoutMasterIdLst>
   <p:sldIdLst>
     <p:sldId id="261" r:id="rId5"/>
-    <p:sldId id="276" r:id="rId6"/>
-    <p:sldId id="285" r:id="rId7"/>
-    <p:sldId id="279" r:id="rId8"/>
-    <p:sldId id="280" r:id="rId9"/>
-    <p:sldId id="277" r:id="rId10"/>
-    <p:sldId id="292" r:id="rId11"/>
-    <p:sldId id="269" r:id="rId12"/>
-    <p:sldId id="295" r:id="rId13"/>
-    <p:sldId id="270" r:id="rId14"/>
-    <p:sldId id="294" r:id="rId15"/>
-    <p:sldId id="263" r:id="rId16"/>
-    <p:sldId id="286" r:id="rId17"/>
-    <p:sldId id="287" r:id="rId18"/>
-    <p:sldId id="296" r:id="rId19"/>
-    <p:sldId id="272" r:id="rId20"/>
-    <p:sldId id="293" r:id="rId21"/>
-    <p:sldId id="271" r:id="rId22"/>
-    <p:sldId id="273" r:id="rId23"/>
-    <p:sldId id="274" r:id="rId24"/>
-    <p:sldId id="275" r:id="rId25"/>
-    <p:sldId id="278" r:id="rId26"/>
-    <p:sldId id="291" r:id="rId27"/>
-    <p:sldId id="290" r:id="rId28"/>
-    <p:sldId id="283" r:id="rId29"/>
-    <p:sldId id="284" r:id="rId30"/>
+    <p:sldId id="297" r:id="rId6"/>
+    <p:sldId id="298" r:id="rId7"/>
+    <p:sldId id="299" r:id="rId8"/>
+    <p:sldId id="300" r:id="rId9"/>
+    <p:sldId id="276" r:id="rId10"/>
+    <p:sldId id="285" r:id="rId11"/>
+    <p:sldId id="279" r:id="rId12"/>
+    <p:sldId id="280" r:id="rId13"/>
+    <p:sldId id="277" r:id="rId14"/>
+    <p:sldId id="292" r:id="rId15"/>
+    <p:sldId id="269" r:id="rId16"/>
+    <p:sldId id="295" r:id="rId17"/>
+    <p:sldId id="270" r:id="rId18"/>
+    <p:sldId id="294" r:id="rId19"/>
+    <p:sldId id="263" r:id="rId20"/>
+    <p:sldId id="286" r:id="rId21"/>
+    <p:sldId id="287" r:id="rId22"/>
+    <p:sldId id="296" r:id="rId23"/>
+    <p:sldId id="272" r:id="rId24"/>
+    <p:sldId id="293" r:id="rId25"/>
+    <p:sldId id="271" r:id="rId26"/>
+    <p:sldId id="273" r:id="rId27"/>
+    <p:sldId id="274" r:id="rId28"/>
+    <p:sldId id="275" r:id="rId29"/>
+    <p:sldId id="278" r:id="rId30"/>
+    <p:sldId id="291" r:id="rId31"/>
+    <p:sldId id="290" r:id="rId32"/>
+    <p:sldId id="283" r:id="rId33"/>
+    <p:sldId id="284" r:id="rId34"/>
   </p:sldIdLst>
   <p:sldSz cx="9144000" cy="5143500" type="screen16x9"/>
   <p:notesSz cx="6858000" cy="9144000"/>
@@ -266,7 +270,7 @@
             <a:fld id="{9CA14C55-E12A-45E6-87F3-7EAADE4C1D12}" type="datetimeFigureOut">
               <a:rPr lang="en-US" smtClean="0"/>
               <a:pPr/>
-              <a:t>1/17/2019</a:t>
+              <a:t>1/18/2019</a:t>
             </a:fld>
             <a:endParaRPr lang="en-US"/>
           </a:p>
@@ -433,7 +437,7 @@
             <a:fld id="{959CAFB7-E13F-4384-95CE-291BAEA2830B}" type="datetimeFigureOut">
               <a:rPr lang="en-US" smtClean="0"/>
               <a:pPr/>
-              <a:t>1/17/2019</a:t>
+              <a:t>1/18/2019</a:t>
             </a:fld>
             <a:endParaRPr lang="en-US"/>
           </a:p>
@@ -840,7 +844,7 @@
             <a:fld id="{3DA09BFF-9304-4EE8-967B-56F816FBB8C1}" type="slidenum">
               <a:rPr lang="en-US" smtClean="0"/>
               <a:pPr/>
-              <a:t>3</a:t>
+              <a:t>7</a:t>
             </a:fld>
             <a:endParaRPr lang="en-US"/>
           </a:p>
@@ -1268,7 +1272,7 @@
             <a:fld id="{3DA09BFF-9304-4EE8-967B-56F816FBB8C1}" type="slidenum">
               <a:rPr lang="en-US" smtClean="0"/>
               <a:pPr/>
-              <a:t>14</a:t>
+              <a:t>18</a:t>
             </a:fld>
             <a:endParaRPr lang="en-US"/>
           </a:p>
@@ -1367,7 +1371,7 @@
             <a:fld id="{3DA09BFF-9304-4EE8-967B-56F816FBB8C1}" type="slidenum">
               <a:rPr lang="en-US" smtClean="0"/>
               <a:pPr/>
-              <a:t>17</a:t>
+              <a:t>21</a:t>
             </a:fld>
             <a:endParaRPr lang="en-US"/>
           </a:p>
@@ -1462,7 +1466,7 @@
             <a:fld id="{3DA09BFF-9304-4EE8-967B-56F816FBB8C1}" type="slidenum">
               <a:rPr lang="en-US" smtClean="0"/>
               <a:pPr/>
-              <a:t>18</a:t>
+              <a:t>22</a:t>
             </a:fld>
             <a:endParaRPr lang="en-US"/>
           </a:p>
@@ -1557,7 +1561,7 @@
             <a:fld id="{3DA09BFF-9304-4EE8-967B-56F816FBB8C1}" type="slidenum">
               <a:rPr lang="en-US" smtClean="0"/>
               <a:pPr/>
-              <a:t>19</a:t>
+              <a:t>23</a:t>
             </a:fld>
             <a:endParaRPr lang="en-US"/>
           </a:p>
@@ -1652,7 +1656,7 @@
             <a:fld id="{3DA09BFF-9304-4EE8-967B-56F816FBB8C1}" type="slidenum">
               <a:rPr lang="en-US" smtClean="0"/>
               <a:pPr/>
-              <a:t>20</a:t>
+              <a:t>24</a:t>
             </a:fld>
             <a:endParaRPr lang="en-US"/>
           </a:p>
@@ -1747,7 +1751,7 @@
             <a:fld id="{3DA09BFF-9304-4EE8-967B-56F816FBB8C1}" type="slidenum">
               <a:rPr lang="en-US" smtClean="0"/>
               <a:pPr/>
-              <a:t>21</a:t>
+              <a:t>25</a:t>
             </a:fld>
             <a:endParaRPr lang="en-US"/>
           </a:p>
@@ -1846,7 +1850,7 @@
             <a:fld id="{3DA09BFF-9304-4EE8-967B-56F816FBB8C1}" type="slidenum">
               <a:rPr lang="en-US" smtClean="0"/>
               <a:pPr/>
-              <a:t>25</a:t>
+              <a:t>29</a:t>
             </a:fld>
             <a:endParaRPr lang="en-US"/>
           </a:p>
@@ -1945,7 +1949,7 @@
             <a:fld id="{3DA09BFF-9304-4EE8-967B-56F816FBB8C1}" type="slidenum">
               <a:rPr lang="en-US" smtClean="0"/>
               <a:pPr/>
-              <a:t>26</a:t>
+              <a:t>30</a:t>
             </a:fld>
             <a:endParaRPr lang="en-US"/>
           </a:p>
@@ -2101,7 +2105,7 @@
             <a:fld id="{3DA09BFF-9304-4EE8-967B-56F816FBB8C1}" type="slidenum">
               <a:rPr lang="en-US" smtClean="0"/>
               <a:pPr/>
-              <a:t>4</a:t>
+              <a:t>8</a:t>
             </a:fld>
             <a:endParaRPr lang="en-US"/>
           </a:p>
@@ -2257,7 +2261,7 @@
             <a:fld id="{3DA09BFF-9304-4EE8-967B-56F816FBB8C1}" type="slidenum">
               <a:rPr lang="en-US" smtClean="0"/>
               <a:pPr/>
-              <a:t>5</a:t>
+              <a:t>9</a:t>
             </a:fld>
             <a:endParaRPr lang="en-US"/>
           </a:p>
@@ -2356,7 +2360,7 @@
             <a:fld id="{3DA09BFF-9304-4EE8-967B-56F816FBB8C1}" type="slidenum">
               <a:rPr lang="en-US" smtClean="0"/>
               <a:pPr/>
-              <a:t>7</a:t>
+              <a:t>11</a:t>
             </a:fld>
             <a:endParaRPr lang="en-US"/>
           </a:p>
@@ -2451,7 +2455,7 @@
             <a:fld id="{3DA09BFF-9304-4EE8-967B-56F816FBB8C1}" type="slidenum">
               <a:rPr lang="en-US" smtClean="0"/>
               <a:pPr/>
-              <a:t>8</a:t>
+              <a:t>12</a:t>
             </a:fld>
             <a:endParaRPr lang="en-US"/>
           </a:p>
@@ -2546,7 +2550,7 @@
             <a:fld id="{3DA09BFF-9304-4EE8-967B-56F816FBB8C1}" type="slidenum">
               <a:rPr lang="en-US" smtClean="0"/>
               <a:pPr/>
-              <a:t>9</a:t>
+              <a:t>13</a:t>
             </a:fld>
             <a:endParaRPr lang="en-US"/>
           </a:p>
@@ -2641,7 +2645,7 @@
             <a:fld id="{3DA09BFF-9304-4EE8-967B-56F816FBB8C1}" type="slidenum">
               <a:rPr lang="en-US" smtClean="0"/>
               <a:pPr/>
-              <a:t>10</a:t>
+              <a:t>14</a:t>
             </a:fld>
             <a:endParaRPr lang="en-US"/>
           </a:p>
@@ -2736,7 +2740,7 @@
             <a:fld id="{3DA09BFF-9304-4EE8-967B-56F816FBB8C1}" type="slidenum">
               <a:rPr lang="en-US" smtClean="0"/>
               <a:pPr/>
-              <a:t>11</a:t>
+              <a:t>15</a:t>
             </a:fld>
             <a:endParaRPr lang="en-US"/>
           </a:p>
@@ -2892,7 +2896,7 @@
             <a:fld id="{3DA09BFF-9304-4EE8-967B-56F816FBB8C1}" type="slidenum">
               <a:rPr lang="en-US" smtClean="0"/>
               <a:pPr/>
-              <a:t>13</a:t>
+              <a:t>17</a:t>
             </a:fld>
             <a:endParaRPr lang="en-US"/>
           </a:p>
@@ -10827,6 +10831,392 @@
       </p:grpSpPr>
       <p:sp>
         <p:nvSpPr>
+          <p:cNvPr id="5" name="Title 4"/>
+          <p:cNvSpPr>
+            <a:spLocks noGrp="1"/>
+          </p:cNvSpPr>
+          <p:nvPr>
+            <p:ph type="ctrTitle"/>
+          </p:nvPr>
+        </p:nvSpPr>
+        <p:spPr/>
+        <p:txBody>
+          <a:bodyPr/>
+          <a:lstStyle/>
+          <a:p>
+            <a:r>
+              <a:rPr lang="en-US" dirty="0"/>
+              <a:t>Open-Closed Principle</a:t>
+            </a:r>
+          </a:p>
+        </p:txBody>
+      </p:sp>
+      <p:sp>
+        <p:nvSpPr>
+          <p:cNvPr id="2" name="Subtitle 1"/>
+          <p:cNvSpPr>
+            <a:spLocks noGrp="1"/>
+          </p:cNvSpPr>
+          <p:nvPr>
+            <p:ph type="subTitle" idx="1"/>
+          </p:nvPr>
+        </p:nvSpPr>
+        <p:spPr/>
+        <p:txBody>
+          <a:bodyPr/>
+          <a:lstStyle/>
+          <a:p>
+            <a:endParaRPr lang="en-US" dirty="0"/>
+          </a:p>
+        </p:txBody>
+      </p:sp>
+    </p:spTree>
+    <p:extLst>
+      <p:ext uri="{BB962C8B-B14F-4D97-AF65-F5344CB8AC3E}">
+        <p14:creationId xmlns:p14="http://schemas.microsoft.com/office/powerpoint/2010/main" val="2605682236"/>
+      </p:ext>
+    </p:extLst>
+  </p:cSld>
+  <p:clrMapOvr>
+    <a:masterClrMapping/>
+  </p:clrMapOvr>
+</p:sld>
+</file>
+
+<file path=ppt/slides/slide11.xml><?xml version="1.0" encoding="utf-8"?>
+<p:sld xmlns:a="http://schemas.openxmlformats.org/drawingml/2006/main" xmlns:r="http://schemas.openxmlformats.org/officeDocument/2006/relationships" xmlns:p="http://schemas.openxmlformats.org/presentationml/2006/main">
+  <p:cSld>
+    <p:spTree>
+      <p:nvGrpSpPr>
+        <p:cNvPr id="1" name=""/>
+        <p:cNvGrpSpPr/>
+        <p:nvPr/>
+      </p:nvGrpSpPr>
+      <p:grpSpPr>
+        <a:xfrm>
+          <a:off x="0" y="0"/>
+          <a:ext cx="0" cy="0"/>
+          <a:chOff x="0" y="0"/>
+          <a:chExt cx="0" cy="0"/>
+        </a:xfrm>
+      </p:grpSpPr>
+      <p:sp>
+        <p:nvSpPr>
+          <p:cNvPr id="7" name="Title 6"/>
+          <p:cNvSpPr>
+            <a:spLocks noGrp="1"/>
+          </p:cNvSpPr>
+          <p:nvPr>
+            <p:ph type="title"/>
+          </p:nvPr>
+        </p:nvSpPr>
+        <p:spPr/>
+        <p:txBody>
+          <a:bodyPr>
+            <a:normAutofit/>
+          </a:bodyPr>
+          <a:lstStyle/>
+          <a:p>
+            <a:r>
+              <a:rPr lang="en-US" dirty="0"/>
+              <a:t>Open-Closed Principle Overview</a:t>
+            </a:r>
+          </a:p>
+        </p:txBody>
+      </p:sp>
+      <p:sp>
+        <p:nvSpPr>
+          <p:cNvPr id="2" name="TextBox 1">
+            <a:extLst>
+              <a:ext uri="{FF2B5EF4-FFF2-40B4-BE49-F238E27FC236}">
+                <a16:creationId xmlns:a16="http://schemas.microsoft.com/office/drawing/2014/main" id="{B35B1041-8099-49DD-AFA9-BDB74A2128E1}"/>
+              </a:ext>
+            </a:extLst>
+          </p:cNvPr>
+          <p:cNvSpPr txBox="1"/>
+          <p:nvPr/>
+        </p:nvSpPr>
+        <p:spPr bwMode="auto">
+          <a:xfrm>
+            <a:off x="273677" y="1554480"/>
+            <a:ext cx="8161663" cy="646331"/>
+          </a:xfrm>
+          <a:prstGeom prst="rect">
+            <a:avLst/>
+          </a:prstGeom>
+          <a:noFill/>
+          <a:ln w="12700" cap="sq" algn="ctr">
+            <a:noFill/>
+            <a:miter lim="800000"/>
+            <a:headEnd/>
+            <a:tailEnd/>
+          </a:ln>
+          <a:effectLst/>
+        </p:spPr>
+        <p:txBody>
+          <a:bodyPr wrap="square" rtlCol="0">
+            <a:spAutoFit/>
+          </a:bodyPr>
+          <a:lstStyle/>
+          <a:p>
+            <a:pPr marL="285750" indent="-285750">
+              <a:buFont typeface="Arial" panose="020B0604020202020204" pitchFamily="34" charset="0"/>
+              <a:buChar char="•"/>
+            </a:pPr>
+            <a:r>
+              <a:rPr lang="en-US" dirty="0"/>
+              <a:t> “</a:t>
+            </a:r>
+            <a:r>
+              <a:rPr lang="en-US" i="1" dirty="0"/>
+              <a:t>Software entities (classes, modules, functions, etc.) should be open for extension, but closed for modification</a:t>
+            </a:r>
+            <a:r>
+              <a:rPr lang="en-US" dirty="0"/>
+              <a:t>"</a:t>
+            </a:r>
+            <a:endParaRPr lang="en-US" sz="1600" dirty="0">
+              <a:solidFill>
+                <a:schemeClr val="tx1">
+                  <a:lumMod val="75000"/>
+                  <a:lumOff val="25000"/>
+                </a:schemeClr>
+              </a:solidFill>
+              <a:latin typeface="Tahoma" pitchFamily="34" charset="0"/>
+              <a:cs typeface="Tahoma" pitchFamily="34" charset="0"/>
+            </a:endParaRPr>
+          </a:p>
+        </p:txBody>
+      </p:sp>
+    </p:spTree>
+    <p:extLst>
+      <p:ext uri="{BB962C8B-B14F-4D97-AF65-F5344CB8AC3E}">
+        <p14:creationId xmlns:p14="http://schemas.microsoft.com/office/powerpoint/2010/main" val="1051721868"/>
+      </p:ext>
+    </p:extLst>
+  </p:cSld>
+  <p:clrMapOvr>
+    <a:masterClrMapping/>
+  </p:clrMapOvr>
+  <p:transition/>
+</p:sld>
+</file>
+
+<file path=ppt/slides/slide12.xml><?xml version="1.0" encoding="utf-8"?>
+<p:sld xmlns:a="http://schemas.openxmlformats.org/drawingml/2006/main" xmlns:r="http://schemas.openxmlformats.org/officeDocument/2006/relationships" xmlns:p="http://schemas.openxmlformats.org/presentationml/2006/main">
+  <p:cSld>
+    <p:spTree>
+      <p:nvGrpSpPr>
+        <p:cNvPr id="1" name=""/>
+        <p:cNvGrpSpPr/>
+        <p:nvPr/>
+      </p:nvGrpSpPr>
+      <p:grpSpPr>
+        <a:xfrm>
+          <a:off x="0" y="0"/>
+          <a:ext cx="0" cy="0"/>
+          <a:chOff x="0" y="0"/>
+          <a:chExt cx="0" cy="0"/>
+        </a:xfrm>
+      </p:grpSpPr>
+      <p:sp>
+        <p:nvSpPr>
+          <p:cNvPr id="7" name="Title 6"/>
+          <p:cNvSpPr>
+            <a:spLocks noGrp="1"/>
+          </p:cNvSpPr>
+          <p:nvPr>
+            <p:ph type="title"/>
+          </p:nvPr>
+        </p:nvSpPr>
+        <p:spPr/>
+        <p:txBody>
+          <a:bodyPr>
+            <a:normAutofit/>
+          </a:bodyPr>
+          <a:lstStyle/>
+          <a:p>
+            <a:r>
+              <a:rPr lang="en-US" dirty="0"/>
+              <a:t>Bad Example</a:t>
+            </a:r>
+          </a:p>
+        </p:txBody>
+      </p:sp>
+      <p:pic>
+        <p:nvPicPr>
+          <p:cNvPr id="4" name="Content Placeholder 4">
+            <a:extLst>
+              <a:ext uri="{FF2B5EF4-FFF2-40B4-BE49-F238E27FC236}">
+                <a16:creationId xmlns:a16="http://schemas.microsoft.com/office/drawing/2014/main" id="{6F0130EF-8860-45DF-BBE6-AC6228497E23}"/>
+              </a:ext>
+            </a:extLst>
+          </p:cNvPr>
+          <p:cNvPicPr>
+            <a:picLocks noGrp="1" noChangeAspect="1"/>
+          </p:cNvPicPr>
+          <p:nvPr>
+            <p:ph type="tbl" sz="quarter" idx="10"/>
+          </p:nvPr>
+        </p:nvPicPr>
+        <p:blipFill>
+          <a:blip r:embed="rId3">
+            <a:extLst>
+              <a:ext uri="{28A0092B-C50C-407E-A947-70E740481C1C}">
+                <a14:useLocalDpi xmlns:a14="http://schemas.microsoft.com/office/drawing/2010/main" val="0"/>
+              </a:ext>
+            </a:extLst>
+          </a:blip>
+          <a:stretch>
+            <a:fillRect/>
+          </a:stretch>
+        </p:blipFill>
+        <p:spPr bwMode="blackGray">
+          <a:xfrm>
+            <a:off x="1856132" y="932293"/>
+            <a:ext cx="5431736" cy="3278913"/>
+          </a:xfrm>
+          <a:prstGeom prst="rect">
+            <a:avLst/>
+          </a:prstGeom>
+        </p:spPr>
+      </p:pic>
+    </p:spTree>
+    <p:extLst>
+      <p:ext uri="{BB962C8B-B14F-4D97-AF65-F5344CB8AC3E}">
+        <p14:creationId xmlns:p14="http://schemas.microsoft.com/office/powerpoint/2010/main" val="504464170"/>
+      </p:ext>
+    </p:extLst>
+  </p:cSld>
+  <p:clrMapOvr>
+    <a:masterClrMapping/>
+  </p:clrMapOvr>
+  <p:transition/>
+</p:sld>
+</file>
+
+<file path=ppt/slides/slide13.xml><?xml version="1.0" encoding="utf-8"?>
+<p:sld xmlns:a="http://schemas.openxmlformats.org/drawingml/2006/main" xmlns:r="http://schemas.openxmlformats.org/officeDocument/2006/relationships" xmlns:p="http://schemas.openxmlformats.org/presentationml/2006/main">
+  <p:cSld>
+    <p:spTree>
+      <p:nvGrpSpPr>
+        <p:cNvPr id="1" name=""/>
+        <p:cNvGrpSpPr/>
+        <p:nvPr/>
+      </p:nvGrpSpPr>
+      <p:grpSpPr>
+        <a:xfrm>
+          <a:off x="0" y="0"/>
+          <a:ext cx="0" cy="0"/>
+          <a:chOff x="0" y="0"/>
+          <a:chExt cx="0" cy="0"/>
+        </a:xfrm>
+      </p:grpSpPr>
+      <p:sp>
+        <p:nvSpPr>
+          <p:cNvPr id="7" name="Title 6"/>
+          <p:cNvSpPr>
+            <a:spLocks noGrp="1"/>
+          </p:cNvSpPr>
+          <p:nvPr>
+            <p:ph type="title"/>
+          </p:nvPr>
+        </p:nvSpPr>
+        <p:spPr/>
+        <p:txBody>
+          <a:bodyPr>
+            <a:normAutofit/>
+          </a:bodyPr>
+          <a:lstStyle/>
+          <a:p>
+            <a:r>
+              <a:rPr lang="en-US" dirty="0"/>
+              <a:t>Bad Example Expansion</a:t>
+            </a:r>
+          </a:p>
+        </p:txBody>
+      </p:sp>
+      <p:sp>
+        <p:nvSpPr>
+          <p:cNvPr id="3" name="Table Placeholder 2">
+            <a:extLst>
+              <a:ext uri="{FF2B5EF4-FFF2-40B4-BE49-F238E27FC236}">
+                <a16:creationId xmlns:a16="http://schemas.microsoft.com/office/drawing/2014/main" id="{B5236AE0-4F4E-47D4-B4B9-C541258E0DDD}"/>
+              </a:ext>
+            </a:extLst>
+          </p:cNvPr>
+          <p:cNvSpPr>
+            <a:spLocks noGrp="1"/>
+          </p:cNvSpPr>
+          <p:nvPr>
+            <p:ph type="tbl" sz="quarter" idx="10"/>
+          </p:nvPr>
+        </p:nvSpPr>
+        <p:spPr/>
+      </p:sp>
+      <p:pic>
+        <p:nvPicPr>
+          <p:cNvPr id="6" name="Picture 5">
+            <a:extLst>
+              <a:ext uri="{FF2B5EF4-FFF2-40B4-BE49-F238E27FC236}">
+                <a16:creationId xmlns:a16="http://schemas.microsoft.com/office/drawing/2014/main" id="{B74B15AB-758F-4A3F-94B4-5AB75BBF1950}"/>
+              </a:ext>
+            </a:extLst>
+          </p:cNvPr>
+          <p:cNvPicPr>
+            <a:picLocks noChangeAspect="1"/>
+          </p:cNvPicPr>
+          <p:nvPr/>
+        </p:nvPicPr>
+        <p:blipFill>
+          <a:blip r:embed="rId3"/>
+          <a:stretch>
+            <a:fillRect/>
+          </a:stretch>
+        </p:blipFill>
+        <p:spPr>
+          <a:xfrm>
+            <a:off x="1542273" y="846825"/>
+            <a:ext cx="6027566" cy="3604112"/>
+          </a:xfrm>
+          <a:prstGeom prst="rect">
+            <a:avLst/>
+          </a:prstGeom>
+        </p:spPr>
+      </p:pic>
+    </p:spTree>
+    <p:extLst>
+      <p:ext uri="{BB962C8B-B14F-4D97-AF65-F5344CB8AC3E}">
+        <p14:creationId xmlns:p14="http://schemas.microsoft.com/office/powerpoint/2010/main" val="3929175019"/>
+      </p:ext>
+    </p:extLst>
+  </p:cSld>
+  <p:clrMapOvr>
+    <a:masterClrMapping/>
+  </p:clrMapOvr>
+  <p:transition/>
+</p:sld>
+</file>
+
+<file path=ppt/slides/slide14.xml><?xml version="1.0" encoding="utf-8"?>
+<p:sld xmlns:a="http://schemas.openxmlformats.org/drawingml/2006/main" xmlns:r="http://schemas.openxmlformats.org/officeDocument/2006/relationships" xmlns:p="http://schemas.openxmlformats.org/presentationml/2006/main">
+  <p:cSld>
+    <p:spTree>
+      <p:nvGrpSpPr>
+        <p:cNvPr id="1" name=""/>
+        <p:cNvGrpSpPr/>
+        <p:nvPr/>
+      </p:nvGrpSpPr>
+      <p:grpSpPr>
+        <a:xfrm>
+          <a:off x="0" y="0"/>
+          <a:ext cx="0" cy="0"/>
+          <a:chOff x="0" y="0"/>
+          <a:chExt cx="0" cy="0"/>
+        </a:xfrm>
+      </p:grpSpPr>
+      <p:sp>
+        <p:nvSpPr>
           <p:cNvPr id="7" name="Title 6"/>
           <p:cNvSpPr>
             <a:spLocks noGrp="1"/>
@@ -10917,7 +11307,7 @@
 </p:sld>
 </file>
 
-<file path=ppt/slides/slide11.xml><?xml version="1.0" encoding="utf-8"?>
+<file path=ppt/slides/slide15.xml><?xml version="1.0" encoding="utf-8"?>
 <p:sld xmlns:a="http://schemas.openxmlformats.org/drawingml/2006/main" xmlns:r="http://schemas.openxmlformats.org/officeDocument/2006/relationships" xmlns:p="http://schemas.openxmlformats.org/presentationml/2006/main">
   <p:cSld>
     <p:spTree>
@@ -11020,7 +11410,7 @@
 </p:sld>
 </file>
 
-<file path=ppt/slides/slide12.xml><?xml version="1.0" encoding="utf-8"?>
+<file path=ppt/slides/slide16.xml><?xml version="1.0" encoding="utf-8"?>
 <p:sld xmlns:a="http://schemas.openxmlformats.org/drawingml/2006/main" xmlns:r="http://schemas.openxmlformats.org/officeDocument/2006/relationships" xmlns:p="http://schemas.openxmlformats.org/presentationml/2006/main">
   <p:cSld>
     <p:spTree>
@@ -11090,7 +11480,7 @@
 </p:sld>
 </file>
 
-<file path=ppt/slides/slide13.xml><?xml version="1.0" encoding="utf-8"?>
+<file path=ppt/slides/slide17.xml><?xml version="1.0" encoding="utf-8"?>
 <p:sld xmlns:a="http://schemas.openxmlformats.org/drawingml/2006/main" xmlns:r="http://schemas.openxmlformats.org/officeDocument/2006/relationships" xmlns:p="http://schemas.openxmlformats.org/presentationml/2006/main">
   <p:cSld>
     <p:spTree>
@@ -11274,7 +11664,7 @@
 </p:sld>
 </file>
 
-<file path=ppt/slides/slide14.xml><?xml version="1.0" encoding="utf-8"?>
+<file path=ppt/slides/slide18.xml><?xml version="1.0" encoding="utf-8"?>
 <p:sld xmlns:a="http://schemas.openxmlformats.org/drawingml/2006/main" xmlns:r="http://schemas.openxmlformats.org/officeDocument/2006/relationships" xmlns:p="http://schemas.openxmlformats.org/presentationml/2006/main">
   <p:cSld>
     <p:spTree>
@@ -11380,7 +11770,7 @@
 </p:sld>
 </file>
 
-<file path=ppt/slides/slide15.xml><?xml version="1.0" encoding="utf-8"?>
+<file path=ppt/slides/slide19.xml><?xml version="1.0" encoding="utf-8"?>
 <p:sld xmlns:a="http://schemas.openxmlformats.org/drawingml/2006/main" xmlns:r="http://schemas.openxmlformats.org/officeDocument/2006/relationships" xmlns:p="http://schemas.openxmlformats.org/presentationml/2006/main">
   <p:cSld>
     <p:spTree>
@@ -11503,7 +11893,7 @@
 </p:sld>
 </file>
 
-<file path=ppt/slides/slide16.xml><?xml version="1.0" encoding="utf-8"?>
+<file path=ppt/slides/slide2.xml><?xml version="1.0" encoding="utf-8"?>
 <p:sld xmlns:a="http://schemas.openxmlformats.org/drawingml/2006/main" xmlns:r="http://schemas.openxmlformats.org/officeDocument/2006/relationships" xmlns:p="http://schemas.openxmlformats.org/presentationml/2006/main">
   <p:cSld>
     <p:spTree>
@@ -11522,12 +11912,18 @@
       </p:grpSpPr>
       <p:sp>
         <p:nvSpPr>
-          <p:cNvPr id="5" name="Title 4"/>
+          <p:cNvPr id="3" name="Title 2">
+            <a:extLst>
+              <a:ext uri="{FF2B5EF4-FFF2-40B4-BE49-F238E27FC236}">
+                <a16:creationId xmlns:a16="http://schemas.microsoft.com/office/drawing/2014/main" id="{8C2B29DB-584A-415D-979E-EAD4F6614F08}"/>
+              </a:ext>
+            </a:extLst>
+          </p:cNvPr>
           <p:cNvSpPr>
             <a:spLocks noGrp="1"/>
           </p:cNvSpPr>
           <p:nvPr>
-            <p:ph type="ctrTitle"/>
+            <p:ph type="title"/>
           </p:nvPr>
         </p:nvSpPr>
         <p:spPr/>
@@ -11537,44 +11933,130 @@
           <a:p>
             <a:r>
               <a:rPr lang="en-US" dirty="0"/>
-              <a:t>Interface Segregation Principle</a:t>
-            </a:r>
-          </a:p>
-        </p:txBody>
-      </p:sp>
-      <p:sp>
-        <p:nvSpPr>
-          <p:cNvPr id="2" name="Subtitle 1"/>
-          <p:cNvSpPr>
-            <a:spLocks noGrp="1"/>
-          </p:cNvSpPr>
-          <p:nvPr>
-            <p:ph type="subTitle" idx="1"/>
-          </p:nvPr>
-        </p:nvSpPr>
-        <p:spPr/>
-        <p:txBody>
-          <a:bodyPr/>
-          <a:lstStyle/>
-          <a:p>
-            <a:endParaRPr lang="en-US"/>
-          </a:p>
-        </p:txBody>
-      </p:sp>
+              <a:t>Bad Code</a:t>
+            </a:r>
+          </a:p>
+        </p:txBody>
+      </p:sp>
+      <p:pic>
+        <p:nvPicPr>
+          <p:cNvPr id="4" name="Picture 3">
+            <a:extLst>
+              <a:ext uri="{FF2B5EF4-FFF2-40B4-BE49-F238E27FC236}">
+                <a16:creationId xmlns:a16="http://schemas.microsoft.com/office/drawing/2014/main" id="{3B13EE1C-D46B-455F-878A-AE94C388F38E}"/>
+              </a:ext>
+            </a:extLst>
+          </p:cNvPr>
+          <p:cNvPicPr>
+            <a:picLocks noChangeAspect="1"/>
+          </p:cNvPicPr>
+          <p:nvPr/>
+        </p:nvPicPr>
+        <p:blipFill>
+          <a:blip r:embed="rId2"/>
+          <a:stretch>
+            <a:fillRect/>
+          </a:stretch>
+        </p:blipFill>
+        <p:spPr>
+          <a:xfrm>
+            <a:off x="1047750" y="1343025"/>
+            <a:ext cx="7048500" cy="2457450"/>
+          </a:xfrm>
+          <a:prstGeom prst="rect">
+            <a:avLst/>
+          </a:prstGeom>
+        </p:spPr>
+      </p:pic>
     </p:spTree>
     <p:extLst>
       <p:ext uri="{BB962C8B-B14F-4D97-AF65-F5344CB8AC3E}">
-        <p14:creationId xmlns:p14="http://schemas.microsoft.com/office/powerpoint/2010/main" val="1208709999"/>
+        <p14:creationId xmlns:p14="http://schemas.microsoft.com/office/powerpoint/2010/main" val="1731315714"/>
       </p:ext>
     </p:extLst>
   </p:cSld>
   <p:clrMapOvr>
     <a:masterClrMapping/>
   </p:clrMapOvr>
+  <p:timing>
+    <p:tnLst>
+      <p:par>
+        <p:cTn id="1" dur="indefinite" restart="never" nodeType="tmRoot">
+          <p:childTnLst>
+            <p:seq concurrent="1" nextAc="seek">
+              <p:cTn id="2" dur="indefinite" nodeType="mainSeq">
+                <p:childTnLst>
+                  <p:par>
+                    <p:cTn id="3" fill="hold">
+                      <p:stCondLst>
+                        <p:cond delay="indefinite"/>
+                      </p:stCondLst>
+                      <p:childTnLst>
+                        <p:par>
+                          <p:cTn id="4" fill="hold">
+                            <p:stCondLst>
+                              <p:cond delay="0"/>
+                            </p:stCondLst>
+                            <p:childTnLst>
+                              <p:par>
+                                <p:cTn id="5" presetID="1" presetClass="entr" presetSubtype="0" fill="hold" nodeType="clickEffect">
+                                  <p:stCondLst>
+                                    <p:cond delay="0"/>
+                                  </p:stCondLst>
+                                  <p:childTnLst>
+                                    <p:set>
+                                      <p:cBhvr>
+                                        <p:cTn id="6" dur="1" fill="hold">
+                                          <p:stCondLst>
+                                            <p:cond delay="0"/>
+                                          </p:stCondLst>
+                                        </p:cTn>
+                                        <p:tgtEl>
+                                          <p:spTgt spid="4"/>
+                                        </p:tgtEl>
+                                        <p:attrNameLst>
+                                          <p:attrName>style.visibility</p:attrName>
+                                        </p:attrNameLst>
+                                      </p:cBhvr>
+                                      <p:to>
+                                        <p:strVal val="visible"/>
+                                      </p:to>
+                                    </p:set>
+                                  </p:childTnLst>
+                                </p:cTn>
+                              </p:par>
+                            </p:childTnLst>
+                          </p:cTn>
+                        </p:par>
+                      </p:childTnLst>
+                    </p:cTn>
+                  </p:par>
+                </p:childTnLst>
+              </p:cTn>
+              <p:prevCondLst>
+                <p:cond evt="onPrev" delay="0">
+                  <p:tgtEl>
+                    <p:sldTgt/>
+                  </p:tgtEl>
+                </p:cond>
+              </p:prevCondLst>
+              <p:nextCondLst>
+                <p:cond evt="onNext" delay="0">
+                  <p:tgtEl>
+                    <p:sldTgt/>
+                  </p:tgtEl>
+                </p:cond>
+              </p:nextCondLst>
+            </p:seq>
+          </p:childTnLst>
+        </p:cTn>
+      </p:par>
+    </p:tnLst>
+  </p:timing>
 </p:sld>
 </file>
 
-<file path=ppt/slides/slide17.xml><?xml version="1.0" encoding="utf-8"?>
+<file path=ppt/slides/slide20.xml><?xml version="1.0" encoding="utf-8"?>
 <p:sld xmlns:a="http://schemas.openxmlformats.org/drawingml/2006/main" xmlns:r="http://schemas.openxmlformats.org/officeDocument/2006/relationships" xmlns:p="http://schemas.openxmlformats.org/presentationml/2006/main">
   <p:cSld>
     <p:spTree>
@@ -11593,6 +12075,77 @@
       </p:grpSpPr>
       <p:sp>
         <p:nvSpPr>
+          <p:cNvPr id="5" name="Title 4"/>
+          <p:cNvSpPr>
+            <a:spLocks noGrp="1"/>
+          </p:cNvSpPr>
+          <p:nvPr>
+            <p:ph type="ctrTitle"/>
+          </p:nvPr>
+        </p:nvSpPr>
+        <p:spPr/>
+        <p:txBody>
+          <a:bodyPr/>
+          <a:lstStyle/>
+          <a:p>
+            <a:r>
+              <a:rPr lang="en-US" dirty="0"/>
+              <a:t>Interface Segregation Principle</a:t>
+            </a:r>
+          </a:p>
+        </p:txBody>
+      </p:sp>
+      <p:sp>
+        <p:nvSpPr>
+          <p:cNvPr id="2" name="Subtitle 1"/>
+          <p:cNvSpPr>
+            <a:spLocks noGrp="1"/>
+          </p:cNvSpPr>
+          <p:nvPr>
+            <p:ph type="subTitle" idx="1"/>
+          </p:nvPr>
+        </p:nvSpPr>
+        <p:spPr/>
+        <p:txBody>
+          <a:bodyPr/>
+          <a:lstStyle/>
+          <a:p>
+            <a:endParaRPr lang="en-US"/>
+          </a:p>
+        </p:txBody>
+      </p:sp>
+    </p:spTree>
+    <p:extLst>
+      <p:ext uri="{BB962C8B-B14F-4D97-AF65-F5344CB8AC3E}">
+        <p14:creationId xmlns:p14="http://schemas.microsoft.com/office/powerpoint/2010/main" val="1208709999"/>
+      </p:ext>
+    </p:extLst>
+  </p:cSld>
+  <p:clrMapOvr>
+    <a:masterClrMapping/>
+  </p:clrMapOvr>
+</p:sld>
+</file>
+
+<file path=ppt/slides/slide21.xml><?xml version="1.0" encoding="utf-8"?>
+<p:sld xmlns:a="http://schemas.openxmlformats.org/drawingml/2006/main" xmlns:r="http://schemas.openxmlformats.org/officeDocument/2006/relationships" xmlns:p="http://schemas.openxmlformats.org/presentationml/2006/main">
+  <p:cSld>
+    <p:spTree>
+      <p:nvGrpSpPr>
+        <p:cNvPr id="1" name=""/>
+        <p:cNvGrpSpPr/>
+        <p:nvPr/>
+      </p:nvGrpSpPr>
+      <p:grpSpPr>
+        <a:xfrm>
+          <a:off x="0" y="0"/>
+          <a:ext cx="0" cy="0"/>
+          <a:chOff x="0" y="0"/>
+          <a:chExt cx="0" cy="0"/>
+        </a:xfrm>
+      </p:grpSpPr>
+      <p:sp>
+        <p:nvSpPr>
           <p:cNvPr id="7" name="Title 6"/>
           <p:cNvSpPr>
             <a:spLocks noGrp="1"/>
@@ -11695,7 +12248,7 @@
 </p:sld>
 </file>
 
-<file path=ppt/slides/slide18.xml><?xml version="1.0" encoding="utf-8"?>
+<file path=ppt/slides/slide22.xml><?xml version="1.0" encoding="utf-8"?>
 <p:sld xmlns:a="http://schemas.openxmlformats.org/drawingml/2006/main" xmlns:r="http://schemas.openxmlformats.org/officeDocument/2006/relationships" xmlns:p="http://schemas.openxmlformats.org/presentationml/2006/main">
   <p:cSld>
     <p:spTree>
@@ -11788,7 +12341,7 @@
 </p:sld>
 </file>
 
-<file path=ppt/slides/slide19.xml><?xml version="1.0" encoding="utf-8"?>
+<file path=ppt/slides/slide23.xml><?xml version="1.0" encoding="utf-8"?>
 <p:sld xmlns:a="http://schemas.openxmlformats.org/drawingml/2006/main" xmlns:r="http://schemas.openxmlformats.org/officeDocument/2006/relationships" xmlns:p="http://schemas.openxmlformats.org/presentationml/2006/main">
   <p:cSld>
     <p:spTree>
@@ -11878,78 +12431,7 @@
 </p:sld>
 </file>
 
-<file path=ppt/slides/slide2.xml><?xml version="1.0" encoding="utf-8"?>
-<p:sld xmlns:a="http://schemas.openxmlformats.org/drawingml/2006/main" xmlns:r="http://schemas.openxmlformats.org/officeDocument/2006/relationships" xmlns:p="http://schemas.openxmlformats.org/presentationml/2006/main">
-  <p:cSld>
-    <p:spTree>
-      <p:nvGrpSpPr>
-        <p:cNvPr id="1" name=""/>
-        <p:cNvGrpSpPr/>
-        <p:nvPr/>
-      </p:nvGrpSpPr>
-      <p:grpSpPr>
-        <a:xfrm>
-          <a:off x="0" y="0"/>
-          <a:ext cx="0" cy="0"/>
-          <a:chOff x="0" y="0"/>
-          <a:chExt cx="0" cy="0"/>
-        </a:xfrm>
-      </p:grpSpPr>
-      <p:sp>
-        <p:nvSpPr>
-          <p:cNvPr id="5" name="Title 4"/>
-          <p:cNvSpPr>
-            <a:spLocks noGrp="1"/>
-          </p:cNvSpPr>
-          <p:nvPr>
-            <p:ph type="ctrTitle"/>
-          </p:nvPr>
-        </p:nvSpPr>
-        <p:spPr/>
-        <p:txBody>
-          <a:bodyPr/>
-          <a:lstStyle/>
-          <a:p>
-            <a:r>
-              <a:rPr lang="en-US" dirty="0"/>
-              <a:t>Single Responsibility Principle</a:t>
-            </a:r>
-          </a:p>
-        </p:txBody>
-      </p:sp>
-      <p:sp>
-        <p:nvSpPr>
-          <p:cNvPr id="2" name="Subtitle 1"/>
-          <p:cNvSpPr>
-            <a:spLocks noGrp="1"/>
-          </p:cNvSpPr>
-          <p:nvPr>
-            <p:ph type="subTitle" idx="1"/>
-          </p:nvPr>
-        </p:nvSpPr>
-        <p:spPr/>
-        <p:txBody>
-          <a:bodyPr/>
-          <a:lstStyle/>
-          <a:p>
-            <a:endParaRPr lang="en-US" dirty="0"/>
-          </a:p>
-        </p:txBody>
-      </p:sp>
-    </p:spTree>
-    <p:extLst>
-      <p:ext uri="{BB962C8B-B14F-4D97-AF65-F5344CB8AC3E}">
-        <p14:creationId xmlns:p14="http://schemas.microsoft.com/office/powerpoint/2010/main" val="2342469114"/>
-      </p:ext>
-    </p:extLst>
-  </p:cSld>
-  <p:clrMapOvr>
-    <a:masterClrMapping/>
-  </p:clrMapOvr>
-</p:sld>
-</file>
-
-<file path=ppt/slides/slide20.xml><?xml version="1.0" encoding="utf-8"?>
+<file path=ppt/slides/slide24.xml><?xml version="1.0" encoding="utf-8"?>
 <p:sld xmlns:a="http://schemas.openxmlformats.org/drawingml/2006/main" xmlns:r="http://schemas.openxmlformats.org/officeDocument/2006/relationships" xmlns:p="http://schemas.openxmlformats.org/presentationml/2006/main">
   <p:cSld>
     <p:spTree>
@@ -12039,7 +12521,7 @@
 </p:sld>
 </file>
 
-<file path=ppt/slides/slide21.xml><?xml version="1.0" encoding="utf-8"?>
+<file path=ppt/slides/slide25.xml><?xml version="1.0" encoding="utf-8"?>
 <p:sld xmlns:a="http://schemas.openxmlformats.org/drawingml/2006/main" xmlns:r="http://schemas.openxmlformats.org/officeDocument/2006/relationships" xmlns:p="http://schemas.openxmlformats.org/presentationml/2006/main">
   <p:cSld>
     <p:spTree>
@@ -12129,7 +12611,7 @@
 </p:sld>
 </file>
 
-<file path=ppt/slides/slide22.xml><?xml version="1.0" encoding="utf-8"?>
+<file path=ppt/slides/slide26.xml><?xml version="1.0" encoding="utf-8"?>
 <p:sld xmlns:a="http://schemas.openxmlformats.org/drawingml/2006/main" xmlns:r="http://schemas.openxmlformats.org/officeDocument/2006/relationships" xmlns:p="http://schemas.openxmlformats.org/presentationml/2006/main">
   <p:cSld>
     <p:spTree>
@@ -12200,7 +12682,7 @@
 </p:sld>
 </file>
 
-<file path=ppt/slides/slide23.xml><?xml version="1.0" encoding="utf-8"?>
+<file path=ppt/slides/slide27.xml><?xml version="1.0" encoding="utf-8"?>
 <p:sld xmlns:a="http://schemas.openxmlformats.org/drawingml/2006/main" xmlns:r="http://schemas.openxmlformats.org/officeDocument/2006/relationships" xmlns:p="http://schemas.openxmlformats.org/presentationml/2006/main">
   <p:cSld>
     <p:spTree>
@@ -12318,7 +12800,7 @@
 </p:sld>
 </file>
 
-<file path=ppt/slides/slide24.xml><?xml version="1.0" encoding="utf-8"?>
+<file path=ppt/slides/slide28.xml><?xml version="1.0" encoding="utf-8"?>
 <p:sld xmlns:a="http://schemas.openxmlformats.org/drawingml/2006/main" xmlns:r="http://schemas.openxmlformats.org/officeDocument/2006/relationships" xmlns:p="http://schemas.openxmlformats.org/presentationml/2006/main">
   <p:cSld>
     <p:spTree>
@@ -12423,7 +12905,7 @@
 </p:sld>
 </file>
 
-<file path=ppt/slides/slide25.xml><?xml version="1.0" encoding="utf-8"?>
+<file path=ppt/slides/slide29.xml><?xml version="1.0" encoding="utf-8"?>
 <p:sld xmlns:a="http://schemas.openxmlformats.org/drawingml/2006/main" xmlns:r="http://schemas.openxmlformats.org/officeDocument/2006/relationships" xmlns:p="http://schemas.openxmlformats.org/presentationml/2006/main">
   <p:cSld>
     <p:spTree>
@@ -12503,96 +12985,6 @@
     <p:extLst>
       <p:ext uri="{BB962C8B-B14F-4D97-AF65-F5344CB8AC3E}">
         <p14:creationId xmlns:p14="http://schemas.microsoft.com/office/powerpoint/2010/main" val="895497124"/>
-      </p:ext>
-    </p:extLst>
-  </p:cSld>
-  <p:clrMapOvr>
-    <a:masterClrMapping/>
-  </p:clrMapOvr>
-  <p:transition/>
-</p:sld>
-</file>
-
-<file path=ppt/slides/slide26.xml><?xml version="1.0" encoding="utf-8"?>
-<p:sld xmlns:a="http://schemas.openxmlformats.org/drawingml/2006/main" xmlns:r="http://schemas.openxmlformats.org/officeDocument/2006/relationships" xmlns:p="http://schemas.openxmlformats.org/presentationml/2006/main">
-  <p:cSld>
-    <p:spTree>
-      <p:nvGrpSpPr>
-        <p:cNvPr id="1" name=""/>
-        <p:cNvGrpSpPr/>
-        <p:nvPr/>
-      </p:nvGrpSpPr>
-      <p:grpSpPr>
-        <a:xfrm>
-          <a:off x="0" y="0"/>
-          <a:ext cx="0" cy="0"/>
-          <a:chOff x="0" y="0"/>
-          <a:chExt cx="0" cy="0"/>
-        </a:xfrm>
-      </p:grpSpPr>
-      <p:sp>
-        <p:nvSpPr>
-          <p:cNvPr id="7" name="Title 6"/>
-          <p:cNvSpPr>
-            <a:spLocks noGrp="1"/>
-          </p:cNvSpPr>
-          <p:nvPr>
-            <p:ph type="title"/>
-          </p:nvPr>
-        </p:nvSpPr>
-        <p:spPr/>
-        <p:txBody>
-          <a:bodyPr>
-            <a:normAutofit/>
-          </a:bodyPr>
-          <a:lstStyle/>
-          <a:p>
-            <a:r>
-              <a:rPr lang="en-US" dirty="0"/>
-              <a:t>Good </a:t>
-            </a:r>
-            <a:r>
-              <a:rPr lang="en-US" dirty="0" err="1"/>
-              <a:t>LockScreen</a:t>
-            </a:r>
-            <a:endParaRPr lang="en-US" dirty="0"/>
-          </a:p>
-        </p:txBody>
-      </p:sp>
-      <p:pic>
-        <p:nvPicPr>
-          <p:cNvPr id="4" name="Picture 3">
-            <a:extLst>
-              <a:ext uri="{FF2B5EF4-FFF2-40B4-BE49-F238E27FC236}">
-                <a16:creationId xmlns:a16="http://schemas.microsoft.com/office/drawing/2014/main" id="{6E33723B-8977-47A3-8F82-72D48C5BC2FE}"/>
-              </a:ext>
-            </a:extLst>
-          </p:cNvPr>
-          <p:cNvPicPr>
-            <a:picLocks noChangeAspect="1"/>
-          </p:cNvPicPr>
-          <p:nvPr/>
-        </p:nvPicPr>
-        <p:blipFill>
-          <a:blip r:embed="rId3"/>
-          <a:stretch>
-            <a:fillRect/>
-          </a:stretch>
-        </p:blipFill>
-        <p:spPr>
-          <a:xfrm>
-            <a:off x="705441" y="849374"/>
-            <a:ext cx="5172797" cy="3658111"/>
-          </a:xfrm>
-          <a:prstGeom prst="rect">
-            <a:avLst/>
-          </a:prstGeom>
-        </p:spPr>
-      </p:pic>
-    </p:spTree>
-    <p:extLst>
-      <p:ext uri="{BB962C8B-B14F-4D97-AF65-F5344CB8AC3E}">
-        <p14:creationId xmlns:p14="http://schemas.microsoft.com/office/powerpoint/2010/main" val="4243480717"/>
       </p:ext>
     </p:extLst>
   </p:cSld>
@@ -12622,6 +13014,494 @@
       </p:grpSpPr>
       <p:sp>
         <p:nvSpPr>
+          <p:cNvPr id="2" name="Text Placeholder 1">
+            <a:extLst>
+              <a:ext uri="{FF2B5EF4-FFF2-40B4-BE49-F238E27FC236}">
+                <a16:creationId xmlns:a16="http://schemas.microsoft.com/office/drawing/2014/main" id="{C960C00B-570D-4117-A474-EC2A570AFB70}"/>
+              </a:ext>
+            </a:extLst>
+          </p:cNvPr>
+          <p:cNvSpPr>
+            <a:spLocks noGrp="1"/>
+          </p:cNvSpPr>
+          <p:nvPr>
+            <p:ph type="body" sz="quarter" idx="10"/>
+          </p:nvPr>
+        </p:nvSpPr>
+        <p:spPr/>
+        <p:txBody>
+          <a:bodyPr/>
+          <a:lstStyle/>
+          <a:p>
+            <a:r>
+              <a:rPr lang="en-US" dirty="0"/>
+              <a:t>Rigid</a:t>
+            </a:r>
+          </a:p>
+          <a:p>
+            <a:r>
+              <a:rPr lang="en-US" dirty="0"/>
+              <a:t>Fragile</a:t>
+            </a:r>
+          </a:p>
+          <a:p>
+            <a:r>
+              <a:rPr lang="en-US" dirty="0"/>
+              <a:t>Immobile</a:t>
+            </a:r>
+          </a:p>
+          <a:p>
+            <a:r>
+              <a:rPr lang="en-US" dirty="0"/>
+              <a:t>Overly Complex</a:t>
+            </a:r>
+          </a:p>
+          <a:p>
+            <a:r>
+              <a:rPr lang="en-US" dirty="0"/>
+              <a:t>Overly Redundant</a:t>
+            </a:r>
+          </a:p>
+          <a:p>
+            <a:pPr marL="0" indent="0">
+              <a:buNone/>
+            </a:pPr>
+            <a:endParaRPr lang="en-US" dirty="0"/>
+          </a:p>
+          <a:p>
+            <a:r>
+              <a:rPr lang="en-US" dirty="0"/>
+              <a:t>Difficult to understand</a:t>
+            </a:r>
+          </a:p>
+          <a:p>
+            <a:r>
+              <a:rPr lang="en-US" dirty="0"/>
+              <a:t>Difficult to modify/update</a:t>
+            </a:r>
+          </a:p>
+          <a:p>
+            <a:r>
+              <a:rPr lang="en-US" dirty="0"/>
+              <a:t>Difficult to test</a:t>
+            </a:r>
+          </a:p>
+          <a:p>
+            <a:r>
+              <a:rPr lang="en-US" dirty="0"/>
+              <a:t>Difficult.</a:t>
+            </a:r>
+          </a:p>
+          <a:p>
+            <a:endParaRPr lang="en-US" dirty="0"/>
+          </a:p>
+        </p:txBody>
+      </p:sp>
+      <p:sp>
+        <p:nvSpPr>
+          <p:cNvPr id="3" name="Title 2">
+            <a:extLst>
+              <a:ext uri="{FF2B5EF4-FFF2-40B4-BE49-F238E27FC236}">
+                <a16:creationId xmlns:a16="http://schemas.microsoft.com/office/drawing/2014/main" id="{A5EBD6D8-E651-4D9E-8EF6-8B9445E19594}"/>
+              </a:ext>
+            </a:extLst>
+          </p:cNvPr>
+          <p:cNvSpPr>
+            <a:spLocks noGrp="1"/>
+          </p:cNvSpPr>
+          <p:nvPr>
+            <p:ph type="title"/>
+          </p:nvPr>
+        </p:nvSpPr>
+        <p:spPr/>
+        <p:txBody>
+          <a:bodyPr/>
+          <a:lstStyle/>
+          <a:p>
+            <a:r>
+              <a:rPr lang="en-US" dirty="0"/>
+              <a:t>Bad Code</a:t>
+            </a:r>
+          </a:p>
+        </p:txBody>
+      </p:sp>
+    </p:spTree>
+    <p:extLst>
+      <p:ext uri="{BB962C8B-B14F-4D97-AF65-F5344CB8AC3E}">
+        <p14:creationId xmlns:p14="http://schemas.microsoft.com/office/powerpoint/2010/main" val="3504605506"/>
+      </p:ext>
+    </p:extLst>
+  </p:cSld>
+  <p:clrMapOvr>
+    <a:masterClrMapping/>
+  </p:clrMapOvr>
+  <p:timing>
+    <p:tnLst>
+      <p:par>
+        <p:cTn id="1" dur="indefinite" restart="never" nodeType="tmRoot">
+          <p:childTnLst>
+            <p:seq concurrent="1" nextAc="seek">
+              <p:cTn id="2" dur="indefinite" nodeType="mainSeq">
+                <p:childTnLst>
+                  <p:par>
+                    <p:cTn id="3" fill="hold">
+                      <p:stCondLst>
+                        <p:cond delay="indefinite"/>
+                      </p:stCondLst>
+                      <p:childTnLst>
+                        <p:par>
+                          <p:cTn id="4" fill="hold">
+                            <p:stCondLst>
+                              <p:cond delay="0"/>
+                            </p:stCondLst>
+                            <p:childTnLst>
+                              <p:par>
+                                <p:cTn id="5" presetID="1" presetClass="entr" presetSubtype="0" fill="hold" nodeType="clickEffect">
+                                  <p:stCondLst>
+                                    <p:cond delay="0"/>
+                                  </p:stCondLst>
+                                  <p:childTnLst>
+                                    <p:set>
+                                      <p:cBhvr>
+                                        <p:cTn id="6" dur="1" fill="hold">
+                                          <p:stCondLst>
+                                            <p:cond delay="0"/>
+                                          </p:stCondLst>
+                                        </p:cTn>
+                                        <p:tgtEl>
+                                          <p:spTgt spid="2">
+                                            <p:txEl>
+                                              <p:pRg st="0" end="0"/>
+                                            </p:txEl>
+                                          </p:spTgt>
+                                        </p:tgtEl>
+                                        <p:attrNameLst>
+                                          <p:attrName>style.visibility</p:attrName>
+                                        </p:attrNameLst>
+                                      </p:cBhvr>
+                                      <p:to>
+                                        <p:strVal val="visible"/>
+                                      </p:to>
+                                    </p:set>
+                                  </p:childTnLst>
+                                </p:cTn>
+                              </p:par>
+                              <p:par>
+                                <p:cTn id="7" presetID="1" presetClass="entr" presetSubtype="0" fill="hold" nodeType="withEffect">
+                                  <p:stCondLst>
+                                    <p:cond delay="0"/>
+                                  </p:stCondLst>
+                                  <p:childTnLst>
+                                    <p:set>
+                                      <p:cBhvr>
+                                        <p:cTn id="8" dur="1" fill="hold">
+                                          <p:stCondLst>
+                                            <p:cond delay="0"/>
+                                          </p:stCondLst>
+                                        </p:cTn>
+                                        <p:tgtEl>
+                                          <p:spTgt spid="2">
+                                            <p:txEl>
+                                              <p:pRg st="1" end="1"/>
+                                            </p:txEl>
+                                          </p:spTgt>
+                                        </p:tgtEl>
+                                        <p:attrNameLst>
+                                          <p:attrName>style.visibility</p:attrName>
+                                        </p:attrNameLst>
+                                      </p:cBhvr>
+                                      <p:to>
+                                        <p:strVal val="visible"/>
+                                      </p:to>
+                                    </p:set>
+                                  </p:childTnLst>
+                                </p:cTn>
+                              </p:par>
+                              <p:par>
+                                <p:cTn id="9" presetID="1" presetClass="entr" presetSubtype="0" fill="hold" nodeType="withEffect">
+                                  <p:stCondLst>
+                                    <p:cond delay="0"/>
+                                  </p:stCondLst>
+                                  <p:childTnLst>
+                                    <p:set>
+                                      <p:cBhvr>
+                                        <p:cTn id="10" dur="1" fill="hold">
+                                          <p:stCondLst>
+                                            <p:cond delay="0"/>
+                                          </p:stCondLst>
+                                        </p:cTn>
+                                        <p:tgtEl>
+                                          <p:spTgt spid="2">
+                                            <p:txEl>
+                                              <p:pRg st="2" end="2"/>
+                                            </p:txEl>
+                                          </p:spTgt>
+                                        </p:tgtEl>
+                                        <p:attrNameLst>
+                                          <p:attrName>style.visibility</p:attrName>
+                                        </p:attrNameLst>
+                                      </p:cBhvr>
+                                      <p:to>
+                                        <p:strVal val="visible"/>
+                                      </p:to>
+                                    </p:set>
+                                  </p:childTnLst>
+                                </p:cTn>
+                              </p:par>
+                              <p:par>
+                                <p:cTn id="11" presetID="1" presetClass="entr" presetSubtype="0" fill="hold" nodeType="withEffect">
+                                  <p:stCondLst>
+                                    <p:cond delay="0"/>
+                                  </p:stCondLst>
+                                  <p:childTnLst>
+                                    <p:set>
+                                      <p:cBhvr>
+                                        <p:cTn id="12" dur="1" fill="hold">
+                                          <p:stCondLst>
+                                            <p:cond delay="0"/>
+                                          </p:stCondLst>
+                                        </p:cTn>
+                                        <p:tgtEl>
+                                          <p:spTgt spid="2">
+                                            <p:txEl>
+                                              <p:pRg st="3" end="3"/>
+                                            </p:txEl>
+                                          </p:spTgt>
+                                        </p:tgtEl>
+                                        <p:attrNameLst>
+                                          <p:attrName>style.visibility</p:attrName>
+                                        </p:attrNameLst>
+                                      </p:cBhvr>
+                                      <p:to>
+                                        <p:strVal val="visible"/>
+                                      </p:to>
+                                    </p:set>
+                                  </p:childTnLst>
+                                </p:cTn>
+                              </p:par>
+                              <p:par>
+                                <p:cTn id="13" presetID="1" presetClass="entr" presetSubtype="0" fill="hold" nodeType="withEffect">
+                                  <p:stCondLst>
+                                    <p:cond delay="0"/>
+                                  </p:stCondLst>
+                                  <p:childTnLst>
+                                    <p:set>
+                                      <p:cBhvr>
+                                        <p:cTn id="14" dur="1" fill="hold">
+                                          <p:stCondLst>
+                                            <p:cond delay="0"/>
+                                          </p:stCondLst>
+                                        </p:cTn>
+                                        <p:tgtEl>
+                                          <p:spTgt spid="2">
+                                            <p:txEl>
+                                              <p:pRg st="4" end="4"/>
+                                            </p:txEl>
+                                          </p:spTgt>
+                                        </p:tgtEl>
+                                        <p:attrNameLst>
+                                          <p:attrName>style.visibility</p:attrName>
+                                        </p:attrNameLst>
+                                      </p:cBhvr>
+                                      <p:to>
+                                        <p:strVal val="visible"/>
+                                      </p:to>
+                                    </p:set>
+                                  </p:childTnLst>
+                                </p:cTn>
+                              </p:par>
+                            </p:childTnLst>
+                          </p:cTn>
+                        </p:par>
+                      </p:childTnLst>
+                    </p:cTn>
+                  </p:par>
+                  <p:par>
+                    <p:cTn id="15" fill="hold">
+                      <p:stCondLst>
+                        <p:cond delay="indefinite"/>
+                      </p:stCondLst>
+                      <p:childTnLst>
+                        <p:par>
+                          <p:cTn id="16" fill="hold">
+                            <p:stCondLst>
+                              <p:cond delay="0"/>
+                            </p:stCondLst>
+                            <p:childTnLst>
+                              <p:par>
+                                <p:cTn id="17" presetID="1" presetClass="entr" presetSubtype="0" fill="hold" nodeType="clickEffect">
+                                  <p:stCondLst>
+                                    <p:cond delay="0"/>
+                                  </p:stCondLst>
+                                  <p:childTnLst>
+                                    <p:set>
+                                      <p:cBhvr>
+                                        <p:cTn id="18" dur="1" fill="hold">
+                                          <p:stCondLst>
+                                            <p:cond delay="0"/>
+                                          </p:stCondLst>
+                                        </p:cTn>
+                                        <p:tgtEl>
+                                          <p:spTgt spid="2">
+                                            <p:txEl>
+                                              <p:pRg st="6" end="6"/>
+                                            </p:txEl>
+                                          </p:spTgt>
+                                        </p:tgtEl>
+                                        <p:attrNameLst>
+                                          <p:attrName>style.visibility</p:attrName>
+                                        </p:attrNameLst>
+                                      </p:cBhvr>
+                                      <p:to>
+                                        <p:strVal val="visible"/>
+                                      </p:to>
+                                    </p:set>
+                                  </p:childTnLst>
+                                </p:cTn>
+                              </p:par>
+                              <p:par>
+                                <p:cTn id="19" presetID="1" presetClass="entr" presetSubtype="0" fill="hold" nodeType="withEffect">
+                                  <p:stCondLst>
+                                    <p:cond delay="0"/>
+                                  </p:stCondLst>
+                                  <p:childTnLst>
+                                    <p:set>
+                                      <p:cBhvr>
+                                        <p:cTn id="20" dur="1" fill="hold">
+                                          <p:stCondLst>
+                                            <p:cond delay="0"/>
+                                          </p:stCondLst>
+                                        </p:cTn>
+                                        <p:tgtEl>
+                                          <p:spTgt spid="2">
+                                            <p:txEl>
+                                              <p:pRg st="7" end="7"/>
+                                            </p:txEl>
+                                          </p:spTgt>
+                                        </p:tgtEl>
+                                        <p:attrNameLst>
+                                          <p:attrName>style.visibility</p:attrName>
+                                        </p:attrNameLst>
+                                      </p:cBhvr>
+                                      <p:to>
+                                        <p:strVal val="visible"/>
+                                      </p:to>
+                                    </p:set>
+                                  </p:childTnLst>
+                                </p:cTn>
+                              </p:par>
+                              <p:par>
+                                <p:cTn id="21" presetID="1" presetClass="entr" presetSubtype="0" fill="hold" nodeType="withEffect">
+                                  <p:stCondLst>
+                                    <p:cond delay="0"/>
+                                  </p:stCondLst>
+                                  <p:childTnLst>
+                                    <p:set>
+                                      <p:cBhvr>
+                                        <p:cTn id="22" dur="1" fill="hold">
+                                          <p:stCondLst>
+                                            <p:cond delay="0"/>
+                                          </p:stCondLst>
+                                        </p:cTn>
+                                        <p:tgtEl>
+                                          <p:spTgt spid="2">
+                                            <p:txEl>
+                                              <p:pRg st="8" end="8"/>
+                                            </p:txEl>
+                                          </p:spTgt>
+                                        </p:tgtEl>
+                                        <p:attrNameLst>
+                                          <p:attrName>style.visibility</p:attrName>
+                                        </p:attrNameLst>
+                                      </p:cBhvr>
+                                      <p:to>
+                                        <p:strVal val="visible"/>
+                                      </p:to>
+                                    </p:set>
+                                  </p:childTnLst>
+                                </p:cTn>
+                              </p:par>
+                              <p:par>
+                                <p:cTn id="23" presetID="1" presetClass="entr" presetSubtype="0" fill="hold" nodeType="withEffect">
+                                  <p:stCondLst>
+                                    <p:cond delay="0"/>
+                                  </p:stCondLst>
+                                  <p:childTnLst>
+                                    <p:set>
+                                      <p:cBhvr>
+                                        <p:cTn id="24" dur="1" fill="hold">
+                                          <p:stCondLst>
+                                            <p:cond delay="0"/>
+                                          </p:stCondLst>
+                                        </p:cTn>
+                                        <p:tgtEl>
+                                          <p:spTgt spid="2">
+                                            <p:txEl>
+                                              <p:pRg st="9" end="9"/>
+                                            </p:txEl>
+                                          </p:spTgt>
+                                        </p:tgtEl>
+                                        <p:attrNameLst>
+                                          <p:attrName>style.visibility</p:attrName>
+                                        </p:attrNameLst>
+                                      </p:cBhvr>
+                                      <p:to>
+                                        <p:strVal val="visible"/>
+                                      </p:to>
+                                    </p:set>
+                                  </p:childTnLst>
+                                </p:cTn>
+                              </p:par>
+                            </p:childTnLst>
+                          </p:cTn>
+                        </p:par>
+                      </p:childTnLst>
+                    </p:cTn>
+                  </p:par>
+                </p:childTnLst>
+              </p:cTn>
+              <p:prevCondLst>
+                <p:cond evt="onPrev" delay="0">
+                  <p:tgtEl>
+                    <p:sldTgt/>
+                  </p:tgtEl>
+                </p:cond>
+              </p:prevCondLst>
+              <p:nextCondLst>
+                <p:cond evt="onNext" delay="0">
+                  <p:tgtEl>
+                    <p:sldTgt/>
+                  </p:tgtEl>
+                </p:cond>
+              </p:nextCondLst>
+            </p:seq>
+          </p:childTnLst>
+        </p:cTn>
+      </p:par>
+    </p:tnLst>
+  </p:timing>
+</p:sld>
+</file>
+
+<file path=ppt/slides/slide30.xml><?xml version="1.0" encoding="utf-8"?>
+<p:sld xmlns:a="http://schemas.openxmlformats.org/drawingml/2006/main" xmlns:r="http://schemas.openxmlformats.org/officeDocument/2006/relationships" xmlns:p="http://schemas.openxmlformats.org/presentationml/2006/main">
+  <p:cSld>
+    <p:spTree>
+      <p:nvGrpSpPr>
+        <p:cNvPr id="1" name=""/>
+        <p:cNvGrpSpPr/>
+        <p:nvPr/>
+      </p:nvGrpSpPr>
+      <p:grpSpPr>
+        <a:xfrm>
+          <a:off x="0" y="0"/>
+          <a:ext cx="0" cy="0"/>
+          <a:chOff x="0" y="0"/>
+          <a:chExt cx="0" cy="0"/>
+        </a:xfrm>
+      </p:grpSpPr>
+      <p:sp>
+        <p:nvSpPr>
           <p:cNvPr id="7" name="Title 6"/>
           <p:cNvSpPr>
             <a:spLocks noGrp="1"/>
@@ -12639,146 +13519,50 @@
           <a:p>
             <a:r>
               <a:rPr lang="en-US" dirty="0"/>
-              <a:t>Single Responsibility Overview</a:t>
-            </a:r>
-          </a:p>
-        </p:txBody>
-      </p:sp>
-      <p:sp>
-        <p:nvSpPr>
-          <p:cNvPr id="2" name="TextBox 1">
+              <a:t>Good </a:t>
+            </a:r>
+            <a:r>
+              <a:rPr lang="en-US" dirty="0" err="1"/>
+              <a:t>LockScreen</a:t>
+            </a:r>
+            <a:endParaRPr lang="en-US" dirty="0"/>
+          </a:p>
+        </p:txBody>
+      </p:sp>
+      <p:pic>
+        <p:nvPicPr>
+          <p:cNvPr id="4" name="Picture 3">
             <a:extLst>
               <a:ext uri="{FF2B5EF4-FFF2-40B4-BE49-F238E27FC236}">
-                <a16:creationId xmlns:a16="http://schemas.microsoft.com/office/drawing/2014/main" id="{B35B1041-8099-49DD-AFA9-BDB74A2128E1}"/>
+                <a16:creationId xmlns:a16="http://schemas.microsoft.com/office/drawing/2014/main" id="{6E33723B-8977-47A3-8F82-72D48C5BC2FE}"/>
               </a:ext>
             </a:extLst>
           </p:cNvPr>
-          <p:cNvSpPr txBox="1"/>
+          <p:cNvPicPr>
+            <a:picLocks noChangeAspect="1"/>
+          </p:cNvPicPr>
           <p:nvPr/>
-        </p:nvSpPr>
-        <p:spPr bwMode="auto">
+        </p:nvPicPr>
+        <p:blipFill>
+          <a:blip r:embed="rId3"/>
+          <a:stretch>
+            <a:fillRect/>
+          </a:stretch>
+        </p:blipFill>
+        <p:spPr>
           <a:xfrm>
-            <a:off x="273677" y="1554480"/>
-            <a:ext cx="8161663" cy="1569660"/>
+            <a:off x="705441" y="849374"/>
+            <a:ext cx="5172797" cy="3658111"/>
           </a:xfrm>
           <a:prstGeom prst="rect">
             <a:avLst/>
           </a:prstGeom>
-          <a:noFill/>
-          <a:ln w="12700" cap="sq" algn="ctr">
-            <a:noFill/>
-            <a:miter lim="800000"/>
-            <a:headEnd/>
-            <a:tailEnd/>
-          </a:ln>
-          <a:effectLst/>
-        </p:spPr>
-        <p:txBody>
-          <a:bodyPr wrap="square" rtlCol="0">
-            <a:spAutoFit/>
-          </a:bodyPr>
-          <a:lstStyle/>
-          <a:p>
-            <a:pPr marL="285750" indent="-285750">
-              <a:buFont typeface="Arial" panose="020B0604020202020204" pitchFamily="34" charset="0"/>
-              <a:buChar char="•"/>
-            </a:pPr>
-            <a:r>
-              <a:rPr lang="en-US" sz="1600" dirty="0">
-                <a:solidFill>
-                  <a:schemeClr val="tx1">
-                    <a:lumMod val="75000"/>
-                    <a:lumOff val="25000"/>
-                  </a:schemeClr>
-                </a:solidFill>
-                <a:latin typeface="Tahoma" pitchFamily="34" charset="0"/>
-                <a:cs typeface="Tahoma" pitchFamily="34" charset="0"/>
-              </a:rPr>
-              <a:t>A single module/class should have exactly one functional responsibility</a:t>
-            </a:r>
-          </a:p>
-          <a:p>
-            <a:pPr marL="285750" indent="-285750">
-              <a:buFont typeface="Arial" panose="020B0604020202020204" pitchFamily="34" charset="0"/>
-              <a:buChar char="•"/>
-            </a:pPr>
-            <a:r>
-              <a:rPr lang="en-US" sz="1600" dirty="0">
-                <a:solidFill>
-                  <a:schemeClr val="tx1">
-                    <a:lumMod val="75000"/>
-                    <a:lumOff val="25000"/>
-                  </a:schemeClr>
-                </a:solidFill>
-                <a:latin typeface="Tahoma" pitchFamily="34" charset="0"/>
-                <a:cs typeface="Tahoma" pitchFamily="34" charset="0"/>
-              </a:rPr>
-              <a:t>“Responsibility” can be thought of as a “reason to change”</a:t>
-            </a:r>
-          </a:p>
-          <a:p>
-            <a:pPr marL="742950" lvl="1" indent="-285750">
-              <a:buFont typeface="Arial" panose="020B0604020202020204" pitchFamily="34" charset="0"/>
-              <a:buChar char="•"/>
-            </a:pPr>
-            <a:r>
-              <a:rPr lang="en-US" sz="1600" dirty="0">
-                <a:solidFill>
-                  <a:schemeClr val="tx1">
-                    <a:lumMod val="75000"/>
-                    <a:lumOff val="25000"/>
-                  </a:schemeClr>
-                </a:solidFill>
-                <a:latin typeface="Tahoma" pitchFamily="34" charset="0"/>
-                <a:cs typeface="Tahoma" pitchFamily="34" charset="0"/>
-              </a:rPr>
-              <a:t>Each module/class should have one (and only one) reason to be rewritten/changed</a:t>
-            </a:r>
-          </a:p>
-          <a:p>
-            <a:pPr marL="285750" indent="-285750">
-              <a:buFont typeface="Arial" panose="020B0604020202020204" pitchFamily="34" charset="0"/>
-              <a:buChar char="•"/>
-            </a:pPr>
-            <a:r>
-              <a:rPr lang="en-US" sz="1600" dirty="0">
-                <a:solidFill>
-                  <a:schemeClr val="tx1">
-                    <a:lumMod val="75000"/>
-                    <a:lumOff val="25000"/>
-                  </a:schemeClr>
-                </a:solidFill>
-                <a:latin typeface="Tahoma" pitchFamily="34" charset="0"/>
-                <a:cs typeface="Tahoma" pitchFamily="34" charset="0"/>
-              </a:rPr>
-              <a:t>Forces code to be more modular/robust</a:t>
-            </a:r>
-          </a:p>
-          <a:p>
-            <a:pPr marL="742950" lvl="1" indent="-285750">
-              <a:buFont typeface="Arial" panose="020B0604020202020204" pitchFamily="34" charset="0"/>
-              <a:buChar char="•"/>
-            </a:pPr>
-            <a:r>
-              <a:rPr lang="en-US" sz="1600" dirty="0">
-                <a:solidFill>
-                  <a:schemeClr val="tx1">
-                    <a:lumMod val="75000"/>
-                    <a:lumOff val="25000"/>
-                  </a:schemeClr>
-                </a:solidFill>
-                <a:latin typeface="Tahoma" pitchFamily="34" charset="0"/>
-                <a:cs typeface="Tahoma" pitchFamily="34" charset="0"/>
-              </a:rPr>
-              <a:t>Easier to modify/test</a:t>
-            </a:r>
-          </a:p>
-        </p:txBody>
-      </p:sp>
+        </p:spPr>
+      </p:pic>
     </p:spTree>
     <p:extLst>
       <p:ext uri="{BB962C8B-B14F-4D97-AF65-F5344CB8AC3E}">
-        <p14:creationId xmlns:p14="http://schemas.microsoft.com/office/powerpoint/2010/main" val="591778860"/>
+        <p14:creationId xmlns:p14="http://schemas.microsoft.com/office/powerpoint/2010/main" val="4243480717"/>
       </p:ext>
     </p:extLst>
   </p:cSld>
@@ -12808,7 +13592,65 @@
       </p:grpSpPr>
       <p:sp>
         <p:nvSpPr>
-          <p:cNvPr id="7" name="Title 6"/>
+          <p:cNvPr id="2" name="Text Placeholder 1">
+            <a:extLst>
+              <a:ext uri="{FF2B5EF4-FFF2-40B4-BE49-F238E27FC236}">
+                <a16:creationId xmlns:a16="http://schemas.microsoft.com/office/drawing/2014/main" id="{0ED74215-9ED9-4717-B06F-3F851CB1711E}"/>
+              </a:ext>
+            </a:extLst>
+          </p:cNvPr>
+          <p:cNvSpPr>
+            <a:spLocks noGrp="1"/>
+          </p:cNvSpPr>
+          <p:nvPr>
+            <p:ph type="body" sz="quarter" idx="10"/>
+          </p:nvPr>
+        </p:nvSpPr>
+        <p:spPr/>
+        <p:txBody>
+          <a:bodyPr/>
+          <a:lstStyle/>
+          <a:p>
+            <a:r>
+              <a:rPr lang="en-US" dirty="0"/>
+              <a:t>Reliability</a:t>
+            </a:r>
+          </a:p>
+          <a:p>
+            <a:r>
+              <a:rPr lang="en-US" dirty="0"/>
+              <a:t>Flexibility</a:t>
+            </a:r>
+          </a:p>
+          <a:p>
+            <a:r>
+              <a:rPr lang="en-US" dirty="0"/>
+              <a:t>Separation of Concerns</a:t>
+            </a:r>
+          </a:p>
+          <a:p>
+            <a:r>
+              <a:rPr lang="en-US" dirty="0"/>
+              <a:t>Reusability</a:t>
+            </a:r>
+          </a:p>
+          <a:p>
+            <a:r>
+              <a:rPr lang="en-US" dirty="0"/>
+              <a:t>Maintainability</a:t>
+            </a:r>
+          </a:p>
+        </p:txBody>
+      </p:sp>
+      <p:sp>
+        <p:nvSpPr>
+          <p:cNvPr id="3" name="Title 2">
+            <a:extLst>
+              <a:ext uri="{FF2B5EF4-FFF2-40B4-BE49-F238E27FC236}">
+                <a16:creationId xmlns:a16="http://schemas.microsoft.com/office/drawing/2014/main" id="{33AC4FB1-CF90-45CE-B1D0-11D2581502B2}"/>
+              </a:ext>
+            </a:extLst>
+          </p:cNvPr>
           <p:cNvSpPr>
             <a:spLocks noGrp="1"/>
           </p:cNvSpPr>
@@ -12818,59 +13660,26 @@
         </p:nvSpPr>
         <p:spPr/>
         <p:txBody>
-          <a:bodyPr>
-            <a:normAutofit/>
-          </a:bodyPr>
+          <a:bodyPr/>
           <a:lstStyle/>
           <a:p>
             <a:r>
               <a:rPr lang="en-US" dirty="0"/>
-              <a:t>Bad Soccer Player</a:t>
-            </a:r>
-          </a:p>
-        </p:txBody>
-      </p:sp>
-      <p:pic>
-        <p:nvPicPr>
-          <p:cNvPr id="8" name="Picture 7">
-            <a:extLst>
-              <a:ext uri="{FF2B5EF4-FFF2-40B4-BE49-F238E27FC236}">
-                <a16:creationId xmlns:a16="http://schemas.microsoft.com/office/drawing/2014/main" id="{A04A4EC0-27E5-4951-B5A8-D0E001C8F38E}"/>
-              </a:ext>
-            </a:extLst>
-          </p:cNvPr>
-          <p:cNvPicPr>
-            <a:picLocks noChangeAspect="1"/>
-          </p:cNvPicPr>
-          <p:nvPr/>
-        </p:nvPicPr>
-        <p:blipFill>
-          <a:blip r:embed="rId3"/>
-          <a:stretch>
-            <a:fillRect/>
-          </a:stretch>
-        </p:blipFill>
-        <p:spPr>
-          <a:xfrm>
-            <a:off x="1050917" y="719045"/>
-            <a:ext cx="6546223" cy="3705409"/>
-          </a:xfrm>
-          <a:prstGeom prst="rect">
-            <a:avLst/>
-          </a:prstGeom>
-        </p:spPr>
-      </p:pic>
+              <a:t>Good Code</a:t>
+            </a:r>
+          </a:p>
+        </p:txBody>
+      </p:sp>
     </p:spTree>
     <p:extLst>
       <p:ext uri="{BB962C8B-B14F-4D97-AF65-F5344CB8AC3E}">
-        <p14:creationId xmlns:p14="http://schemas.microsoft.com/office/powerpoint/2010/main" val="409676806"/>
+        <p14:creationId xmlns:p14="http://schemas.microsoft.com/office/powerpoint/2010/main" val="3240963543"/>
       </p:ext>
     </p:extLst>
   </p:cSld>
   <p:clrMapOvr>
     <a:masterClrMapping/>
   </p:clrMapOvr>
-  <p:transition/>
 </p:sld>
 </file>
 
@@ -12893,7 +13702,93 @@
       </p:grpSpPr>
       <p:sp>
         <p:nvSpPr>
-          <p:cNvPr id="7" name="Title 6"/>
+          <p:cNvPr id="2" name="Text Placeholder 1">
+            <a:extLst>
+              <a:ext uri="{FF2B5EF4-FFF2-40B4-BE49-F238E27FC236}">
+                <a16:creationId xmlns:a16="http://schemas.microsoft.com/office/drawing/2014/main" id="{47987A74-FE64-4475-B657-7DC6EEA27BFB}"/>
+              </a:ext>
+            </a:extLst>
+          </p:cNvPr>
+          <p:cNvSpPr>
+            <a:spLocks noGrp="1"/>
+          </p:cNvSpPr>
+          <p:nvPr>
+            <p:ph type="body" sz="quarter" idx="10"/>
+          </p:nvPr>
+        </p:nvSpPr>
+        <p:spPr/>
+        <p:txBody>
+          <a:bodyPr/>
+          <a:lstStyle/>
+          <a:p>
+            <a:r>
+              <a:rPr lang="en-US" b="1" dirty="0"/>
+              <a:t>S</a:t>
+            </a:r>
+            <a:r>
+              <a:rPr lang="en-US" dirty="0"/>
+              <a:t> – Single Responsibility Principle</a:t>
+            </a:r>
+          </a:p>
+          <a:p>
+            <a:r>
+              <a:rPr lang="en-US" b="1" dirty="0"/>
+              <a:t>O</a:t>
+            </a:r>
+            <a:r>
+              <a:rPr lang="en-US" dirty="0"/>
+              <a:t> – Open Closed Principle</a:t>
+            </a:r>
+          </a:p>
+          <a:p>
+            <a:r>
+              <a:rPr lang="en-US" b="1" dirty="0"/>
+              <a:t>L</a:t>
+            </a:r>
+            <a:r>
+              <a:rPr lang="en-US" dirty="0"/>
+              <a:t> – </a:t>
+            </a:r>
+            <a:r>
+              <a:rPr lang="en-US" dirty="0" err="1"/>
+              <a:t>Liskov</a:t>
+            </a:r>
+            <a:r>
+              <a:rPr lang="en-US" dirty="0"/>
+              <a:t> Substitution Principle</a:t>
+            </a:r>
+          </a:p>
+          <a:p>
+            <a:r>
+              <a:rPr lang="en-US" b="1" dirty="0"/>
+              <a:t>I</a:t>
+            </a:r>
+            <a:r>
+              <a:rPr lang="en-US" dirty="0"/>
+              <a:t> – Interface Segregation Principle</a:t>
+            </a:r>
+          </a:p>
+          <a:p>
+            <a:r>
+              <a:rPr lang="en-US" b="1" dirty="0"/>
+              <a:t>D</a:t>
+            </a:r>
+            <a:r>
+              <a:rPr lang="en-US" dirty="0"/>
+              <a:t> – Dependency Inversion Principle</a:t>
+            </a:r>
+          </a:p>
+        </p:txBody>
+      </p:sp>
+      <p:sp>
+        <p:nvSpPr>
+          <p:cNvPr id="3" name="Title 2">
+            <a:extLst>
+              <a:ext uri="{FF2B5EF4-FFF2-40B4-BE49-F238E27FC236}">
+                <a16:creationId xmlns:a16="http://schemas.microsoft.com/office/drawing/2014/main" id="{44CABCB7-3968-40F6-AFA9-F57151F442F8}"/>
+              </a:ext>
+            </a:extLst>
+          </p:cNvPr>
           <p:cNvSpPr>
             <a:spLocks noGrp="1"/>
           </p:cNvSpPr>
@@ -12903,59 +13798,26 @@
         </p:nvSpPr>
         <p:spPr/>
         <p:txBody>
-          <a:bodyPr>
-            <a:normAutofit/>
-          </a:bodyPr>
+          <a:bodyPr/>
           <a:lstStyle/>
           <a:p>
             <a:r>
               <a:rPr lang="en-US" dirty="0"/>
-              <a:t>Good Soccer Player</a:t>
-            </a:r>
-          </a:p>
-        </p:txBody>
-      </p:sp>
-      <p:pic>
-        <p:nvPicPr>
-          <p:cNvPr id="3" name="Picture 2">
-            <a:extLst>
-              <a:ext uri="{FF2B5EF4-FFF2-40B4-BE49-F238E27FC236}">
-                <a16:creationId xmlns:a16="http://schemas.microsoft.com/office/drawing/2014/main" id="{25E8393C-792B-45B1-8C3F-0567367C43C6}"/>
-              </a:ext>
-            </a:extLst>
-          </p:cNvPr>
-          <p:cNvPicPr>
-            <a:picLocks noChangeAspect="1"/>
-          </p:cNvPicPr>
-          <p:nvPr/>
-        </p:nvPicPr>
-        <p:blipFill>
-          <a:blip r:embed="rId3"/>
-          <a:stretch>
-            <a:fillRect/>
-          </a:stretch>
-        </p:blipFill>
-        <p:spPr>
-          <a:xfrm>
-            <a:off x="428046" y="695063"/>
-            <a:ext cx="8287907" cy="3753374"/>
-          </a:xfrm>
-          <a:prstGeom prst="rect">
-            <a:avLst/>
-          </a:prstGeom>
-        </p:spPr>
-      </p:pic>
+              <a:t>SOLID Principles</a:t>
+            </a:r>
+          </a:p>
+        </p:txBody>
+      </p:sp>
     </p:spTree>
     <p:extLst>
       <p:ext uri="{BB962C8B-B14F-4D97-AF65-F5344CB8AC3E}">
-        <p14:creationId xmlns:p14="http://schemas.microsoft.com/office/powerpoint/2010/main" val="2912219046"/>
+        <p14:creationId xmlns:p14="http://schemas.microsoft.com/office/powerpoint/2010/main" val="1761757261"/>
       </p:ext>
     </p:extLst>
   </p:cSld>
   <p:clrMapOvr>
     <a:masterClrMapping/>
   </p:clrMapOvr>
-  <p:transition/>
 </p:sld>
 </file>
 
@@ -12993,7 +13855,7 @@
           <a:p>
             <a:r>
               <a:rPr lang="en-US" dirty="0"/>
-              <a:t>Open-Closed Principle</a:t>
+              <a:t>Single Responsibility Principle</a:t>
             </a:r>
           </a:p>
         </p:txBody>
@@ -13020,7 +13882,7 @@
     </p:spTree>
     <p:extLst>
       <p:ext uri="{BB962C8B-B14F-4D97-AF65-F5344CB8AC3E}">
-        <p14:creationId xmlns:p14="http://schemas.microsoft.com/office/powerpoint/2010/main" val="2605682236"/>
+        <p14:creationId xmlns:p14="http://schemas.microsoft.com/office/powerpoint/2010/main" val="2342469114"/>
       </p:ext>
     </p:extLst>
   </p:cSld>
@@ -13066,7 +13928,7 @@
           <a:p>
             <a:r>
               <a:rPr lang="en-US" dirty="0"/>
-              <a:t>Open-Closed Principle Overview</a:t>
+              <a:t>Single Responsibility Overview</a:t>
             </a:r>
           </a:p>
         </p:txBody>
@@ -13086,7 +13948,7 @@
         <p:spPr bwMode="auto">
           <a:xfrm>
             <a:off x="273677" y="1554480"/>
-            <a:ext cx="8161663" cy="646331"/>
+            <a:ext cx="8161663" cy="1569660"/>
           </a:xfrm>
           <a:prstGeom prst="rect">
             <a:avLst/>
@@ -13111,34 +13973,101 @@
               <a:buChar char="•"/>
             </a:pPr>
             <a:r>
-              <a:rPr lang="en-US" dirty="0"/>
-              <a:t> “</a:t>
-            </a:r>
-            <a:r>
-              <a:rPr lang="en-US" i="1" dirty="0"/>
-              <a:t>Software entities (classes, modules, functions, etc.) should be open for extension, but closed for modification</a:t>
-            </a:r>
-            <a:r>
-              <a:rPr lang="en-US" dirty="0"/>
-              <a:t>"</a:t>
-            </a:r>
-            <a:endParaRPr lang="en-US" sz="1600" dirty="0">
-              <a:solidFill>
-                <a:schemeClr val="tx1">
-                  <a:lumMod val="75000"/>
-                  <a:lumOff val="25000"/>
-                </a:schemeClr>
-              </a:solidFill>
-              <a:latin typeface="Tahoma" pitchFamily="34" charset="0"/>
-              <a:cs typeface="Tahoma" pitchFamily="34" charset="0"/>
-            </a:endParaRPr>
+              <a:rPr lang="en-US" sz="1600" dirty="0">
+                <a:solidFill>
+                  <a:schemeClr val="tx1">
+                    <a:lumMod val="75000"/>
+                    <a:lumOff val="25000"/>
+                  </a:schemeClr>
+                </a:solidFill>
+                <a:latin typeface="Tahoma" pitchFamily="34" charset="0"/>
+                <a:cs typeface="Tahoma" pitchFamily="34" charset="0"/>
+              </a:rPr>
+              <a:t>A single module/class should have exactly one functional responsibility</a:t>
+            </a:r>
+          </a:p>
+          <a:p>
+            <a:pPr marL="285750" indent="-285750">
+              <a:buFont typeface="Arial" panose="020B0604020202020204" pitchFamily="34" charset="0"/>
+              <a:buChar char="•"/>
+            </a:pPr>
+            <a:r>
+              <a:rPr lang="en-US" sz="1600" dirty="0">
+                <a:solidFill>
+                  <a:schemeClr val="tx1">
+                    <a:lumMod val="75000"/>
+                    <a:lumOff val="25000"/>
+                  </a:schemeClr>
+                </a:solidFill>
+                <a:latin typeface="Tahoma" pitchFamily="34" charset="0"/>
+                <a:cs typeface="Tahoma" pitchFamily="34" charset="0"/>
+              </a:rPr>
+              <a:t>“Responsibility” can be thought of as a “reason to change”</a:t>
+            </a:r>
+          </a:p>
+          <a:p>
+            <a:pPr marL="742950" lvl="1" indent="-285750">
+              <a:buFont typeface="Arial" panose="020B0604020202020204" pitchFamily="34" charset="0"/>
+              <a:buChar char="•"/>
+            </a:pPr>
+            <a:r>
+              <a:rPr lang="en-US" sz="1600" dirty="0">
+                <a:solidFill>
+                  <a:schemeClr val="tx1">
+                    <a:lumMod val="75000"/>
+                    <a:lumOff val="25000"/>
+                  </a:schemeClr>
+                </a:solidFill>
+                <a:latin typeface="Tahoma" pitchFamily="34" charset="0"/>
+                <a:cs typeface="Tahoma" pitchFamily="34" charset="0"/>
+              </a:rPr>
+              <a:t>Each module/class should have one (and only one) reason to be rewritten/changed</a:t>
+            </a:r>
+          </a:p>
+          <a:p>
+            <a:pPr marL="285750" indent="-285750">
+              <a:buFont typeface="Arial" panose="020B0604020202020204" pitchFamily="34" charset="0"/>
+              <a:buChar char="•"/>
+            </a:pPr>
+            <a:r>
+              <a:rPr lang="en-US" sz="1600" dirty="0">
+                <a:solidFill>
+                  <a:schemeClr val="tx1">
+                    <a:lumMod val="75000"/>
+                    <a:lumOff val="25000"/>
+                  </a:schemeClr>
+                </a:solidFill>
+                <a:latin typeface="Tahoma" pitchFamily="34" charset="0"/>
+                <a:cs typeface="Tahoma" pitchFamily="34" charset="0"/>
+              </a:rPr>
+              <a:t>Forces code to be more modular/robust</a:t>
+            </a:r>
+          </a:p>
+          <a:p>
+            <a:pPr marL="742950" lvl="1" indent="-285750">
+              <a:buFont typeface="Arial" panose="020B0604020202020204" pitchFamily="34" charset="0"/>
+              <a:buChar char="•"/>
+            </a:pPr>
+            <a:r>
+              <a:rPr lang="en-US" sz="1600" dirty="0">
+                <a:solidFill>
+                  <a:schemeClr val="tx1">
+                    <a:lumMod val="75000"/>
+                    <a:lumOff val="25000"/>
+                  </a:schemeClr>
+                </a:solidFill>
+                <a:latin typeface="Tahoma" pitchFamily="34" charset="0"/>
+                <a:cs typeface="Tahoma" pitchFamily="34" charset="0"/>
+              </a:rPr>
+              <a:t>Easier to modify/test</a:t>
+            </a:r>
           </a:p>
         </p:txBody>
       </p:sp>
     </p:spTree>
     <p:extLst>
       <p:ext uri="{BB962C8B-B14F-4D97-AF65-F5344CB8AC3E}">
-        <p14:creationId xmlns:p14="http://schemas.microsoft.com/office/powerpoint/2010/main" val="1051721868"/>
+        <p14:creationId xmlns:p14="http://schemas.microsoft.com/office/powerpoint/2010/main" val="591778860"/>
       </p:ext>
     </p:extLst>
   </p:cSld>
@@ -13185,43 +14114,35 @@
           <a:p>
             <a:r>
               <a:rPr lang="en-US" dirty="0"/>
-              <a:t>Bad Example</a:t>
+              <a:t>Bad Soccer Player</a:t>
             </a:r>
           </a:p>
         </p:txBody>
       </p:sp>
       <p:pic>
         <p:nvPicPr>
-          <p:cNvPr id="4" name="Content Placeholder 4">
+          <p:cNvPr id="8" name="Picture 7">
             <a:extLst>
               <a:ext uri="{FF2B5EF4-FFF2-40B4-BE49-F238E27FC236}">
-                <a16:creationId xmlns:a16="http://schemas.microsoft.com/office/drawing/2014/main" id="{6F0130EF-8860-45DF-BBE6-AC6228497E23}"/>
+                <a16:creationId xmlns:a16="http://schemas.microsoft.com/office/drawing/2014/main" id="{A04A4EC0-27E5-4951-B5A8-D0E001C8F38E}"/>
               </a:ext>
             </a:extLst>
           </p:cNvPr>
           <p:cNvPicPr>
-            <a:picLocks noGrp="1" noChangeAspect="1"/>
+            <a:picLocks noChangeAspect="1"/>
           </p:cNvPicPr>
-          <p:nvPr>
-            <p:ph type="tbl" sz="quarter" idx="10"/>
-          </p:nvPr>
+          <p:nvPr/>
         </p:nvPicPr>
         <p:blipFill>
-          <a:blip r:embed="rId3">
-            <a:extLst>
-              <a:ext uri="{28A0092B-C50C-407E-A947-70E740481C1C}">
-                <a14:useLocalDpi xmlns:a14="http://schemas.microsoft.com/office/drawing/2010/main" val="0"/>
-              </a:ext>
-            </a:extLst>
-          </a:blip>
+          <a:blip r:embed="rId3"/>
           <a:stretch>
             <a:fillRect/>
           </a:stretch>
         </p:blipFill>
-        <p:spPr bwMode="blackGray">
+        <p:spPr>
           <a:xfrm>
-            <a:off x="1856132" y="932293"/>
-            <a:ext cx="5431736" cy="3278913"/>
+            <a:off x="1050917" y="719045"/>
+            <a:ext cx="6546223" cy="3705409"/>
           </a:xfrm>
           <a:prstGeom prst="rect">
             <a:avLst/>
@@ -13231,7 +14152,7 @@
     </p:spTree>
     <p:extLst>
       <p:ext uri="{BB962C8B-B14F-4D97-AF65-F5344CB8AC3E}">
-        <p14:creationId xmlns:p14="http://schemas.microsoft.com/office/powerpoint/2010/main" val="504464170"/>
+        <p14:creationId xmlns:p14="http://schemas.microsoft.com/office/powerpoint/2010/main" val="409676806"/>
       </p:ext>
     </p:extLst>
   </p:cSld>
@@ -13278,35 +14199,17 @@
           <a:p>
             <a:r>
               <a:rPr lang="en-US" dirty="0"/>
-              <a:t>Bad Example Expansion</a:t>
-            </a:r>
-          </a:p>
-        </p:txBody>
-      </p:sp>
-      <p:sp>
-        <p:nvSpPr>
-          <p:cNvPr id="3" name="Table Placeholder 2">
+              <a:t>Good Soccer Player</a:t>
+            </a:r>
+          </a:p>
+        </p:txBody>
+      </p:sp>
+      <p:pic>
+        <p:nvPicPr>
+          <p:cNvPr id="3" name="Picture 2">
             <a:extLst>
               <a:ext uri="{FF2B5EF4-FFF2-40B4-BE49-F238E27FC236}">
-                <a16:creationId xmlns:a16="http://schemas.microsoft.com/office/drawing/2014/main" id="{B5236AE0-4F4E-47D4-B4B9-C541258E0DDD}"/>
-              </a:ext>
-            </a:extLst>
-          </p:cNvPr>
-          <p:cNvSpPr>
-            <a:spLocks noGrp="1"/>
-          </p:cNvSpPr>
-          <p:nvPr>
-            <p:ph type="tbl" sz="quarter" idx="10"/>
-          </p:nvPr>
-        </p:nvSpPr>
-        <p:spPr/>
-      </p:sp>
-      <p:pic>
-        <p:nvPicPr>
-          <p:cNvPr id="6" name="Picture 5">
-            <a:extLst>
-              <a:ext uri="{FF2B5EF4-FFF2-40B4-BE49-F238E27FC236}">
-                <a16:creationId xmlns:a16="http://schemas.microsoft.com/office/drawing/2014/main" id="{B74B15AB-758F-4A3F-94B4-5AB75BBF1950}"/>
+                <a16:creationId xmlns:a16="http://schemas.microsoft.com/office/drawing/2014/main" id="{25E8393C-792B-45B1-8C3F-0567367C43C6}"/>
               </a:ext>
             </a:extLst>
           </p:cNvPr>
@@ -13323,8 +14226,8 @@
         </p:blipFill>
         <p:spPr>
           <a:xfrm>
-            <a:off x="1542273" y="846825"/>
-            <a:ext cx="6027566" cy="3604112"/>
+            <a:off x="428046" y="695063"/>
+            <a:ext cx="8287907" cy="3753374"/>
           </a:xfrm>
           <a:prstGeom prst="rect">
             <a:avLst/>
@@ -13334,7 +14237,7 @@
     </p:spTree>
     <p:extLst>
       <p:ext uri="{BB962C8B-B14F-4D97-AF65-F5344CB8AC3E}">
-        <p14:creationId xmlns:p14="http://schemas.microsoft.com/office/powerpoint/2010/main" val="3929175019"/>
+        <p14:creationId xmlns:p14="http://schemas.microsoft.com/office/powerpoint/2010/main" val="2912219046"/>
       </p:ext>
     </p:extLst>
   </p:cSld>
@@ -14287,18 +15190,18 @@
 </file>
 
 <file path=customXml/item1.xml><?xml version="1.0" encoding="utf-8"?>
+<p:properties xmlns:p="http://schemas.microsoft.com/office/2006/metadata/properties" xmlns:xsi="http://www.w3.org/2001/XMLSchema-instance">
+  <documentManagement/>
+</p:properties>
+</file>
+
+<file path=customXml/item2.xml><?xml version="1.0" encoding="utf-8"?>
 <?mso-contentType ?>
 <FormTemplates xmlns="http://schemas.microsoft.com/sharepoint/v3/contenttype/forms">
   <Display>DocumentLibraryForm</Display>
   <Edit>DocumentLibraryForm</Edit>
   <New>DocumentLibraryForm</New>
 </FormTemplates>
-</file>
-
-<file path=customXml/item2.xml><?xml version="1.0" encoding="utf-8"?>
-<p:properties xmlns:p="http://schemas.microsoft.com/office/2006/metadata/properties" xmlns:xsi="http://www.w3.org/2001/XMLSchema-instance">
-  <documentManagement/>
-</p:properties>
 </file>
 
 <file path=customXml/item3.xml><?xml version="1.0" encoding="utf-8"?>
@@ -14351,14 +15254,6 @@
 </file>
 
 <file path=customXml/itemProps1.xml><?xml version="1.0" encoding="utf-8"?>
-<ds:datastoreItem xmlns:ds="http://schemas.openxmlformats.org/officeDocument/2006/customXml" ds:itemID="{F135BDD1-A6DD-463F-96E1-1D64E8A54422}">
-  <ds:schemaRefs>
-    <ds:schemaRef ds:uri="http://schemas.microsoft.com/sharepoint/v3/contenttype/forms"/>
-  </ds:schemaRefs>
-</ds:datastoreItem>
-</file>
-
-<file path=customXml/itemProps2.xml><?xml version="1.0" encoding="utf-8"?>
 <ds:datastoreItem xmlns:ds="http://schemas.openxmlformats.org/officeDocument/2006/customXml" ds:itemID="{F3735A1A-98F5-44B9-9A7F-D3A37BCA6C65}">
   <ds:schemaRefs>
     <ds:schemaRef ds:uri="http://purl.org/dc/terms/"/>
@@ -14368,6 +15263,14 @@
     <ds:schemaRef ds:uri="http://schemas.microsoft.com/office/2006/metadata/properties"/>
     <ds:schemaRef ds:uri="http://schemas.microsoft.com/office/2006/documentManagement/types"/>
     <ds:schemaRef ds:uri="http://www.w3.org/XML/1998/namespace"/>
+  </ds:schemaRefs>
+</ds:datastoreItem>
+</file>
+
+<file path=customXml/itemProps2.xml><?xml version="1.0" encoding="utf-8"?>
+<ds:datastoreItem xmlns:ds="http://schemas.openxmlformats.org/officeDocument/2006/customXml" ds:itemID="{F135BDD1-A6DD-463F-96E1-1D64E8A54422}">
+  <ds:schemaRefs>
+    <ds:schemaRef ds:uri="http://schemas.microsoft.com/sharepoint/v3/contenttype/forms"/>
   </ds:schemaRefs>
 </ds:datastoreItem>
 </file>

</xml_diff>